<commit_message>
Chapter Introduction collapses Challanges into Research goals - Minor edits like citations, tex etc in Background, Methods, Stats, Exp3 - Edits ppt for noisy channel model figure typo - Chapter 1 Introduction: Culminates Research challenges into Research goals - Chapter 1 Introduction: Edits Research contribution and Overview of thesis - Chapter 1 Introduction: Edits in-text hyperlinks - Chapter 1 Introduction: Deletes commented out part that was written ages ago - Chapter 1 Introduction: Adds equation at the end of the chapter, yet to be integrated - Chapter 1 Introduction: Adds a line header includes for argmax in the equation
</commit_message>
<xml_diff>
--- a/figures/materials/noisy-channel.pptx
+++ b/figures/materials/noisy-channel.pptx
@@ -104,6 +104,11 @@
       </a:defRPr>
     </a:lvl9pPr>
   </p:defaultTextStyle>
+  <p:extLst>
+    <p:ext uri="{EFAFB233-063F-42B5-8137-9DF3F51BA10A}">
+      <p15:sldGuideLst xmlns:p15="http://schemas.microsoft.com/office/powerpoint/2012/main"/>
+    </p:ext>
+  </p:extLst>
 </p:presentation>
 </file>
 
@@ -256,7 +261,7 @@
           <a:p>
             <a:fld id="{7B30820A-8422-C04B-BF82-4192FE414B2E}" type="datetimeFigureOut">
               <a:rPr lang="en-GB" smtClean="0"/>
-              <a:t>25/04/2022</a:t>
+              <a:t>26/04/2022</a:t>
             </a:fld>
             <a:endParaRPr lang="en-GB"/>
           </a:p>
@@ -456,7 +461,7 @@
           <a:p>
             <a:fld id="{7B30820A-8422-C04B-BF82-4192FE414B2E}" type="datetimeFigureOut">
               <a:rPr lang="en-GB" smtClean="0"/>
-              <a:t>25/04/2022</a:t>
+              <a:t>26/04/2022</a:t>
             </a:fld>
             <a:endParaRPr lang="en-GB"/>
           </a:p>
@@ -666,7 +671,7 @@
           <a:p>
             <a:fld id="{7B30820A-8422-C04B-BF82-4192FE414B2E}" type="datetimeFigureOut">
               <a:rPr lang="en-GB" smtClean="0"/>
-              <a:t>25/04/2022</a:t>
+              <a:t>26/04/2022</a:t>
             </a:fld>
             <a:endParaRPr lang="en-GB"/>
           </a:p>
@@ -866,7 +871,7 @@
           <a:p>
             <a:fld id="{7B30820A-8422-C04B-BF82-4192FE414B2E}" type="datetimeFigureOut">
               <a:rPr lang="en-GB" smtClean="0"/>
-              <a:t>25/04/2022</a:t>
+              <a:t>26/04/2022</a:t>
             </a:fld>
             <a:endParaRPr lang="en-GB"/>
           </a:p>
@@ -1142,7 +1147,7 @@
           <a:p>
             <a:fld id="{7B30820A-8422-C04B-BF82-4192FE414B2E}" type="datetimeFigureOut">
               <a:rPr lang="en-GB" smtClean="0"/>
-              <a:t>25/04/2022</a:t>
+              <a:t>26/04/2022</a:t>
             </a:fld>
             <a:endParaRPr lang="en-GB"/>
           </a:p>
@@ -1410,7 +1415,7 @@
           <a:p>
             <a:fld id="{7B30820A-8422-C04B-BF82-4192FE414B2E}" type="datetimeFigureOut">
               <a:rPr lang="en-GB" smtClean="0"/>
-              <a:t>25/04/2022</a:t>
+              <a:t>26/04/2022</a:t>
             </a:fld>
             <a:endParaRPr lang="en-GB"/>
           </a:p>
@@ -1825,7 +1830,7 @@
           <a:p>
             <a:fld id="{7B30820A-8422-C04B-BF82-4192FE414B2E}" type="datetimeFigureOut">
               <a:rPr lang="en-GB" smtClean="0"/>
-              <a:t>25/04/2022</a:t>
+              <a:t>26/04/2022</a:t>
             </a:fld>
             <a:endParaRPr lang="en-GB"/>
           </a:p>
@@ -1967,7 +1972,7 @@
           <a:p>
             <a:fld id="{7B30820A-8422-C04B-BF82-4192FE414B2E}" type="datetimeFigureOut">
               <a:rPr lang="en-GB" smtClean="0"/>
-              <a:t>25/04/2022</a:t>
+              <a:t>26/04/2022</a:t>
             </a:fld>
             <a:endParaRPr lang="en-GB"/>
           </a:p>
@@ -2080,7 +2085,7 @@
           <a:p>
             <a:fld id="{7B30820A-8422-C04B-BF82-4192FE414B2E}" type="datetimeFigureOut">
               <a:rPr lang="en-GB" smtClean="0"/>
-              <a:t>25/04/2022</a:t>
+              <a:t>26/04/2022</a:t>
             </a:fld>
             <a:endParaRPr lang="en-GB"/>
           </a:p>
@@ -2393,7 +2398,7 @@
           <a:p>
             <a:fld id="{7B30820A-8422-C04B-BF82-4192FE414B2E}" type="datetimeFigureOut">
               <a:rPr lang="en-GB" smtClean="0"/>
-              <a:t>25/04/2022</a:t>
+              <a:t>26/04/2022</a:t>
             </a:fld>
             <a:endParaRPr lang="en-GB"/>
           </a:p>
@@ -2682,7 +2687,7 @@
           <a:p>
             <a:fld id="{7B30820A-8422-C04B-BF82-4192FE414B2E}" type="datetimeFigureOut">
               <a:rPr lang="en-GB" smtClean="0"/>
-              <a:t>25/04/2022</a:t>
+              <a:t>26/04/2022</a:t>
             </a:fld>
             <a:endParaRPr lang="en-GB"/>
           </a:p>
@@ -2925,7 +2930,7 @@
           <a:p>
             <a:fld id="{7B30820A-8422-C04B-BF82-4192FE414B2E}" type="datetimeFigureOut">
               <a:rPr lang="en-GB" smtClean="0"/>
-              <a:t>25/04/2022</a:t>
+              <a:t>26/04/2022</a:t>
             </a:fld>
             <a:endParaRPr lang="en-GB"/>
           </a:p>
@@ -3540,11 +3545,11 @@
               <a:t>Meaning (</a:t>
             </a:r>
             <a:r>
-              <a:rPr lang="en-GB" i="1" dirty="0"/>
-              <a:t>u</a:t>
-            </a:r>
-            <a:r>
-              <a:rPr lang="en-GB" i="1" baseline="-25000" dirty="0"/>
+              <a:rPr lang="en-GB" i="1" dirty="0" err="1"/>
+              <a:t>m</a:t>
+            </a:r>
+            <a:r>
+              <a:rPr lang="en-GB" i="1" baseline="-25000" dirty="0" err="1"/>
               <a:t>p</a:t>
             </a:r>
             <a:r>

</xml_diff>

<commit_message>
Bayesian networks and Discussion - In Chapter 1 Introduction, adds Bayesian network assumption (and graph) - Revises equations accordingly, and incorporates some of VD's comments about equation - No derivation (logically deduced from Bayesian network) - Provides example of BALL/HALL for the equation - In Chapter 8 Discussion, adds some content the first time - Adds potential requirement/skeleton based on YT video of Flinders Uni - In Acknowledgement section, adds some random text as a beginning - For Ch 1, prepares graphs in pptx, edits earlier one, deletes old image file
</commit_message>
<xml_diff>
--- a/figures/materials/noisy-channel.pptx
+++ b/figures/materials/noisy-channel.pptx
@@ -2,18 +2,21 @@
 <file path=ppt/presentation.xml><?xml version="1.0" encoding="utf-8"?>
 <p:presentation xmlns:a="http://schemas.openxmlformats.org/drawingml/2006/main" xmlns:r="http://schemas.openxmlformats.org/officeDocument/2006/relationships" xmlns:p="http://schemas.openxmlformats.org/presentationml/2006/main" saveSubsetFonts="1" autoCompressPictures="0">
   <p:sldMasterIdLst>
-    <p:sldMasterId id="2147483648" r:id="rId1"/>
+    <p:sldMasterId id="2147483924" r:id="rId1"/>
   </p:sldMasterIdLst>
+  <p:notesMasterIdLst>
+    <p:notesMasterId r:id="rId3"/>
+  </p:notesMasterIdLst>
   <p:sldIdLst>
-    <p:sldId id="256" r:id="rId2"/>
+    <p:sldId id="261" r:id="rId2"/>
   </p:sldIdLst>
-  <p:sldSz cx="12192000" cy="6858000"/>
+  <p:sldSz cx="14173200" cy="2286000"/>
   <p:notesSz cx="6858000" cy="9144000"/>
   <p:defaultTextStyle>
     <a:defPPr>
       <a:defRPr lang="en-US"/>
     </a:defPPr>
-    <a:lvl1pPr marL="0" algn="l" defTabSz="914400" rtl="0" eaLnBrk="1" latinLnBrk="0" hangingPunct="1">
+    <a:lvl1pPr marL="0" algn="l" defTabSz="457200" rtl="0" eaLnBrk="1" latinLnBrk="0" hangingPunct="1">
       <a:defRPr sz="1800" kern="1200">
         <a:solidFill>
           <a:schemeClr val="tx1"/>
@@ -23,7 +26,7 @@
         <a:cs typeface="+mn-cs"/>
       </a:defRPr>
     </a:lvl1pPr>
-    <a:lvl2pPr marL="457200" algn="l" defTabSz="914400" rtl="0" eaLnBrk="1" latinLnBrk="0" hangingPunct="1">
+    <a:lvl2pPr marL="457200" algn="l" defTabSz="457200" rtl="0" eaLnBrk="1" latinLnBrk="0" hangingPunct="1">
       <a:defRPr sz="1800" kern="1200">
         <a:solidFill>
           <a:schemeClr val="tx1"/>
@@ -33,7 +36,7 @@
         <a:cs typeface="+mn-cs"/>
       </a:defRPr>
     </a:lvl2pPr>
-    <a:lvl3pPr marL="914400" algn="l" defTabSz="914400" rtl="0" eaLnBrk="1" latinLnBrk="0" hangingPunct="1">
+    <a:lvl3pPr marL="914400" algn="l" defTabSz="457200" rtl="0" eaLnBrk="1" latinLnBrk="0" hangingPunct="1">
       <a:defRPr sz="1800" kern="1200">
         <a:solidFill>
           <a:schemeClr val="tx1"/>
@@ -43,7 +46,7 @@
         <a:cs typeface="+mn-cs"/>
       </a:defRPr>
     </a:lvl3pPr>
-    <a:lvl4pPr marL="1371600" algn="l" defTabSz="914400" rtl="0" eaLnBrk="1" latinLnBrk="0" hangingPunct="1">
+    <a:lvl4pPr marL="1371600" algn="l" defTabSz="457200" rtl="0" eaLnBrk="1" latinLnBrk="0" hangingPunct="1">
       <a:defRPr sz="1800" kern="1200">
         <a:solidFill>
           <a:schemeClr val="tx1"/>
@@ -53,7 +56,7 @@
         <a:cs typeface="+mn-cs"/>
       </a:defRPr>
     </a:lvl4pPr>
-    <a:lvl5pPr marL="1828800" algn="l" defTabSz="914400" rtl="0" eaLnBrk="1" latinLnBrk="0" hangingPunct="1">
+    <a:lvl5pPr marL="1828800" algn="l" defTabSz="457200" rtl="0" eaLnBrk="1" latinLnBrk="0" hangingPunct="1">
       <a:defRPr sz="1800" kern="1200">
         <a:solidFill>
           <a:schemeClr val="tx1"/>
@@ -63,7 +66,7 @@
         <a:cs typeface="+mn-cs"/>
       </a:defRPr>
     </a:lvl5pPr>
-    <a:lvl6pPr marL="2286000" algn="l" defTabSz="914400" rtl="0" eaLnBrk="1" latinLnBrk="0" hangingPunct="1">
+    <a:lvl6pPr marL="2286000" algn="l" defTabSz="457200" rtl="0" eaLnBrk="1" latinLnBrk="0" hangingPunct="1">
       <a:defRPr sz="1800" kern="1200">
         <a:solidFill>
           <a:schemeClr val="tx1"/>
@@ -73,7 +76,7 @@
         <a:cs typeface="+mn-cs"/>
       </a:defRPr>
     </a:lvl6pPr>
-    <a:lvl7pPr marL="2743200" algn="l" defTabSz="914400" rtl="0" eaLnBrk="1" latinLnBrk="0" hangingPunct="1">
+    <a:lvl7pPr marL="2743200" algn="l" defTabSz="457200" rtl="0" eaLnBrk="1" latinLnBrk="0" hangingPunct="1">
       <a:defRPr sz="1800" kern="1200">
         <a:solidFill>
           <a:schemeClr val="tx1"/>
@@ -83,7 +86,7 @@
         <a:cs typeface="+mn-cs"/>
       </a:defRPr>
     </a:lvl7pPr>
-    <a:lvl8pPr marL="3200400" algn="l" defTabSz="914400" rtl="0" eaLnBrk="1" latinLnBrk="0" hangingPunct="1">
+    <a:lvl8pPr marL="3200400" algn="l" defTabSz="457200" rtl="0" eaLnBrk="1" latinLnBrk="0" hangingPunct="1">
       <a:defRPr sz="1800" kern="1200">
         <a:solidFill>
           <a:schemeClr val="tx1"/>
@@ -93,7 +96,7 @@
         <a:cs typeface="+mn-cs"/>
       </a:defRPr>
     </a:lvl8pPr>
-    <a:lvl9pPr marL="3657600" algn="l" defTabSz="914400" rtl="0" eaLnBrk="1" latinLnBrk="0" hangingPunct="1">
+    <a:lvl9pPr marL="3657600" algn="l" defTabSz="457200" rtl="0" eaLnBrk="1" latinLnBrk="0" hangingPunct="1">
       <a:defRPr sz="1800" kern="1200">
         <a:solidFill>
           <a:schemeClr val="tx1"/>
@@ -110,6 +113,356 @@
     </p:ext>
   </p:extLst>
 </p:presentation>
+</file>
+
+<file path=ppt/notesMasters/notesMaster1.xml><?xml version="1.0" encoding="utf-8"?>
+<p:notesMaster xmlns:a="http://schemas.openxmlformats.org/drawingml/2006/main" xmlns:r="http://schemas.openxmlformats.org/officeDocument/2006/relationships" xmlns:p="http://schemas.openxmlformats.org/presentationml/2006/main">
+  <p:cSld>
+    <p:bg>
+      <p:bgRef idx="1001">
+        <a:schemeClr val="bg1"/>
+      </p:bgRef>
+    </p:bg>
+    <p:spTree>
+      <p:nvGrpSpPr>
+        <p:cNvPr id="1" name=""/>
+        <p:cNvGrpSpPr/>
+        <p:nvPr/>
+      </p:nvGrpSpPr>
+      <p:grpSpPr>
+        <a:xfrm>
+          <a:off x="0" y="0"/>
+          <a:ext cx="0" cy="0"/>
+          <a:chOff x="0" y="0"/>
+          <a:chExt cx="0" cy="0"/>
+        </a:xfrm>
+      </p:grpSpPr>
+      <p:sp>
+        <p:nvSpPr>
+          <p:cNvPr id="2" name="Header Placeholder 1"/>
+          <p:cNvSpPr>
+            <a:spLocks noGrp="1"/>
+          </p:cNvSpPr>
+          <p:nvPr>
+            <p:ph type="hdr" sz="quarter"/>
+          </p:nvPr>
+        </p:nvSpPr>
+        <p:spPr>
+          <a:xfrm>
+            <a:off x="0" y="0"/>
+            <a:ext cx="2971800" cy="458788"/>
+          </a:xfrm>
+          <a:prstGeom prst="rect">
+            <a:avLst/>
+          </a:prstGeom>
+        </p:spPr>
+        <p:txBody>
+          <a:bodyPr vert="horz" lIns="91440" tIns="45720" rIns="91440" bIns="45720" rtlCol="0"/>
+          <a:lstStyle>
+            <a:lvl1pPr algn="l">
+              <a:defRPr sz="1200"/>
+            </a:lvl1pPr>
+          </a:lstStyle>
+          <a:p>
+            <a:endParaRPr lang="en-GB"/>
+          </a:p>
+        </p:txBody>
+      </p:sp>
+      <p:sp>
+        <p:nvSpPr>
+          <p:cNvPr id="3" name="Date Placeholder 2"/>
+          <p:cNvSpPr>
+            <a:spLocks noGrp="1"/>
+          </p:cNvSpPr>
+          <p:nvPr>
+            <p:ph type="dt" idx="1"/>
+          </p:nvPr>
+        </p:nvSpPr>
+        <p:spPr>
+          <a:xfrm>
+            <a:off x="3884613" y="0"/>
+            <a:ext cx="2971800" cy="458788"/>
+          </a:xfrm>
+          <a:prstGeom prst="rect">
+            <a:avLst/>
+          </a:prstGeom>
+        </p:spPr>
+        <p:txBody>
+          <a:bodyPr vert="horz" lIns="91440" tIns="45720" rIns="91440" bIns="45720" rtlCol="0"/>
+          <a:lstStyle>
+            <a:lvl1pPr algn="r">
+              <a:defRPr sz="1200"/>
+            </a:lvl1pPr>
+          </a:lstStyle>
+          <a:p>
+            <a:fld id="{596C9599-1DFA-2845-A1F3-3A2BF15504F1}" type="datetimeFigureOut">
+              <a:rPr lang="en-GB" smtClean="0"/>
+              <a:t>13/08/2022</a:t>
+            </a:fld>
+            <a:endParaRPr lang="en-GB"/>
+          </a:p>
+        </p:txBody>
+      </p:sp>
+      <p:sp>
+        <p:nvSpPr>
+          <p:cNvPr id="4" name="Slide Image Placeholder 3"/>
+          <p:cNvSpPr>
+            <a:spLocks noGrp="1" noRot="1" noChangeAspect="1"/>
+          </p:cNvSpPr>
+          <p:nvPr>
+            <p:ph type="sldImg" idx="2"/>
+          </p:nvPr>
+        </p:nvSpPr>
+        <p:spPr>
+          <a:xfrm>
+            <a:off x="-6137275" y="1143000"/>
+            <a:ext cx="19132550" cy="3086100"/>
+          </a:xfrm>
+          <a:prstGeom prst="rect">
+            <a:avLst/>
+          </a:prstGeom>
+          <a:noFill/>
+          <a:ln w="12700">
+            <a:solidFill>
+              <a:prstClr val="black"/>
+            </a:solidFill>
+          </a:ln>
+        </p:spPr>
+        <p:txBody>
+          <a:bodyPr vert="horz" lIns="91440" tIns="45720" rIns="91440" bIns="45720" rtlCol="0" anchor="ctr"/>
+          <a:lstStyle/>
+          <a:p>
+            <a:endParaRPr lang="en-GB"/>
+          </a:p>
+        </p:txBody>
+      </p:sp>
+      <p:sp>
+        <p:nvSpPr>
+          <p:cNvPr id="5" name="Notes Placeholder 4"/>
+          <p:cNvSpPr>
+            <a:spLocks noGrp="1"/>
+          </p:cNvSpPr>
+          <p:nvPr>
+            <p:ph type="body" sz="quarter" idx="3"/>
+          </p:nvPr>
+        </p:nvSpPr>
+        <p:spPr>
+          <a:xfrm>
+            <a:off x="685800" y="4400550"/>
+            <a:ext cx="5486400" cy="3600450"/>
+          </a:xfrm>
+          <a:prstGeom prst="rect">
+            <a:avLst/>
+          </a:prstGeom>
+        </p:spPr>
+        <p:txBody>
+          <a:bodyPr vert="horz" lIns="91440" tIns="45720" rIns="91440" bIns="45720" rtlCol="0"/>
+          <a:lstStyle/>
+          <a:p>
+            <a:pPr lvl="0"/>
+            <a:r>
+              <a:rPr lang="en-US"/>
+              <a:t>Click to edit Master text styles</a:t>
+            </a:r>
+          </a:p>
+          <a:p>
+            <a:pPr lvl="1"/>
+            <a:r>
+              <a:rPr lang="en-US"/>
+              <a:t>Second level</a:t>
+            </a:r>
+          </a:p>
+          <a:p>
+            <a:pPr lvl="2"/>
+            <a:r>
+              <a:rPr lang="en-US"/>
+              <a:t>Third level</a:t>
+            </a:r>
+          </a:p>
+          <a:p>
+            <a:pPr lvl="3"/>
+            <a:r>
+              <a:rPr lang="en-US"/>
+              <a:t>Fourth level</a:t>
+            </a:r>
+          </a:p>
+          <a:p>
+            <a:pPr lvl="4"/>
+            <a:r>
+              <a:rPr lang="en-US"/>
+              <a:t>Fifth level</a:t>
+            </a:r>
+            <a:endParaRPr lang="en-GB"/>
+          </a:p>
+        </p:txBody>
+      </p:sp>
+      <p:sp>
+        <p:nvSpPr>
+          <p:cNvPr id="6" name="Footer Placeholder 5"/>
+          <p:cNvSpPr>
+            <a:spLocks noGrp="1"/>
+          </p:cNvSpPr>
+          <p:nvPr>
+            <p:ph type="ftr" sz="quarter" idx="4"/>
+          </p:nvPr>
+        </p:nvSpPr>
+        <p:spPr>
+          <a:xfrm>
+            <a:off x="0" y="8685213"/>
+            <a:ext cx="2971800" cy="458787"/>
+          </a:xfrm>
+          <a:prstGeom prst="rect">
+            <a:avLst/>
+          </a:prstGeom>
+        </p:spPr>
+        <p:txBody>
+          <a:bodyPr vert="horz" lIns="91440" tIns="45720" rIns="91440" bIns="45720" rtlCol="0" anchor="b"/>
+          <a:lstStyle>
+            <a:lvl1pPr algn="l">
+              <a:defRPr sz="1200"/>
+            </a:lvl1pPr>
+          </a:lstStyle>
+          <a:p>
+            <a:endParaRPr lang="en-GB"/>
+          </a:p>
+        </p:txBody>
+      </p:sp>
+      <p:sp>
+        <p:nvSpPr>
+          <p:cNvPr id="7" name="Slide Number Placeholder 6"/>
+          <p:cNvSpPr>
+            <a:spLocks noGrp="1"/>
+          </p:cNvSpPr>
+          <p:nvPr>
+            <p:ph type="sldNum" sz="quarter" idx="5"/>
+          </p:nvPr>
+        </p:nvSpPr>
+        <p:spPr>
+          <a:xfrm>
+            <a:off x="3884613" y="8685213"/>
+            <a:ext cx="2971800" cy="458787"/>
+          </a:xfrm>
+          <a:prstGeom prst="rect">
+            <a:avLst/>
+          </a:prstGeom>
+        </p:spPr>
+        <p:txBody>
+          <a:bodyPr vert="horz" lIns="91440" tIns="45720" rIns="91440" bIns="45720" rtlCol="0" anchor="b"/>
+          <a:lstStyle>
+            <a:lvl1pPr algn="r">
+              <a:defRPr sz="1200"/>
+            </a:lvl1pPr>
+          </a:lstStyle>
+          <a:p>
+            <a:fld id="{DDF663BD-3A89-D145-B2EC-C141169FB596}" type="slidenum">
+              <a:rPr lang="en-GB" smtClean="0"/>
+              <a:t>‹#›</a:t>
+            </a:fld>
+            <a:endParaRPr lang="en-GB"/>
+          </a:p>
+        </p:txBody>
+      </p:sp>
+    </p:spTree>
+    <p:extLst>
+      <p:ext uri="{BB962C8B-B14F-4D97-AF65-F5344CB8AC3E}">
+        <p14:creationId xmlns:p14="http://schemas.microsoft.com/office/powerpoint/2010/main" val="3672076129"/>
+      </p:ext>
+    </p:extLst>
+  </p:cSld>
+  <p:clrMap bg1="lt1" tx1="dk1" bg2="lt2" tx2="dk2" accent1="accent1" accent2="accent2" accent3="accent3" accent4="accent4" accent5="accent5" accent6="accent6" hlink="hlink" folHlink="folHlink"/>
+  <p:notesStyle>
+    <a:lvl1pPr marL="0" algn="l" defTabSz="914400" rtl="0" eaLnBrk="1" latinLnBrk="0" hangingPunct="1">
+      <a:defRPr sz="1200" kern="1200">
+        <a:solidFill>
+          <a:schemeClr val="tx1"/>
+        </a:solidFill>
+        <a:latin typeface="+mn-lt"/>
+        <a:ea typeface="+mn-ea"/>
+        <a:cs typeface="+mn-cs"/>
+      </a:defRPr>
+    </a:lvl1pPr>
+    <a:lvl2pPr marL="457200" algn="l" defTabSz="914400" rtl="0" eaLnBrk="1" latinLnBrk="0" hangingPunct="1">
+      <a:defRPr sz="1200" kern="1200">
+        <a:solidFill>
+          <a:schemeClr val="tx1"/>
+        </a:solidFill>
+        <a:latin typeface="+mn-lt"/>
+        <a:ea typeface="+mn-ea"/>
+        <a:cs typeface="+mn-cs"/>
+      </a:defRPr>
+    </a:lvl2pPr>
+    <a:lvl3pPr marL="914400" algn="l" defTabSz="914400" rtl="0" eaLnBrk="1" latinLnBrk="0" hangingPunct="1">
+      <a:defRPr sz="1200" kern="1200">
+        <a:solidFill>
+          <a:schemeClr val="tx1"/>
+        </a:solidFill>
+        <a:latin typeface="+mn-lt"/>
+        <a:ea typeface="+mn-ea"/>
+        <a:cs typeface="+mn-cs"/>
+      </a:defRPr>
+    </a:lvl3pPr>
+    <a:lvl4pPr marL="1371600" algn="l" defTabSz="914400" rtl="0" eaLnBrk="1" latinLnBrk="0" hangingPunct="1">
+      <a:defRPr sz="1200" kern="1200">
+        <a:solidFill>
+          <a:schemeClr val="tx1"/>
+        </a:solidFill>
+        <a:latin typeface="+mn-lt"/>
+        <a:ea typeface="+mn-ea"/>
+        <a:cs typeface="+mn-cs"/>
+      </a:defRPr>
+    </a:lvl4pPr>
+    <a:lvl5pPr marL="1828800" algn="l" defTabSz="914400" rtl="0" eaLnBrk="1" latinLnBrk="0" hangingPunct="1">
+      <a:defRPr sz="1200" kern="1200">
+        <a:solidFill>
+          <a:schemeClr val="tx1"/>
+        </a:solidFill>
+        <a:latin typeface="+mn-lt"/>
+        <a:ea typeface="+mn-ea"/>
+        <a:cs typeface="+mn-cs"/>
+      </a:defRPr>
+    </a:lvl5pPr>
+    <a:lvl6pPr marL="2286000" algn="l" defTabSz="914400" rtl="0" eaLnBrk="1" latinLnBrk="0" hangingPunct="1">
+      <a:defRPr sz="1200" kern="1200">
+        <a:solidFill>
+          <a:schemeClr val="tx1"/>
+        </a:solidFill>
+        <a:latin typeface="+mn-lt"/>
+        <a:ea typeface="+mn-ea"/>
+        <a:cs typeface="+mn-cs"/>
+      </a:defRPr>
+    </a:lvl6pPr>
+    <a:lvl7pPr marL="2743200" algn="l" defTabSz="914400" rtl="0" eaLnBrk="1" latinLnBrk="0" hangingPunct="1">
+      <a:defRPr sz="1200" kern="1200">
+        <a:solidFill>
+          <a:schemeClr val="tx1"/>
+        </a:solidFill>
+        <a:latin typeface="+mn-lt"/>
+        <a:ea typeface="+mn-ea"/>
+        <a:cs typeface="+mn-cs"/>
+      </a:defRPr>
+    </a:lvl7pPr>
+    <a:lvl8pPr marL="3200400" algn="l" defTabSz="914400" rtl="0" eaLnBrk="1" latinLnBrk="0" hangingPunct="1">
+      <a:defRPr sz="1200" kern="1200">
+        <a:solidFill>
+          <a:schemeClr val="tx1"/>
+        </a:solidFill>
+        <a:latin typeface="+mn-lt"/>
+        <a:ea typeface="+mn-ea"/>
+        <a:cs typeface="+mn-cs"/>
+      </a:defRPr>
+    </a:lvl8pPr>
+    <a:lvl9pPr marL="3657600" algn="l" defTabSz="914400" rtl="0" eaLnBrk="1" latinLnBrk="0" hangingPunct="1">
+      <a:defRPr sz="1200" kern="1200">
+        <a:solidFill>
+          <a:schemeClr val="tx1"/>
+        </a:solidFill>
+        <a:latin typeface="+mn-lt"/>
+        <a:ea typeface="+mn-ea"/>
+        <a:cs typeface="+mn-cs"/>
+      </a:defRPr>
+    </a:lvl9pPr>
+  </p:notesStyle>
+</p:notesMaster>
 </file>
 
 <file path=ppt/slideLayouts/slideLayout1.xml><?xml version="1.0" encoding="utf-8"?>
@@ -131,13 +484,7 @@
       </p:grpSpPr>
       <p:sp>
         <p:nvSpPr>
-          <p:cNvPr id="2" name="Title 1">
-            <a:extLst>
-              <a:ext uri="{FF2B5EF4-FFF2-40B4-BE49-F238E27FC236}">
-                <a16:creationId xmlns:a16="http://schemas.microsoft.com/office/drawing/2014/main" id="{355CD9A4-6D06-FCA0-F6AC-EBDDD6D10EBD}"/>
-              </a:ext>
-            </a:extLst>
-          </p:cNvPr>
+          <p:cNvPr id="2" name="Title 1"/>
           <p:cNvSpPr>
             <a:spLocks noGrp="1"/>
           </p:cNvSpPr>
@@ -147,15 +494,15 @@
         </p:nvSpPr>
         <p:spPr>
           <a:xfrm>
-            <a:off x="1524000" y="1122363"/>
-            <a:ext cx="9144000" cy="2387600"/>
+            <a:off x="1771650" y="374121"/>
+            <a:ext cx="10629900" cy="795867"/>
           </a:xfrm>
         </p:spPr>
         <p:txBody>
           <a:bodyPr anchor="b"/>
           <a:lstStyle>
             <a:lvl1pPr algn="ctr">
-              <a:defRPr sz="6000"/>
+              <a:defRPr sz="2000"/>
             </a:lvl1pPr>
           </a:lstStyle>
           <a:p>
@@ -163,19 +510,13 @@
               <a:rPr lang="en-US"/>
               <a:t>Click to edit Master title style</a:t>
             </a:r>
-            <a:endParaRPr lang="en-GB"/>
-          </a:p>
-        </p:txBody>
-      </p:sp>
-      <p:sp>
-        <p:nvSpPr>
-          <p:cNvPr id="3" name="Subtitle 2">
-            <a:extLst>
-              <a:ext uri="{FF2B5EF4-FFF2-40B4-BE49-F238E27FC236}">
-                <a16:creationId xmlns:a16="http://schemas.microsoft.com/office/drawing/2014/main" id="{A44DFBB8-604C-04C4-6256-399E95997AA3}"/>
-              </a:ext>
-            </a:extLst>
-          </p:cNvPr>
+            <a:endParaRPr lang="en-US" dirty="0"/>
+          </a:p>
+        </p:txBody>
+      </p:sp>
+      <p:sp>
+        <p:nvSpPr>
+          <p:cNvPr id="3" name="Subtitle 2"/>
           <p:cNvSpPr>
             <a:spLocks noGrp="1"/>
           </p:cNvSpPr>
@@ -185,8 +526,8 @@
         </p:nvSpPr>
         <p:spPr>
           <a:xfrm>
-            <a:off x="1524000" y="3602038"/>
-            <a:ext cx="9144000" cy="1655762"/>
+            <a:off x="1771650" y="1200679"/>
+            <a:ext cx="10629900" cy="551921"/>
           </a:xfrm>
         </p:spPr>
         <p:txBody>
@@ -194,39 +535,39 @@
           <a:lstStyle>
             <a:lvl1pPr marL="0" indent="0" algn="ctr">
               <a:buNone/>
-              <a:defRPr sz="2400"/>
+              <a:defRPr sz="800"/>
             </a:lvl1pPr>
-            <a:lvl2pPr marL="457200" indent="0" algn="ctr">
-              <a:buNone/>
-              <a:defRPr sz="2000"/>
+            <a:lvl2pPr marL="152385" indent="0" algn="ctr">
+              <a:buNone/>
+              <a:defRPr sz="667"/>
             </a:lvl2pPr>
-            <a:lvl3pPr marL="914400" indent="0" algn="ctr">
-              <a:buNone/>
-              <a:defRPr sz="1800"/>
+            <a:lvl3pPr marL="304770" indent="0" algn="ctr">
+              <a:buNone/>
+              <a:defRPr sz="600"/>
             </a:lvl3pPr>
-            <a:lvl4pPr marL="1371600" indent="0" algn="ctr">
-              <a:buNone/>
-              <a:defRPr sz="1600"/>
+            <a:lvl4pPr marL="457154" indent="0" algn="ctr">
+              <a:buNone/>
+              <a:defRPr sz="533"/>
             </a:lvl4pPr>
-            <a:lvl5pPr marL="1828800" indent="0" algn="ctr">
-              <a:buNone/>
-              <a:defRPr sz="1600"/>
+            <a:lvl5pPr marL="609539" indent="0" algn="ctr">
+              <a:buNone/>
+              <a:defRPr sz="533"/>
             </a:lvl5pPr>
-            <a:lvl6pPr marL="2286000" indent="0" algn="ctr">
-              <a:buNone/>
-              <a:defRPr sz="1600"/>
+            <a:lvl6pPr marL="761924" indent="0" algn="ctr">
+              <a:buNone/>
+              <a:defRPr sz="533"/>
             </a:lvl6pPr>
-            <a:lvl7pPr marL="2743200" indent="0" algn="ctr">
-              <a:buNone/>
-              <a:defRPr sz="1600"/>
+            <a:lvl7pPr marL="914309" indent="0" algn="ctr">
+              <a:buNone/>
+              <a:defRPr sz="533"/>
             </a:lvl7pPr>
-            <a:lvl8pPr marL="3200400" indent="0" algn="ctr">
-              <a:buNone/>
-              <a:defRPr sz="1600"/>
+            <a:lvl8pPr marL="1066693" indent="0" algn="ctr">
+              <a:buNone/>
+              <a:defRPr sz="533"/>
             </a:lvl8pPr>
-            <a:lvl9pPr marL="3657600" indent="0" algn="ctr">
-              <a:buNone/>
-              <a:defRPr sz="1600"/>
+            <a:lvl9pPr marL="1219078" indent="0" algn="ctr">
+              <a:buNone/>
+              <a:defRPr sz="533"/>
             </a:lvl9pPr>
           </a:lstStyle>
           <a:p>
@@ -234,19 +575,13 @@
               <a:rPr lang="en-US"/>
               <a:t>Click to edit Master subtitle style</a:t>
             </a:r>
-            <a:endParaRPr lang="en-GB"/>
-          </a:p>
-        </p:txBody>
-      </p:sp>
-      <p:sp>
-        <p:nvSpPr>
-          <p:cNvPr id="4" name="Date Placeholder 3">
-            <a:extLst>
-              <a:ext uri="{FF2B5EF4-FFF2-40B4-BE49-F238E27FC236}">
-                <a16:creationId xmlns:a16="http://schemas.microsoft.com/office/drawing/2014/main" id="{1970CB89-E4D4-0D0E-028D-7284C3EBCA6E}"/>
-              </a:ext>
-            </a:extLst>
-          </p:cNvPr>
+            <a:endParaRPr lang="en-US" dirty="0"/>
+          </a:p>
+        </p:txBody>
+      </p:sp>
+      <p:sp>
+        <p:nvSpPr>
+          <p:cNvPr id="4" name="Date Placeholder 3"/>
           <p:cNvSpPr>
             <a:spLocks noGrp="1"/>
           </p:cNvSpPr>
@@ -259,9 +594,9 @@
           <a:bodyPr/>
           <a:lstStyle/>
           <a:p>
-            <a:fld id="{7B30820A-8422-C04B-BF82-4192FE414B2E}" type="datetimeFigureOut">
+            <a:fld id="{458478C2-303E-6247-B8F4-26DC85D2646A}" type="datetimeFigureOut">
               <a:rPr lang="en-GB" smtClean="0"/>
-              <a:t>26/04/2022</a:t>
+              <a:t>13/08/2022</a:t>
             </a:fld>
             <a:endParaRPr lang="en-GB"/>
           </a:p>
@@ -269,13 +604,7 @@
       </p:sp>
       <p:sp>
         <p:nvSpPr>
-          <p:cNvPr id="5" name="Footer Placeholder 4">
-            <a:extLst>
-              <a:ext uri="{FF2B5EF4-FFF2-40B4-BE49-F238E27FC236}">
-                <a16:creationId xmlns:a16="http://schemas.microsoft.com/office/drawing/2014/main" id="{9B892633-3155-3C06-6068-A757FE7FFA66}"/>
-              </a:ext>
-            </a:extLst>
-          </p:cNvPr>
+          <p:cNvPr id="5" name="Footer Placeholder 4"/>
           <p:cNvSpPr>
             <a:spLocks noGrp="1"/>
           </p:cNvSpPr>
@@ -294,13 +623,7 @@
       </p:sp>
       <p:sp>
         <p:nvSpPr>
-          <p:cNvPr id="6" name="Slide Number Placeholder 5">
-            <a:extLst>
-              <a:ext uri="{FF2B5EF4-FFF2-40B4-BE49-F238E27FC236}">
-                <a16:creationId xmlns:a16="http://schemas.microsoft.com/office/drawing/2014/main" id="{707000B0-5BCE-5568-AC36-F2FDE0DAFD21}"/>
-              </a:ext>
-            </a:extLst>
-          </p:cNvPr>
+          <p:cNvPr id="6" name="Slide Number Placeholder 5"/>
           <p:cNvSpPr>
             <a:spLocks noGrp="1"/>
           </p:cNvSpPr>
@@ -313,7 +636,7 @@
           <a:bodyPr/>
           <a:lstStyle/>
           <a:p>
-            <a:fld id="{01F534BD-476C-8E43-92CA-BAEB25A10DCA}" type="slidenum">
+            <a:fld id="{AA1227A9-2AB6-F04F-BB9E-1700E1EF1BD6}" type="slidenum">
               <a:rPr lang="en-GB" smtClean="0"/>
               <a:t>‹#›</a:t>
             </a:fld>
@@ -324,7 +647,7 @@
     </p:spTree>
     <p:extLst>
       <p:ext uri="{BB962C8B-B14F-4D97-AF65-F5344CB8AC3E}">
-        <p14:creationId xmlns:p14="http://schemas.microsoft.com/office/powerpoint/2010/main" val="1804988167"/>
+        <p14:creationId xmlns:p14="http://schemas.microsoft.com/office/powerpoint/2010/main" val="3513935327"/>
       </p:ext>
     </p:extLst>
   </p:cSld>
@@ -353,13 +676,7 @@
       </p:grpSpPr>
       <p:sp>
         <p:nvSpPr>
-          <p:cNvPr id="2" name="Title 1">
-            <a:extLst>
-              <a:ext uri="{FF2B5EF4-FFF2-40B4-BE49-F238E27FC236}">
-                <a16:creationId xmlns:a16="http://schemas.microsoft.com/office/drawing/2014/main" id="{FFB5A1AF-2AE0-3C97-E946-93D53CB09762}"/>
-              </a:ext>
-            </a:extLst>
-          </p:cNvPr>
+          <p:cNvPr id="2" name="Title 1"/>
           <p:cNvSpPr>
             <a:spLocks noGrp="1"/>
           </p:cNvSpPr>
@@ -376,19 +693,13 @@
               <a:rPr lang="en-US"/>
               <a:t>Click to edit Master title style</a:t>
             </a:r>
-            <a:endParaRPr lang="en-GB"/>
-          </a:p>
-        </p:txBody>
-      </p:sp>
-      <p:sp>
-        <p:nvSpPr>
-          <p:cNvPr id="3" name="Vertical Text Placeholder 2">
-            <a:extLst>
-              <a:ext uri="{FF2B5EF4-FFF2-40B4-BE49-F238E27FC236}">
-                <a16:creationId xmlns:a16="http://schemas.microsoft.com/office/drawing/2014/main" id="{53F2AEC0-AE46-B490-90F3-EE7ECE1A3853}"/>
-              </a:ext>
-            </a:extLst>
-          </p:cNvPr>
+            <a:endParaRPr lang="en-US" dirty="0"/>
+          </a:p>
+        </p:txBody>
+      </p:sp>
+      <p:sp>
+        <p:nvSpPr>
+          <p:cNvPr id="3" name="Vertical Text Placeholder 2"/>
           <p:cNvSpPr>
             <a:spLocks noGrp="1"/>
           </p:cNvSpPr>
@@ -434,19 +745,13 @@
               <a:rPr lang="en-US"/>
               <a:t>Fifth level</a:t>
             </a:r>
-            <a:endParaRPr lang="en-GB"/>
-          </a:p>
-        </p:txBody>
-      </p:sp>
-      <p:sp>
-        <p:nvSpPr>
-          <p:cNvPr id="4" name="Date Placeholder 3">
-            <a:extLst>
-              <a:ext uri="{FF2B5EF4-FFF2-40B4-BE49-F238E27FC236}">
-                <a16:creationId xmlns:a16="http://schemas.microsoft.com/office/drawing/2014/main" id="{39F678D9-EF81-1E17-A7DE-66F34C570709}"/>
-              </a:ext>
-            </a:extLst>
-          </p:cNvPr>
+            <a:endParaRPr lang="en-US" dirty="0"/>
+          </a:p>
+        </p:txBody>
+      </p:sp>
+      <p:sp>
+        <p:nvSpPr>
+          <p:cNvPr id="4" name="Date Placeholder 3"/>
           <p:cNvSpPr>
             <a:spLocks noGrp="1"/>
           </p:cNvSpPr>
@@ -459,9 +764,9 @@
           <a:bodyPr/>
           <a:lstStyle/>
           <a:p>
-            <a:fld id="{7B30820A-8422-C04B-BF82-4192FE414B2E}" type="datetimeFigureOut">
+            <a:fld id="{458478C2-303E-6247-B8F4-26DC85D2646A}" type="datetimeFigureOut">
               <a:rPr lang="en-GB" smtClean="0"/>
-              <a:t>26/04/2022</a:t>
+              <a:t>13/08/2022</a:t>
             </a:fld>
             <a:endParaRPr lang="en-GB"/>
           </a:p>
@@ -469,13 +774,7 @@
       </p:sp>
       <p:sp>
         <p:nvSpPr>
-          <p:cNvPr id="5" name="Footer Placeholder 4">
-            <a:extLst>
-              <a:ext uri="{FF2B5EF4-FFF2-40B4-BE49-F238E27FC236}">
-                <a16:creationId xmlns:a16="http://schemas.microsoft.com/office/drawing/2014/main" id="{EF91393E-204F-94D2-E9F7-B1B345998428}"/>
-              </a:ext>
-            </a:extLst>
-          </p:cNvPr>
+          <p:cNvPr id="5" name="Footer Placeholder 4"/>
           <p:cNvSpPr>
             <a:spLocks noGrp="1"/>
           </p:cNvSpPr>
@@ -494,13 +793,7 @@
       </p:sp>
       <p:sp>
         <p:nvSpPr>
-          <p:cNvPr id="6" name="Slide Number Placeholder 5">
-            <a:extLst>
-              <a:ext uri="{FF2B5EF4-FFF2-40B4-BE49-F238E27FC236}">
-                <a16:creationId xmlns:a16="http://schemas.microsoft.com/office/drawing/2014/main" id="{C2E2D929-42F4-230D-9365-6FAE5ADF1A20}"/>
-              </a:ext>
-            </a:extLst>
-          </p:cNvPr>
+          <p:cNvPr id="6" name="Slide Number Placeholder 5"/>
           <p:cNvSpPr>
             <a:spLocks noGrp="1"/>
           </p:cNvSpPr>
@@ -513,7 +806,7 @@
           <a:bodyPr/>
           <a:lstStyle/>
           <a:p>
-            <a:fld id="{01F534BD-476C-8E43-92CA-BAEB25A10DCA}" type="slidenum">
+            <a:fld id="{AA1227A9-2AB6-F04F-BB9E-1700E1EF1BD6}" type="slidenum">
               <a:rPr lang="en-GB" smtClean="0"/>
               <a:t>‹#›</a:t>
             </a:fld>
@@ -524,7 +817,7 @@
     </p:spTree>
     <p:extLst>
       <p:ext uri="{BB962C8B-B14F-4D97-AF65-F5344CB8AC3E}">
-        <p14:creationId xmlns:p14="http://schemas.microsoft.com/office/powerpoint/2010/main" val="656064199"/>
+        <p14:creationId xmlns:p14="http://schemas.microsoft.com/office/powerpoint/2010/main" val="2105079955"/>
       </p:ext>
     </p:extLst>
   </p:cSld>
@@ -553,13 +846,7 @@
       </p:grpSpPr>
       <p:sp>
         <p:nvSpPr>
-          <p:cNvPr id="2" name="Vertical Title 1">
-            <a:extLst>
-              <a:ext uri="{FF2B5EF4-FFF2-40B4-BE49-F238E27FC236}">
-                <a16:creationId xmlns:a16="http://schemas.microsoft.com/office/drawing/2014/main" id="{86133C3B-38D5-D763-F057-61F0FCFEE038}"/>
-              </a:ext>
-            </a:extLst>
-          </p:cNvPr>
+          <p:cNvPr id="2" name="Vertical Title 1"/>
           <p:cNvSpPr>
             <a:spLocks noGrp="1"/>
           </p:cNvSpPr>
@@ -569,8 +856,8 @@
         </p:nvSpPr>
         <p:spPr>
           <a:xfrm>
-            <a:off x="8724900" y="365125"/>
-            <a:ext cx="2628900" cy="5811838"/>
+            <a:off x="10142696" y="121709"/>
+            <a:ext cx="3056096" cy="1937279"/>
           </a:xfrm>
         </p:spPr>
         <p:txBody>
@@ -581,19 +868,13 @@
               <a:rPr lang="en-US"/>
               <a:t>Click to edit Master title style</a:t>
             </a:r>
-            <a:endParaRPr lang="en-GB"/>
-          </a:p>
-        </p:txBody>
-      </p:sp>
-      <p:sp>
-        <p:nvSpPr>
-          <p:cNvPr id="3" name="Vertical Text Placeholder 2">
-            <a:extLst>
-              <a:ext uri="{FF2B5EF4-FFF2-40B4-BE49-F238E27FC236}">
-                <a16:creationId xmlns:a16="http://schemas.microsoft.com/office/drawing/2014/main" id="{E18CB4E5-D3B8-779C-6AA8-460B1ABF810C}"/>
-              </a:ext>
-            </a:extLst>
-          </p:cNvPr>
+            <a:endParaRPr lang="en-US" dirty="0"/>
+          </a:p>
+        </p:txBody>
+      </p:sp>
+      <p:sp>
+        <p:nvSpPr>
+          <p:cNvPr id="3" name="Vertical Text Placeholder 2"/>
           <p:cNvSpPr>
             <a:spLocks noGrp="1"/>
           </p:cNvSpPr>
@@ -603,8 +884,8 @@
         </p:nvSpPr>
         <p:spPr>
           <a:xfrm>
-            <a:off x="838200" y="365125"/>
-            <a:ext cx="7734300" cy="5811838"/>
+            <a:off x="974407" y="121709"/>
+            <a:ext cx="8991124" cy="1937279"/>
           </a:xfrm>
         </p:spPr>
         <p:txBody>
@@ -644,19 +925,13 @@
               <a:rPr lang="en-US"/>
               <a:t>Fifth level</a:t>
             </a:r>
-            <a:endParaRPr lang="en-GB"/>
-          </a:p>
-        </p:txBody>
-      </p:sp>
-      <p:sp>
-        <p:nvSpPr>
-          <p:cNvPr id="4" name="Date Placeholder 3">
-            <a:extLst>
-              <a:ext uri="{FF2B5EF4-FFF2-40B4-BE49-F238E27FC236}">
-                <a16:creationId xmlns:a16="http://schemas.microsoft.com/office/drawing/2014/main" id="{FE178EF7-1DD3-0BD4-5C23-F79E94BEAB18}"/>
-              </a:ext>
-            </a:extLst>
-          </p:cNvPr>
+            <a:endParaRPr lang="en-US" dirty="0"/>
+          </a:p>
+        </p:txBody>
+      </p:sp>
+      <p:sp>
+        <p:nvSpPr>
+          <p:cNvPr id="4" name="Date Placeholder 3"/>
           <p:cNvSpPr>
             <a:spLocks noGrp="1"/>
           </p:cNvSpPr>
@@ -669,9 +944,9 @@
           <a:bodyPr/>
           <a:lstStyle/>
           <a:p>
-            <a:fld id="{7B30820A-8422-C04B-BF82-4192FE414B2E}" type="datetimeFigureOut">
+            <a:fld id="{458478C2-303E-6247-B8F4-26DC85D2646A}" type="datetimeFigureOut">
               <a:rPr lang="en-GB" smtClean="0"/>
-              <a:t>26/04/2022</a:t>
+              <a:t>13/08/2022</a:t>
             </a:fld>
             <a:endParaRPr lang="en-GB"/>
           </a:p>
@@ -679,13 +954,7 @@
       </p:sp>
       <p:sp>
         <p:nvSpPr>
-          <p:cNvPr id="5" name="Footer Placeholder 4">
-            <a:extLst>
-              <a:ext uri="{FF2B5EF4-FFF2-40B4-BE49-F238E27FC236}">
-                <a16:creationId xmlns:a16="http://schemas.microsoft.com/office/drawing/2014/main" id="{FF8B04EF-E27F-F25B-9E8C-267FF21F3237}"/>
-              </a:ext>
-            </a:extLst>
-          </p:cNvPr>
+          <p:cNvPr id="5" name="Footer Placeholder 4"/>
           <p:cNvSpPr>
             <a:spLocks noGrp="1"/>
           </p:cNvSpPr>
@@ -704,13 +973,7 @@
       </p:sp>
       <p:sp>
         <p:nvSpPr>
-          <p:cNvPr id="6" name="Slide Number Placeholder 5">
-            <a:extLst>
-              <a:ext uri="{FF2B5EF4-FFF2-40B4-BE49-F238E27FC236}">
-                <a16:creationId xmlns:a16="http://schemas.microsoft.com/office/drawing/2014/main" id="{F5D987E7-AF12-2FCB-A065-D280DEED3284}"/>
-              </a:ext>
-            </a:extLst>
-          </p:cNvPr>
+          <p:cNvPr id="6" name="Slide Number Placeholder 5"/>
           <p:cNvSpPr>
             <a:spLocks noGrp="1"/>
           </p:cNvSpPr>
@@ -723,7 +986,7 @@
           <a:bodyPr/>
           <a:lstStyle/>
           <a:p>
-            <a:fld id="{01F534BD-476C-8E43-92CA-BAEB25A10DCA}" type="slidenum">
+            <a:fld id="{AA1227A9-2AB6-F04F-BB9E-1700E1EF1BD6}" type="slidenum">
               <a:rPr lang="en-GB" smtClean="0"/>
               <a:t>‹#›</a:t>
             </a:fld>
@@ -734,7 +997,7 @@
     </p:spTree>
     <p:extLst>
       <p:ext uri="{BB962C8B-B14F-4D97-AF65-F5344CB8AC3E}">
-        <p14:creationId xmlns:p14="http://schemas.microsoft.com/office/powerpoint/2010/main" val="2544242155"/>
+        <p14:creationId xmlns:p14="http://schemas.microsoft.com/office/powerpoint/2010/main" val="2624080101"/>
       </p:ext>
     </p:extLst>
   </p:cSld>
@@ -763,13 +1026,7 @@
       </p:grpSpPr>
       <p:sp>
         <p:nvSpPr>
-          <p:cNvPr id="2" name="Title 1">
-            <a:extLst>
-              <a:ext uri="{FF2B5EF4-FFF2-40B4-BE49-F238E27FC236}">
-                <a16:creationId xmlns:a16="http://schemas.microsoft.com/office/drawing/2014/main" id="{B9E7E5A1-3C63-EB93-9B16-8ACB4179F4CF}"/>
-              </a:ext>
-            </a:extLst>
-          </p:cNvPr>
+          <p:cNvPr id="2" name="Title 1"/>
           <p:cNvSpPr>
             <a:spLocks noGrp="1"/>
           </p:cNvSpPr>
@@ -786,19 +1043,13 @@
               <a:rPr lang="en-US"/>
               <a:t>Click to edit Master title style</a:t>
             </a:r>
-            <a:endParaRPr lang="en-GB"/>
-          </a:p>
-        </p:txBody>
-      </p:sp>
-      <p:sp>
-        <p:nvSpPr>
-          <p:cNvPr id="3" name="Content Placeholder 2">
-            <a:extLst>
-              <a:ext uri="{FF2B5EF4-FFF2-40B4-BE49-F238E27FC236}">
-                <a16:creationId xmlns:a16="http://schemas.microsoft.com/office/drawing/2014/main" id="{E8E0B8A0-A5D7-9C0A-A73E-5282EB729A61}"/>
-              </a:ext>
-            </a:extLst>
-          </p:cNvPr>
+            <a:endParaRPr lang="en-US" dirty="0"/>
+          </a:p>
+        </p:txBody>
+      </p:sp>
+      <p:sp>
+        <p:nvSpPr>
+          <p:cNvPr id="3" name="Content Placeholder 2"/>
           <p:cNvSpPr>
             <a:spLocks noGrp="1"/>
           </p:cNvSpPr>
@@ -844,19 +1095,13 @@
               <a:rPr lang="en-US"/>
               <a:t>Fifth level</a:t>
             </a:r>
-            <a:endParaRPr lang="en-GB"/>
-          </a:p>
-        </p:txBody>
-      </p:sp>
-      <p:sp>
-        <p:nvSpPr>
-          <p:cNvPr id="4" name="Date Placeholder 3">
-            <a:extLst>
-              <a:ext uri="{FF2B5EF4-FFF2-40B4-BE49-F238E27FC236}">
-                <a16:creationId xmlns:a16="http://schemas.microsoft.com/office/drawing/2014/main" id="{C0264FC6-6A9B-4BEA-D422-E524764A0F24}"/>
-              </a:ext>
-            </a:extLst>
-          </p:cNvPr>
+            <a:endParaRPr lang="en-US" dirty="0"/>
+          </a:p>
+        </p:txBody>
+      </p:sp>
+      <p:sp>
+        <p:nvSpPr>
+          <p:cNvPr id="4" name="Date Placeholder 3"/>
           <p:cNvSpPr>
             <a:spLocks noGrp="1"/>
           </p:cNvSpPr>
@@ -869,9 +1114,9 @@
           <a:bodyPr/>
           <a:lstStyle/>
           <a:p>
-            <a:fld id="{7B30820A-8422-C04B-BF82-4192FE414B2E}" type="datetimeFigureOut">
+            <a:fld id="{458478C2-303E-6247-B8F4-26DC85D2646A}" type="datetimeFigureOut">
               <a:rPr lang="en-GB" smtClean="0"/>
-              <a:t>26/04/2022</a:t>
+              <a:t>13/08/2022</a:t>
             </a:fld>
             <a:endParaRPr lang="en-GB"/>
           </a:p>
@@ -879,13 +1124,7 @@
       </p:sp>
       <p:sp>
         <p:nvSpPr>
-          <p:cNvPr id="5" name="Footer Placeholder 4">
-            <a:extLst>
-              <a:ext uri="{FF2B5EF4-FFF2-40B4-BE49-F238E27FC236}">
-                <a16:creationId xmlns:a16="http://schemas.microsoft.com/office/drawing/2014/main" id="{383C709C-74CA-BF2F-8783-EA002CA2F65F}"/>
-              </a:ext>
-            </a:extLst>
-          </p:cNvPr>
+          <p:cNvPr id="5" name="Footer Placeholder 4"/>
           <p:cNvSpPr>
             <a:spLocks noGrp="1"/>
           </p:cNvSpPr>
@@ -904,13 +1143,7 @@
       </p:sp>
       <p:sp>
         <p:nvSpPr>
-          <p:cNvPr id="6" name="Slide Number Placeholder 5">
-            <a:extLst>
-              <a:ext uri="{FF2B5EF4-FFF2-40B4-BE49-F238E27FC236}">
-                <a16:creationId xmlns:a16="http://schemas.microsoft.com/office/drawing/2014/main" id="{BEEAD53A-1B0F-5C50-3E17-0B28D86B65AF}"/>
-              </a:ext>
-            </a:extLst>
-          </p:cNvPr>
+          <p:cNvPr id="6" name="Slide Number Placeholder 5"/>
           <p:cNvSpPr>
             <a:spLocks noGrp="1"/>
           </p:cNvSpPr>
@@ -923,7 +1156,7 @@
           <a:bodyPr/>
           <a:lstStyle/>
           <a:p>
-            <a:fld id="{01F534BD-476C-8E43-92CA-BAEB25A10DCA}" type="slidenum">
+            <a:fld id="{AA1227A9-2AB6-F04F-BB9E-1700E1EF1BD6}" type="slidenum">
               <a:rPr lang="en-GB" smtClean="0"/>
               <a:t>‹#›</a:t>
             </a:fld>
@@ -934,7 +1167,7 @@
     </p:spTree>
     <p:extLst>
       <p:ext uri="{BB962C8B-B14F-4D97-AF65-F5344CB8AC3E}">
-        <p14:creationId xmlns:p14="http://schemas.microsoft.com/office/powerpoint/2010/main" val="588410440"/>
+        <p14:creationId xmlns:p14="http://schemas.microsoft.com/office/powerpoint/2010/main" val="1024493276"/>
       </p:ext>
     </p:extLst>
   </p:cSld>
@@ -963,13 +1196,7 @@
       </p:grpSpPr>
       <p:sp>
         <p:nvSpPr>
-          <p:cNvPr id="2" name="Title 1">
-            <a:extLst>
-              <a:ext uri="{FF2B5EF4-FFF2-40B4-BE49-F238E27FC236}">
-                <a16:creationId xmlns:a16="http://schemas.microsoft.com/office/drawing/2014/main" id="{05D7150B-DDA3-0080-9522-1D10C2774A23}"/>
-              </a:ext>
-            </a:extLst>
-          </p:cNvPr>
+          <p:cNvPr id="2" name="Title 1"/>
           <p:cNvSpPr>
             <a:spLocks noGrp="1"/>
           </p:cNvSpPr>
@@ -979,15 +1206,15 @@
         </p:nvSpPr>
         <p:spPr>
           <a:xfrm>
-            <a:off x="831850" y="1709738"/>
-            <a:ext cx="10515600" cy="2852737"/>
+            <a:off x="967026" y="569913"/>
+            <a:ext cx="12224385" cy="950912"/>
           </a:xfrm>
         </p:spPr>
         <p:txBody>
           <a:bodyPr anchor="b"/>
           <a:lstStyle>
             <a:lvl1pPr>
-              <a:defRPr sz="6000"/>
+              <a:defRPr sz="2000"/>
             </a:lvl1pPr>
           </a:lstStyle>
           <a:p>
@@ -995,19 +1222,13 @@
               <a:rPr lang="en-US"/>
               <a:t>Click to edit Master title style</a:t>
             </a:r>
-            <a:endParaRPr lang="en-GB"/>
-          </a:p>
-        </p:txBody>
-      </p:sp>
-      <p:sp>
-        <p:nvSpPr>
-          <p:cNvPr id="3" name="Text Placeholder 2">
-            <a:extLst>
-              <a:ext uri="{FF2B5EF4-FFF2-40B4-BE49-F238E27FC236}">
-                <a16:creationId xmlns:a16="http://schemas.microsoft.com/office/drawing/2014/main" id="{0915254F-6ACA-6BB4-2FED-B50871A9C9FD}"/>
-              </a:ext>
-            </a:extLst>
-          </p:cNvPr>
+            <a:endParaRPr lang="en-US" dirty="0"/>
+          </a:p>
+        </p:txBody>
+      </p:sp>
+      <p:sp>
+        <p:nvSpPr>
+          <p:cNvPr id="3" name="Text Placeholder 2"/>
           <p:cNvSpPr>
             <a:spLocks noGrp="1"/>
           </p:cNvSpPr>
@@ -1017,8 +1238,8 @@
         </p:nvSpPr>
         <p:spPr>
           <a:xfrm>
-            <a:off x="831850" y="4589463"/>
-            <a:ext cx="10515600" cy="1500187"/>
+            <a:off x="967026" y="1529821"/>
+            <a:ext cx="12224385" cy="500062"/>
           </a:xfrm>
         </p:spPr>
         <p:txBody>
@@ -1026,7 +1247,7 @@
           <a:lstStyle>
             <a:lvl1pPr marL="0" indent="0">
               <a:buNone/>
-              <a:defRPr sz="2400">
+              <a:defRPr sz="800">
                 <a:solidFill>
                   <a:schemeClr val="tx1">
                     <a:tint val="75000"/>
@@ -1034,9 +1255,9 @@
                 </a:solidFill>
               </a:defRPr>
             </a:lvl1pPr>
-            <a:lvl2pPr marL="457200" indent="0">
-              <a:buNone/>
-              <a:defRPr sz="2000">
+            <a:lvl2pPr marL="152385" indent="0">
+              <a:buNone/>
+              <a:defRPr sz="667">
                 <a:solidFill>
                   <a:schemeClr val="tx1">
                     <a:tint val="75000"/>
@@ -1044,9 +1265,9 @@
                 </a:solidFill>
               </a:defRPr>
             </a:lvl2pPr>
-            <a:lvl3pPr marL="914400" indent="0">
-              <a:buNone/>
-              <a:defRPr sz="1800">
+            <a:lvl3pPr marL="304770" indent="0">
+              <a:buNone/>
+              <a:defRPr sz="600">
                 <a:solidFill>
                   <a:schemeClr val="tx1">
                     <a:tint val="75000"/>
@@ -1054,9 +1275,9 @@
                 </a:solidFill>
               </a:defRPr>
             </a:lvl3pPr>
-            <a:lvl4pPr marL="1371600" indent="0">
-              <a:buNone/>
-              <a:defRPr sz="1600">
+            <a:lvl4pPr marL="457154" indent="0">
+              <a:buNone/>
+              <a:defRPr sz="533">
                 <a:solidFill>
                   <a:schemeClr val="tx1">
                     <a:tint val="75000"/>
@@ -1064,9 +1285,9 @@
                 </a:solidFill>
               </a:defRPr>
             </a:lvl4pPr>
-            <a:lvl5pPr marL="1828800" indent="0">
-              <a:buNone/>
-              <a:defRPr sz="1600">
+            <a:lvl5pPr marL="609539" indent="0">
+              <a:buNone/>
+              <a:defRPr sz="533">
                 <a:solidFill>
                   <a:schemeClr val="tx1">
                     <a:tint val="75000"/>
@@ -1074,9 +1295,9 @@
                 </a:solidFill>
               </a:defRPr>
             </a:lvl5pPr>
-            <a:lvl6pPr marL="2286000" indent="0">
-              <a:buNone/>
-              <a:defRPr sz="1600">
+            <a:lvl6pPr marL="761924" indent="0">
+              <a:buNone/>
+              <a:defRPr sz="533">
                 <a:solidFill>
                   <a:schemeClr val="tx1">
                     <a:tint val="75000"/>
@@ -1084,9 +1305,9 @@
                 </a:solidFill>
               </a:defRPr>
             </a:lvl6pPr>
-            <a:lvl7pPr marL="2743200" indent="0">
-              <a:buNone/>
-              <a:defRPr sz="1600">
+            <a:lvl7pPr marL="914309" indent="0">
+              <a:buNone/>
+              <a:defRPr sz="533">
                 <a:solidFill>
                   <a:schemeClr val="tx1">
                     <a:tint val="75000"/>
@@ -1094,9 +1315,9 @@
                 </a:solidFill>
               </a:defRPr>
             </a:lvl7pPr>
-            <a:lvl8pPr marL="3200400" indent="0">
-              <a:buNone/>
-              <a:defRPr sz="1600">
+            <a:lvl8pPr marL="1066693" indent="0">
+              <a:buNone/>
+              <a:defRPr sz="533">
                 <a:solidFill>
                   <a:schemeClr val="tx1">
                     <a:tint val="75000"/>
@@ -1104,9 +1325,9 @@
                 </a:solidFill>
               </a:defRPr>
             </a:lvl8pPr>
-            <a:lvl9pPr marL="3657600" indent="0">
-              <a:buNone/>
-              <a:defRPr sz="1600">
+            <a:lvl9pPr marL="1219078" indent="0">
+              <a:buNone/>
+              <a:defRPr sz="533">
                 <a:solidFill>
                   <a:schemeClr val="tx1">
                     <a:tint val="75000"/>
@@ -1126,13 +1347,7 @@
       </p:sp>
       <p:sp>
         <p:nvSpPr>
-          <p:cNvPr id="4" name="Date Placeholder 3">
-            <a:extLst>
-              <a:ext uri="{FF2B5EF4-FFF2-40B4-BE49-F238E27FC236}">
-                <a16:creationId xmlns:a16="http://schemas.microsoft.com/office/drawing/2014/main" id="{E79AC195-737C-1B45-A1F4-2024C49B2A6D}"/>
-              </a:ext>
-            </a:extLst>
-          </p:cNvPr>
+          <p:cNvPr id="4" name="Date Placeholder 3"/>
           <p:cNvSpPr>
             <a:spLocks noGrp="1"/>
           </p:cNvSpPr>
@@ -1145,9 +1360,9 @@
           <a:bodyPr/>
           <a:lstStyle/>
           <a:p>
-            <a:fld id="{7B30820A-8422-C04B-BF82-4192FE414B2E}" type="datetimeFigureOut">
+            <a:fld id="{458478C2-303E-6247-B8F4-26DC85D2646A}" type="datetimeFigureOut">
               <a:rPr lang="en-GB" smtClean="0"/>
-              <a:t>26/04/2022</a:t>
+              <a:t>13/08/2022</a:t>
             </a:fld>
             <a:endParaRPr lang="en-GB"/>
           </a:p>
@@ -1155,13 +1370,7 @@
       </p:sp>
       <p:sp>
         <p:nvSpPr>
-          <p:cNvPr id="5" name="Footer Placeholder 4">
-            <a:extLst>
-              <a:ext uri="{FF2B5EF4-FFF2-40B4-BE49-F238E27FC236}">
-                <a16:creationId xmlns:a16="http://schemas.microsoft.com/office/drawing/2014/main" id="{78A6A3C2-9854-02F1-5912-C3CB6C5E6B01}"/>
-              </a:ext>
-            </a:extLst>
-          </p:cNvPr>
+          <p:cNvPr id="5" name="Footer Placeholder 4"/>
           <p:cNvSpPr>
             <a:spLocks noGrp="1"/>
           </p:cNvSpPr>
@@ -1180,13 +1389,7 @@
       </p:sp>
       <p:sp>
         <p:nvSpPr>
-          <p:cNvPr id="6" name="Slide Number Placeholder 5">
-            <a:extLst>
-              <a:ext uri="{FF2B5EF4-FFF2-40B4-BE49-F238E27FC236}">
-                <a16:creationId xmlns:a16="http://schemas.microsoft.com/office/drawing/2014/main" id="{D2A44442-A6EA-2251-1323-24CE2C42F8FC}"/>
-              </a:ext>
-            </a:extLst>
-          </p:cNvPr>
+          <p:cNvPr id="6" name="Slide Number Placeholder 5"/>
           <p:cNvSpPr>
             <a:spLocks noGrp="1"/>
           </p:cNvSpPr>
@@ -1199,7 +1402,7 @@
           <a:bodyPr/>
           <a:lstStyle/>
           <a:p>
-            <a:fld id="{01F534BD-476C-8E43-92CA-BAEB25A10DCA}" type="slidenum">
+            <a:fld id="{AA1227A9-2AB6-F04F-BB9E-1700E1EF1BD6}" type="slidenum">
               <a:rPr lang="en-GB" smtClean="0"/>
               <a:t>‹#›</a:t>
             </a:fld>
@@ -1210,7 +1413,7 @@
     </p:spTree>
     <p:extLst>
       <p:ext uri="{BB962C8B-B14F-4D97-AF65-F5344CB8AC3E}">
-        <p14:creationId xmlns:p14="http://schemas.microsoft.com/office/powerpoint/2010/main" val="4171259589"/>
+        <p14:creationId xmlns:p14="http://schemas.microsoft.com/office/powerpoint/2010/main" val="1720690542"/>
       </p:ext>
     </p:extLst>
   </p:cSld>
@@ -1239,13 +1442,7 @@
       </p:grpSpPr>
       <p:sp>
         <p:nvSpPr>
-          <p:cNvPr id="2" name="Title 1">
-            <a:extLst>
-              <a:ext uri="{FF2B5EF4-FFF2-40B4-BE49-F238E27FC236}">
-                <a16:creationId xmlns:a16="http://schemas.microsoft.com/office/drawing/2014/main" id="{9012BD48-8919-F790-E12A-78784005D522}"/>
-              </a:ext>
-            </a:extLst>
-          </p:cNvPr>
+          <p:cNvPr id="2" name="Title 1"/>
           <p:cNvSpPr>
             <a:spLocks noGrp="1"/>
           </p:cNvSpPr>
@@ -1262,19 +1459,13 @@
               <a:rPr lang="en-US"/>
               <a:t>Click to edit Master title style</a:t>
             </a:r>
-            <a:endParaRPr lang="en-GB"/>
-          </a:p>
-        </p:txBody>
-      </p:sp>
-      <p:sp>
-        <p:nvSpPr>
-          <p:cNvPr id="3" name="Content Placeholder 2">
-            <a:extLst>
-              <a:ext uri="{FF2B5EF4-FFF2-40B4-BE49-F238E27FC236}">
-                <a16:creationId xmlns:a16="http://schemas.microsoft.com/office/drawing/2014/main" id="{2891FB6F-EDE5-3351-BA9B-C5E23B7842B8}"/>
-              </a:ext>
-            </a:extLst>
-          </p:cNvPr>
+            <a:endParaRPr lang="en-US" dirty="0"/>
+          </a:p>
+        </p:txBody>
+      </p:sp>
+      <p:sp>
+        <p:nvSpPr>
+          <p:cNvPr id="3" name="Content Placeholder 2"/>
           <p:cNvSpPr>
             <a:spLocks noGrp="1"/>
           </p:cNvSpPr>
@@ -1284,8 +1475,8 @@
         </p:nvSpPr>
         <p:spPr>
           <a:xfrm>
-            <a:off x="838200" y="1825625"/>
-            <a:ext cx="5181600" cy="4351338"/>
+            <a:off x="974408" y="608542"/>
+            <a:ext cx="6023610" cy="1450446"/>
           </a:xfrm>
         </p:spPr>
         <p:txBody>
@@ -1325,19 +1516,13 @@
               <a:rPr lang="en-US"/>
               <a:t>Fifth level</a:t>
             </a:r>
-            <a:endParaRPr lang="en-GB"/>
-          </a:p>
-        </p:txBody>
-      </p:sp>
-      <p:sp>
-        <p:nvSpPr>
-          <p:cNvPr id="4" name="Content Placeholder 3">
-            <a:extLst>
-              <a:ext uri="{FF2B5EF4-FFF2-40B4-BE49-F238E27FC236}">
-                <a16:creationId xmlns:a16="http://schemas.microsoft.com/office/drawing/2014/main" id="{21CDDBED-6A3C-FEA3-DCDC-D18F9F5CF025}"/>
-              </a:ext>
-            </a:extLst>
-          </p:cNvPr>
+            <a:endParaRPr lang="en-US" dirty="0"/>
+          </a:p>
+        </p:txBody>
+      </p:sp>
+      <p:sp>
+        <p:nvSpPr>
+          <p:cNvPr id="4" name="Content Placeholder 3"/>
           <p:cNvSpPr>
             <a:spLocks noGrp="1"/>
           </p:cNvSpPr>
@@ -1347,8 +1532,8 @@
         </p:nvSpPr>
         <p:spPr>
           <a:xfrm>
-            <a:off x="6172200" y="1825625"/>
-            <a:ext cx="5181600" cy="4351338"/>
+            <a:off x="7175183" y="608542"/>
+            <a:ext cx="6023610" cy="1450446"/>
           </a:xfrm>
         </p:spPr>
         <p:txBody>
@@ -1388,19 +1573,13 @@
               <a:rPr lang="en-US"/>
               <a:t>Fifth level</a:t>
             </a:r>
-            <a:endParaRPr lang="en-GB"/>
-          </a:p>
-        </p:txBody>
-      </p:sp>
-      <p:sp>
-        <p:nvSpPr>
-          <p:cNvPr id="5" name="Date Placeholder 4">
-            <a:extLst>
-              <a:ext uri="{FF2B5EF4-FFF2-40B4-BE49-F238E27FC236}">
-                <a16:creationId xmlns:a16="http://schemas.microsoft.com/office/drawing/2014/main" id="{25E37D72-C098-B424-8FE2-8D2DCA73C8B9}"/>
-              </a:ext>
-            </a:extLst>
-          </p:cNvPr>
+            <a:endParaRPr lang="en-US" dirty="0"/>
+          </a:p>
+        </p:txBody>
+      </p:sp>
+      <p:sp>
+        <p:nvSpPr>
+          <p:cNvPr id="5" name="Date Placeholder 4"/>
           <p:cNvSpPr>
             <a:spLocks noGrp="1"/>
           </p:cNvSpPr>
@@ -1413,9 +1592,9 @@
           <a:bodyPr/>
           <a:lstStyle/>
           <a:p>
-            <a:fld id="{7B30820A-8422-C04B-BF82-4192FE414B2E}" type="datetimeFigureOut">
+            <a:fld id="{458478C2-303E-6247-B8F4-26DC85D2646A}" type="datetimeFigureOut">
               <a:rPr lang="en-GB" smtClean="0"/>
-              <a:t>26/04/2022</a:t>
+              <a:t>13/08/2022</a:t>
             </a:fld>
             <a:endParaRPr lang="en-GB"/>
           </a:p>
@@ -1423,13 +1602,7 @@
       </p:sp>
       <p:sp>
         <p:nvSpPr>
-          <p:cNvPr id="6" name="Footer Placeholder 5">
-            <a:extLst>
-              <a:ext uri="{FF2B5EF4-FFF2-40B4-BE49-F238E27FC236}">
-                <a16:creationId xmlns:a16="http://schemas.microsoft.com/office/drawing/2014/main" id="{01391238-22B4-A981-AC6D-1B50C95E3384}"/>
-              </a:ext>
-            </a:extLst>
-          </p:cNvPr>
+          <p:cNvPr id="6" name="Footer Placeholder 5"/>
           <p:cNvSpPr>
             <a:spLocks noGrp="1"/>
           </p:cNvSpPr>
@@ -1448,13 +1621,7 @@
       </p:sp>
       <p:sp>
         <p:nvSpPr>
-          <p:cNvPr id="7" name="Slide Number Placeholder 6">
-            <a:extLst>
-              <a:ext uri="{FF2B5EF4-FFF2-40B4-BE49-F238E27FC236}">
-                <a16:creationId xmlns:a16="http://schemas.microsoft.com/office/drawing/2014/main" id="{F6F88CCB-CBAD-DD73-B32B-9C665DE0DDEB}"/>
-              </a:ext>
-            </a:extLst>
-          </p:cNvPr>
+          <p:cNvPr id="7" name="Slide Number Placeholder 6"/>
           <p:cNvSpPr>
             <a:spLocks noGrp="1"/>
           </p:cNvSpPr>
@@ -1467,7 +1634,7 @@
           <a:bodyPr/>
           <a:lstStyle/>
           <a:p>
-            <a:fld id="{01F534BD-476C-8E43-92CA-BAEB25A10DCA}" type="slidenum">
+            <a:fld id="{AA1227A9-2AB6-F04F-BB9E-1700E1EF1BD6}" type="slidenum">
               <a:rPr lang="en-GB" smtClean="0"/>
               <a:t>‹#›</a:t>
             </a:fld>
@@ -1478,7 +1645,7 @@
     </p:spTree>
     <p:extLst>
       <p:ext uri="{BB962C8B-B14F-4D97-AF65-F5344CB8AC3E}">
-        <p14:creationId xmlns:p14="http://schemas.microsoft.com/office/powerpoint/2010/main" val="641879682"/>
+        <p14:creationId xmlns:p14="http://schemas.microsoft.com/office/powerpoint/2010/main" val="2696489889"/>
       </p:ext>
     </p:extLst>
   </p:cSld>
@@ -1507,13 +1674,7 @@
       </p:grpSpPr>
       <p:sp>
         <p:nvSpPr>
-          <p:cNvPr id="2" name="Title 1">
-            <a:extLst>
-              <a:ext uri="{FF2B5EF4-FFF2-40B4-BE49-F238E27FC236}">
-                <a16:creationId xmlns:a16="http://schemas.microsoft.com/office/drawing/2014/main" id="{DE1FC1B6-B7B8-DFC6-DD98-48A4CFDFD18F}"/>
-              </a:ext>
-            </a:extLst>
-          </p:cNvPr>
+          <p:cNvPr id="2" name="Title 1"/>
           <p:cNvSpPr>
             <a:spLocks noGrp="1"/>
           </p:cNvSpPr>
@@ -1523,8 +1684,8 @@
         </p:nvSpPr>
         <p:spPr>
           <a:xfrm>
-            <a:off x="839788" y="365125"/>
-            <a:ext cx="10515600" cy="1325563"/>
+            <a:off x="976254" y="121709"/>
+            <a:ext cx="12224385" cy="441854"/>
           </a:xfrm>
         </p:spPr>
         <p:txBody>
@@ -1535,19 +1696,13 @@
               <a:rPr lang="en-US"/>
               <a:t>Click to edit Master title style</a:t>
             </a:r>
-            <a:endParaRPr lang="en-GB"/>
-          </a:p>
-        </p:txBody>
-      </p:sp>
-      <p:sp>
-        <p:nvSpPr>
-          <p:cNvPr id="3" name="Text Placeholder 2">
-            <a:extLst>
-              <a:ext uri="{FF2B5EF4-FFF2-40B4-BE49-F238E27FC236}">
-                <a16:creationId xmlns:a16="http://schemas.microsoft.com/office/drawing/2014/main" id="{61E260A9-A44B-F21A-BA02-4771F3C7802A}"/>
-              </a:ext>
-            </a:extLst>
-          </p:cNvPr>
+            <a:endParaRPr lang="en-US" dirty="0"/>
+          </a:p>
+        </p:txBody>
+      </p:sp>
+      <p:sp>
+        <p:nvSpPr>
+          <p:cNvPr id="3" name="Text Placeholder 2"/>
           <p:cNvSpPr>
             <a:spLocks noGrp="1"/>
           </p:cNvSpPr>
@@ -1557,8 +1712,8 @@
         </p:nvSpPr>
         <p:spPr>
           <a:xfrm>
-            <a:off x="839788" y="1681163"/>
-            <a:ext cx="5157787" cy="823912"/>
+            <a:off x="976254" y="560388"/>
+            <a:ext cx="5995927" cy="274637"/>
           </a:xfrm>
         </p:spPr>
         <p:txBody>
@@ -1566,39 +1721,39 @@
           <a:lstStyle>
             <a:lvl1pPr marL="0" indent="0">
               <a:buNone/>
-              <a:defRPr sz="2400" b="1"/>
+              <a:defRPr sz="800" b="1"/>
             </a:lvl1pPr>
-            <a:lvl2pPr marL="457200" indent="0">
-              <a:buNone/>
-              <a:defRPr sz="2000" b="1"/>
+            <a:lvl2pPr marL="152385" indent="0">
+              <a:buNone/>
+              <a:defRPr sz="667" b="1"/>
             </a:lvl2pPr>
-            <a:lvl3pPr marL="914400" indent="0">
-              <a:buNone/>
-              <a:defRPr sz="1800" b="1"/>
+            <a:lvl3pPr marL="304770" indent="0">
+              <a:buNone/>
+              <a:defRPr sz="600" b="1"/>
             </a:lvl3pPr>
-            <a:lvl4pPr marL="1371600" indent="0">
-              <a:buNone/>
-              <a:defRPr sz="1600" b="1"/>
+            <a:lvl4pPr marL="457154" indent="0">
+              <a:buNone/>
+              <a:defRPr sz="533" b="1"/>
             </a:lvl4pPr>
-            <a:lvl5pPr marL="1828800" indent="0">
-              <a:buNone/>
-              <a:defRPr sz="1600" b="1"/>
+            <a:lvl5pPr marL="609539" indent="0">
+              <a:buNone/>
+              <a:defRPr sz="533" b="1"/>
             </a:lvl5pPr>
-            <a:lvl6pPr marL="2286000" indent="0">
-              <a:buNone/>
-              <a:defRPr sz="1600" b="1"/>
+            <a:lvl6pPr marL="761924" indent="0">
+              <a:buNone/>
+              <a:defRPr sz="533" b="1"/>
             </a:lvl6pPr>
-            <a:lvl7pPr marL="2743200" indent="0">
-              <a:buNone/>
-              <a:defRPr sz="1600" b="1"/>
+            <a:lvl7pPr marL="914309" indent="0">
+              <a:buNone/>
+              <a:defRPr sz="533" b="1"/>
             </a:lvl7pPr>
-            <a:lvl8pPr marL="3200400" indent="0">
-              <a:buNone/>
-              <a:defRPr sz="1600" b="1"/>
+            <a:lvl8pPr marL="1066693" indent="0">
+              <a:buNone/>
+              <a:defRPr sz="533" b="1"/>
             </a:lvl8pPr>
-            <a:lvl9pPr marL="3657600" indent="0">
-              <a:buNone/>
-              <a:defRPr sz="1600" b="1"/>
+            <a:lvl9pPr marL="1219078" indent="0">
+              <a:buNone/>
+              <a:defRPr sz="533" b="1"/>
             </a:lvl9pPr>
           </a:lstStyle>
           <a:p>
@@ -1612,13 +1767,7 @@
       </p:sp>
       <p:sp>
         <p:nvSpPr>
-          <p:cNvPr id="4" name="Content Placeholder 3">
-            <a:extLst>
-              <a:ext uri="{FF2B5EF4-FFF2-40B4-BE49-F238E27FC236}">
-                <a16:creationId xmlns:a16="http://schemas.microsoft.com/office/drawing/2014/main" id="{00A70A04-6B36-4EA7-2C08-D172106FFA67}"/>
-              </a:ext>
-            </a:extLst>
-          </p:cNvPr>
+          <p:cNvPr id="4" name="Content Placeholder 3"/>
           <p:cNvSpPr>
             <a:spLocks noGrp="1"/>
           </p:cNvSpPr>
@@ -1628,8 +1777,8 @@
         </p:nvSpPr>
         <p:spPr>
           <a:xfrm>
-            <a:off x="839788" y="2505075"/>
-            <a:ext cx="5157787" cy="3684588"/>
+            <a:off x="976254" y="835025"/>
+            <a:ext cx="5995927" cy="1228196"/>
           </a:xfrm>
         </p:spPr>
         <p:txBody>
@@ -1669,19 +1818,13 @@
               <a:rPr lang="en-US"/>
               <a:t>Fifth level</a:t>
             </a:r>
-            <a:endParaRPr lang="en-GB"/>
-          </a:p>
-        </p:txBody>
-      </p:sp>
-      <p:sp>
-        <p:nvSpPr>
-          <p:cNvPr id="5" name="Text Placeholder 4">
-            <a:extLst>
-              <a:ext uri="{FF2B5EF4-FFF2-40B4-BE49-F238E27FC236}">
-                <a16:creationId xmlns:a16="http://schemas.microsoft.com/office/drawing/2014/main" id="{1061C8B2-90C4-596B-4C96-01D8B7CE7D24}"/>
-              </a:ext>
-            </a:extLst>
-          </p:cNvPr>
+            <a:endParaRPr lang="en-US" dirty="0"/>
+          </a:p>
+        </p:txBody>
+      </p:sp>
+      <p:sp>
+        <p:nvSpPr>
+          <p:cNvPr id="5" name="Text Placeholder 4"/>
           <p:cNvSpPr>
             <a:spLocks noGrp="1"/>
           </p:cNvSpPr>
@@ -1691,8 +1834,8 @@
         </p:nvSpPr>
         <p:spPr>
           <a:xfrm>
-            <a:off x="6172200" y="1681163"/>
-            <a:ext cx="5183188" cy="823912"/>
+            <a:off x="7175183" y="560388"/>
+            <a:ext cx="6025456" cy="274637"/>
           </a:xfrm>
         </p:spPr>
         <p:txBody>
@@ -1700,39 +1843,39 @@
           <a:lstStyle>
             <a:lvl1pPr marL="0" indent="0">
               <a:buNone/>
-              <a:defRPr sz="2400" b="1"/>
+              <a:defRPr sz="800" b="1"/>
             </a:lvl1pPr>
-            <a:lvl2pPr marL="457200" indent="0">
-              <a:buNone/>
-              <a:defRPr sz="2000" b="1"/>
+            <a:lvl2pPr marL="152385" indent="0">
+              <a:buNone/>
+              <a:defRPr sz="667" b="1"/>
             </a:lvl2pPr>
-            <a:lvl3pPr marL="914400" indent="0">
-              <a:buNone/>
-              <a:defRPr sz="1800" b="1"/>
+            <a:lvl3pPr marL="304770" indent="0">
+              <a:buNone/>
+              <a:defRPr sz="600" b="1"/>
             </a:lvl3pPr>
-            <a:lvl4pPr marL="1371600" indent="0">
-              <a:buNone/>
-              <a:defRPr sz="1600" b="1"/>
+            <a:lvl4pPr marL="457154" indent="0">
+              <a:buNone/>
+              <a:defRPr sz="533" b="1"/>
             </a:lvl4pPr>
-            <a:lvl5pPr marL="1828800" indent="0">
-              <a:buNone/>
-              <a:defRPr sz="1600" b="1"/>
+            <a:lvl5pPr marL="609539" indent="0">
+              <a:buNone/>
+              <a:defRPr sz="533" b="1"/>
             </a:lvl5pPr>
-            <a:lvl6pPr marL="2286000" indent="0">
-              <a:buNone/>
-              <a:defRPr sz="1600" b="1"/>
+            <a:lvl6pPr marL="761924" indent="0">
+              <a:buNone/>
+              <a:defRPr sz="533" b="1"/>
             </a:lvl6pPr>
-            <a:lvl7pPr marL="2743200" indent="0">
-              <a:buNone/>
-              <a:defRPr sz="1600" b="1"/>
+            <a:lvl7pPr marL="914309" indent="0">
+              <a:buNone/>
+              <a:defRPr sz="533" b="1"/>
             </a:lvl7pPr>
-            <a:lvl8pPr marL="3200400" indent="0">
-              <a:buNone/>
-              <a:defRPr sz="1600" b="1"/>
+            <a:lvl8pPr marL="1066693" indent="0">
+              <a:buNone/>
+              <a:defRPr sz="533" b="1"/>
             </a:lvl8pPr>
-            <a:lvl9pPr marL="3657600" indent="0">
-              <a:buNone/>
-              <a:defRPr sz="1600" b="1"/>
+            <a:lvl9pPr marL="1219078" indent="0">
+              <a:buNone/>
+              <a:defRPr sz="533" b="1"/>
             </a:lvl9pPr>
           </a:lstStyle>
           <a:p>
@@ -1746,13 +1889,7 @@
       </p:sp>
       <p:sp>
         <p:nvSpPr>
-          <p:cNvPr id="6" name="Content Placeholder 5">
-            <a:extLst>
-              <a:ext uri="{FF2B5EF4-FFF2-40B4-BE49-F238E27FC236}">
-                <a16:creationId xmlns:a16="http://schemas.microsoft.com/office/drawing/2014/main" id="{98F75EDA-B59C-BA8C-1F2E-F67CC707878D}"/>
-              </a:ext>
-            </a:extLst>
-          </p:cNvPr>
+          <p:cNvPr id="6" name="Content Placeholder 5"/>
           <p:cNvSpPr>
             <a:spLocks noGrp="1"/>
           </p:cNvSpPr>
@@ -1762,8 +1899,8 @@
         </p:nvSpPr>
         <p:spPr>
           <a:xfrm>
-            <a:off x="6172200" y="2505075"/>
-            <a:ext cx="5183188" cy="3684588"/>
+            <a:off x="7175183" y="835025"/>
+            <a:ext cx="6025456" cy="1228196"/>
           </a:xfrm>
         </p:spPr>
         <p:txBody>
@@ -1803,19 +1940,13 @@
               <a:rPr lang="en-US"/>
               <a:t>Fifth level</a:t>
             </a:r>
-            <a:endParaRPr lang="en-GB"/>
-          </a:p>
-        </p:txBody>
-      </p:sp>
-      <p:sp>
-        <p:nvSpPr>
-          <p:cNvPr id="7" name="Date Placeholder 6">
-            <a:extLst>
-              <a:ext uri="{FF2B5EF4-FFF2-40B4-BE49-F238E27FC236}">
-                <a16:creationId xmlns:a16="http://schemas.microsoft.com/office/drawing/2014/main" id="{113A532C-AF7E-B356-F08B-DCE7174B3BCC}"/>
-              </a:ext>
-            </a:extLst>
-          </p:cNvPr>
+            <a:endParaRPr lang="en-US" dirty="0"/>
+          </a:p>
+        </p:txBody>
+      </p:sp>
+      <p:sp>
+        <p:nvSpPr>
+          <p:cNvPr id="7" name="Date Placeholder 6"/>
           <p:cNvSpPr>
             <a:spLocks noGrp="1"/>
           </p:cNvSpPr>
@@ -1828,9 +1959,9 @@
           <a:bodyPr/>
           <a:lstStyle/>
           <a:p>
-            <a:fld id="{7B30820A-8422-C04B-BF82-4192FE414B2E}" type="datetimeFigureOut">
+            <a:fld id="{458478C2-303E-6247-B8F4-26DC85D2646A}" type="datetimeFigureOut">
               <a:rPr lang="en-GB" smtClean="0"/>
-              <a:t>26/04/2022</a:t>
+              <a:t>13/08/2022</a:t>
             </a:fld>
             <a:endParaRPr lang="en-GB"/>
           </a:p>
@@ -1838,13 +1969,7 @@
       </p:sp>
       <p:sp>
         <p:nvSpPr>
-          <p:cNvPr id="8" name="Footer Placeholder 7">
-            <a:extLst>
-              <a:ext uri="{FF2B5EF4-FFF2-40B4-BE49-F238E27FC236}">
-                <a16:creationId xmlns:a16="http://schemas.microsoft.com/office/drawing/2014/main" id="{1E56AD77-FD22-E845-BDFC-FE52CD1E37AB}"/>
-              </a:ext>
-            </a:extLst>
-          </p:cNvPr>
+          <p:cNvPr id="8" name="Footer Placeholder 7"/>
           <p:cNvSpPr>
             <a:spLocks noGrp="1"/>
           </p:cNvSpPr>
@@ -1863,13 +1988,7 @@
       </p:sp>
       <p:sp>
         <p:nvSpPr>
-          <p:cNvPr id="9" name="Slide Number Placeholder 8">
-            <a:extLst>
-              <a:ext uri="{FF2B5EF4-FFF2-40B4-BE49-F238E27FC236}">
-                <a16:creationId xmlns:a16="http://schemas.microsoft.com/office/drawing/2014/main" id="{8FFEF6E5-68B2-EE18-318B-1E09DDBE0494}"/>
-              </a:ext>
-            </a:extLst>
-          </p:cNvPr>
+          <p:cNvPr id="9" name="Slide Number Placeholder 8"/>
           <p:cNvSpPr>
             <a:spLocks noGrp="1"/>
           </p:cNvSpPr>
@@ -1882,7 +2001,7 @@
           <a:bodyPr/>
           <a:lstStyle/>
           <a:p>
-            <a:fld id="{01F534BD-476C-8E43-92CA-BAEB25A10DCA}" type="slidenum">
+            <a:fld id="{AA1227A9-2AB6-F04F-BB9E-1700E1EF1BD6}" type="slidenum">
               <a:rPr lang="en-GB" smtClean="0"/>
               <a:t>‹#›</a:t>
             </a:fld>
@@ -1893,7 +2012,7 @@
     </p:spTree>
     <p:extLst>
       <p:ext uri="{BB962C8B-B14F-4D97-AF65-F5344CB8AC3E}">
-        <p14:creationId xmlns:p14="http://schemas.microsoft.com/office/powerpoint/2010/main" val="76682811"/>
+        <p14:creationId xmlns:p14="http://schemas.microsoft.com/office/powerpoint/2010/main" val="3366689005"/>
       </p:ext>
     </p:extLst>
   </p:cSld>
@@ -1922,13 +2041,7 @@
       </p:grpSpPr>
       <p:sp>
         <p:nvSpPr>
-          <p:cNvPr id="2" name="Title 1">
-            <a:extLst>
-              <a:ext uri="{FF2B5EF4-FFF2-40B4-BE49-F238E27FC236}">
-                <a16:creationId xmlns:a16="http://schemas.microsoft.com/office/drawing/2014/main" id="{26A6AEA3-C356-B702-9AF6-5210AB503343}"/>
-              </a:ext>
-            </a:extLst>
-          </p:cNvPr>
+          <p:cNvPr id="2" name="Title 1"/>
           <p:cNvSpPr>
             <a:spLocks noGrp="1"/>
           </p:cNvSpPr>
@@ -1945,19 +2058,13 @@
               <a:rPr lang="en-US"/>
               <a:t>Click to edit Master title style</a:t>
             </a:r>
-            <a:endParaRPr lang="en-GB"/>
-          </a:p>
-        </p:txBody>
-      </p:sp>
-      <p:sp>
-        <p:nvSpPr>
-          <p:cNvPr id="3" name="Date Placeholder 2">
-            <a:extLst>
-              <a:ext uri="{FF2B5EF4-FFF2-40B4-BE49-F238E27FC236}">
-                <a16:creationId xmlns:a16="http://schemas.microsoft.com/office/drawing/2014/main" id="{A91E55FC-E265-C1AE-AFD1-54D3E107472C}"/>
-              </a:ext>
-            </a:extLst>
-          </p:cNvPr>
+            <a:endParaRPr lang="en-US" dirty="0"/>
+          </a:p>
+        </p:txBody>
+      </p:sp>
+      <p:sp>
+        <p:nvSpPr>
+          <p:cNvPr id="3" name="Date Placeholder 2"/>
           <p:cNvSpPr>
             <a:spLocks noGrp="1"/>
           </p:cNvSpPr>
@@ -1970,9 +2077,9 @@
           <a:bodyPr/>
           <a:lstStyle/>
           <a:p>
-            <a:fld id="{7B30820A-8422-C04B-BF82-4192FE414B2E}" type="datetimeFigureOut">
+            <a:fld id="{458478C2-303E-6247-B8F4-26DC85D2646A}" type="datetimeFigureOut">
               <a:rPr lang="en-GB" smtClean="0"/>
-              <a:t>26/04/2022</a:t>
+              <a:t>13/08/2022</a:t>
             </a:fld>
             <a:endParaRPr lang="en-GB"/>
           </a:p>
@@ -1980,13 +2087,7 @@
       </p:sp>
       <p:sp>
         <p:nvSpPr>
-          <p:cNvPr id="4" name="Footer Placeholder 3">
-            <a:extLst>
-              <a:ext uri="{FF2B5EF4-FFF2-40B4-BE49-F238E27FC236}">
-                <a16:creationId xmlns:a16="http://schemas.microsoft.com/office/drawing/2014/main" id="{CED910B6-AB8D-CA82-786A-A6D05EC8E9F5}"/>
-              </a:ext>
-            </a:extLst>
-          </p:cNvPr>
+          <p:cNvPr id="4" name="Footer Placeholder 3"/>
           <p:cNvSpPr>
             <a:spLocks noGrp="1"/>
           </p:cNvSpPr>
@@ -2005,13 +2106,7 @@
       </p:sp>
       <p:sp>
         <p:nvSpPr>
-          <p:cNvPr id="5" name="Slide Number Placeholder 4">
-            <a:extLst>
-              <a:ext uri="{FF2B5EF4-FFF2-40B4-BE49-F238E27FC236}">
-                <a16:creationId xmlns:a16="http://schemas.microsoft.com/office/drawing/2014/main" id="{DA9F25FA-C52E-EC60-A988-15BA4E0C4FC3}"/>
-              </a:ext>
-            </a:extLst>
-          </p:cNvPr>
+          <p:cNvPr id="5" name="Slide Number Placeholder 4"/>
           <p:cNvSpPr>
             <a:spLocks noGrp="1"/>
           </p:cNvSpPr>
@@ -2024,7 +2119,7 @@
           <a:bodyPr/>
           <a:lstStyle/>
           <a:p>
-            <a:fld id="{01F534BD-476C-8E43-92CA-BAEB25A10DCA}" type="slidenum">
+            <a:fld id="{AA1227A9-2AB6-F04F-BB9E-1700E1EF1BD6}" type="slidenum">
               <a:rPr lang="en-GB" smtClean="0"/>
               <a:t>‹#›</a:t>
             </a:fld>
@@ -2035,7 +2130,7 @@
     </p:spTree>
     <p:extLst>
       <p:ext uri="{BB962C8B-B14F-4D97-AF65-F5344CB8AC3E}">
-        <p14:creationId xmlns:p14="http://schemas.microsoft.com/office/powerpoint/2010/main" val="1236988542"/>
+        <p14:creationId xmlns:p14="http://schemas.microsoft.com/office/powerpoint/2010/main" val="868852508"/>
       </p:ext>
     </p:extLst>
   </p:cSld>
@@ -2064,13 +2159,7 @@
       </p:grpSpPr>
       <p:sp>
         <p:nvSpPr>
-          <p:cNvPr id="2" name="Date Placeholder 1">
-            <a:extLst>
-              <a:ext uri="{FF2B5EF4-FFF2-40B4-BE49-F238E27FC236}">
-                <a16:creationId xmlns:a16="http://schemas.microsoft.com/office/drawing/2014/main" id="{93299742-9F83-AB0A-583B-63047B40F519}"/>
-              </a:ext>
-            </a:extLst>
-          </p:cNvPr>
+          <p:cNvPr id="2" name="Date Placeholder 1"/>
           <p:cNvSpPr>
             <a:spLocks noGrp="1"/>
           </p:cNvSpPr>
@@ -2083,9 +2172,9 @@
           <a:bodyPr/>
           <a:lstStyle/>
           <a:p>
-            <a:fld id="{7B30820A-8422-C04B-BF82-4192FE414B2E}" type="datetimeFigureOut">
+            <a:fld id="{458478C2-303E-6247-B8F4-26DC85D2646A}" type="datetimeFigureOut">
               <a:rPr lang="en-GB" smtClean="0"/>
-              <a:t>26/04/2022</a:t>
+              <a:t>13/08/2022</a:t>
             </a:fld>
             <a:endParaRPr lang="en-GB"/>
           </a:p>
@@ -2093,13 +2182,7 @@
       </p:sp>
       <p:sp>
         <p:nvSpPr>
-          <p:cNvPr id="3" name="Footer Placeholder 2">
-            <a:extLst>
-              <a:ext uri="{FF2B5EF4-FFF2-40B4-BE49-F238E27FC236}">
-                <a16:creationId xmlns:a16="http://schemas.microsoft.com/office/drawing/2014/main" id="{2C46E492-D93B-8FC6-9175-7FC64D95B2BF}"/>
-              </a:ext>
-            </a:extLst>
-          </p:cNvPr>
+          <p:cNvPr id="3" name="Footer Placeholder 2"/>
           <p:cNvSpPr>
             <a:spLocks noGrp="1"/>
           </p:cNvSpPr>
@@ -2118,13 +2201,7 @@
       </p:sp>
       <p:sp>
         <p:nvSpPr>
-          <p:cNvPr id="4" name="Slide Number Placeholder 3">
-            <a:extLst>
-              <a:ext uri="{FF2B5EF4-FFF2-40B4-BE49-F238E27FC236}">
-                <a16:creationId xmlns:a16="http://schemas.microsoft.com/office/drawing/2014/main" id="{9035368D-5AD9-B0C2-EDC5-5C0E32266CC3}"/>
-              </a:ext>
-            </a:extLst>
-          </p:cNvPr>
+          <p:cNvPr id="4" name="Slide Number Placeholder 3"/>
           <p:cNvSpPr>
             <a:spLocks noGrp="1"/>
           </p:cNvSpPr>
@@ -2137,7 +2214,7 @@
           <a:bodyPr/>
           <a:lstStyle/>
           <a:p>
-            <a:fld id="{01F534BD-476C-8E43-92CA-BAEB25A10DCA}" type="slidenum">
+            <a:fld id="{AA1227A9-2AB6-F04F-BB9E-1700E1EF1BD6}" type="slidenum">
               <a:rPr lang="en-GB" smtClean="0"/>
               <a:t>‹#›</a:t>
             </a:fld>
@@ -2148,7 +2225,7 @@
     </p:spTree>
     <p:extLst>
       <p:ext uri="{BB962C8B-B14F-4D97-AF65-F5344CB8AC3E}">
-        <p14:creationId xmlns:p14="http://schemas.microsoft.com/office/powerpoint/2010/main" val="3854356657"/>
+        <p14:creationId xmlns:p14="http://schemas.microsoft.com/office/powerpoint/2010/main" val="2637900903"/>
       </p:ext>
     </p:extLst>
   </p:cSld>
@@ -2177,13 +2254,7 @@
       </p:grpSpPr>
       <p:sp>
         <p:nvSpPr>
-          <p:cNvPr id="2" name="Title 1">
-            <a:extLst>
-              <a:ext uri="{FF2B5EF4-FFF2-40B4-BE49-F238E27FC236}">
-                <a16:creationId xmlns:a16="http://schemas.microsoft.com/office/drawing/2014/main" id="{C8BADD81-B7D5-854F-3CCD-D846688F6D06}"/>
-              </a:ext>
-            </a:extLst>
-          </p:cNvPr>
+          <p:cNvPr id="2" name="Title 1"/>
           <p:cNvSpPr>
             <a:spLocks noGrp="1"/>
           </p:cNvSpPr>
@@ -2193,15 +2264,15 @@
         </p:nvSpPr>
         <p:spPr>
           <a:xfrm>
-            <a:off x="839788" y="457200"/>
-            <a:ext cx="3932237" cy="1600200"/>
+            <a:off x="976254" y="152400"/>
+            <a:ext cx="4571226" cy="533400"/>
           </a:xfrm>
         </p:spPr>
         <p:txBody>
           <a:bodyPr anchor="b"/>
           <a:lstStyle>
             <a:lvl1pPr>
-              <a:defRPr sz="3200"/>
+              <a:defRPr sz="1067"/>
             </a:lvl1pPr>
           </a:lstStyle>
           <a:p>
@@ -2209,19 +2280,13 @@
               <a:rPr lang="en-US"/>
               <a:t>Click to edit Master title style</a:t>
             </a:r>
-            <a:endParaRPr lang="en-GB"/>
-          </a:p>
-        </p:txBody>
-      </p:sp>
-      <p:sp>
-        <p:nvSpPr>
-          <p:cNvPr id="3" name="Content Placeholder 2">
-            <a:extLst>
-              <a:ext uri="{FF2B5EF4-FFF2-40B4-BE49-F238E27FC236}">
-                <a16:creationId xmlns:a16="http://schemas.microsoft.com/office/drawing/2014/main" id="{963A79DF-0CD8-40EB-844F-AFAC0B355FFA}"/>
-              </a:ext>
-            </a:extLst>
-          </p:cNvPr>
+            <a:endParaRPr lang="en-US" dirty="0"/>
+          </a:p>
+        </p:txBody>
+      </p:sp>
+      <p:sp>
+        <p:nvSpPr>
+          <p:cNvPr id="3" name="Content Placeholder 2"/>
           <p:cNvSpPr>
             <a:spLocks noGrp="1"/>
           </p:cNvSpPr>
@@ -2231,39 +2296,39 @@
         </p:nvSpPr>
         <p:spPr>
           <a:xfrm>
-            <a:off x="5183188" y="987425"/>
-            <a:ext cx="6172200" cy="4873625"/>
+            <a:off x="6025456" y="329142"/>
+            <a:ext cx="7175183" cy="1624542"/>
           </a:xfrm>
         </p:spPr>
         <p:txBody>
           <a:bodyPr/>
           <a:lstStyle>
             <a:lvl1pPr>
-              <a:defRPr sz="3200"/>
+              <a:defRPr sz="1067"/>
             </a:lvl1pPr>
             <a:lvl2pPr>
-              <a:defRPr sz="2800"/>
+              <a:defRPr sz="933"/>
             </a:lvl2pPr>
             <a:lvl3pPr>
-              <a:defRPr sz="2400"/>
+              <a:defRPr sz="800"/>
             </a:lvl3pPr>
             <a:lvl4pPr>
-              <a:defRPr sz="2000"/>
+              <a:defRPr sz="667"/>
             </a:lvl4pPr>
             <a:lvl5pPr>
-              <a:defRPr sz="2000"/>
+              <a:defRPr sz="667"/>
             </a:lvl5pPr>
             <a:lvl6pPr>
-              <a:defRPr sz="2000"/>
+              <a:defRPr sz="667"/>
             </a:lvl6pPr>
             <a:lvl7pPr>
-              <a:defRPr sz="2000"/>
+              <a:defRPr sz="667"/>
             </a:lvl7pPr>
             <a:lvl8pPr>
-              <a:defRPr sz="2000"/>
+              <a:defRPr sz="667"/>
             </a:lvl8pPr>
             <a:lvl9pPr>
-              <a:defRPr sz="2000"/>
+              <a:defRPr sz="667"/>
             </a:lvl9pPr>
           </a:lstStyle>
           <a:p>
@@ -2300,19 +2365,13 @@
               <a:rPr lang="en-US"/>
               <a:t>Fifth level</a:t>
             </a:r>
-            <a:endParaRPr lang="en-GB"/>
-          </a:p>
-        </p:txBody>
-      </p:sp>
-      <p:sp>
-        <p:nvSpPr>
-          <p:cNvPr id="4" name="Text Placeholder 3">
-            <a:extLst>
-              <a:ext uri="{FF2B5EF4-FFF2-40B4-BE49-F238E27FC236}">
-                <a16:creationId xmlns:a16="http://schemas.microsoft.com/office/drawing/2014/main" id="{0EEA7F7C-58D8-356E-61DD-18A20FD01BA7}"/>
-              </a:ext>
-            </a:extLst>
-          </p:cNvPr>
+            <a:endParaRPr lang="en-US" dirty="0"/>
+          </a:p>
+        </p:txBody>
+      </p:sp>
+      <p:sp>
+        <p:nvSpPr>
+          <p:cNvPr id="4" name="Text Placeholder 3"/>
           <p:cNvSpPr>
             <a:spLocks noGrp="1"/>
           </p:cNvSpPr>
@@ -2322,8 +2381,8 @@
         </p:nvSpPr>
         <p:spPr>
           <a:xfrm>
-            <a:off x="839788" y="2057400"/>
-            <a:ext cx="3932237" cy="3811588"/>
+            <a:off x="976254" y="685800"/>
+            <a:ext cx="4571226" cy="1270529"/>
           </a:xfrm>
         </p:spPr>
         <p:txBody>
@@ -2331,39 +2390,39 @@
           <a:lstStyle>
             <a:lvl1pPr marL="0" indent="0">
               <a:buNone/>
-              <a:defRPr sz="1600"/>
+              <a:defRPr sz="533"/>
             </a:lvl1pPr>
-            <a:lvl2pPr marL="457200" indent="0">
-              <a:buNone/>
-              <a:defRPr sz="1400"/>
+            <a:lvl2pPr marL="152385" indent="0">
+              <a:buNone/>
+              <a:defRPr sz="467"/>
             </a:lvl2pPr>
-            <a:lvl3pPr marL="914400" indent="0">
-              <a:buNone/>
-              <a:defRPr sz="1200"/>
+            <a:lvl3pPr marL="304770" indent="0">
+              <a:buNone/>
+              <a:defRPr sz="400"/>
             </a:lvl3pPr>
-            <a:lvl4pPr marL="1371600" indent="0">
-              <a:buNone/>
-              <a:defRPr sz="1000"/>
+            <a:lvl4pPr marL="457154" indent="0">
+              <a:buNone/>
+              <a:defRPr sz="333"/>
             </a:lvl4pPr>
-            <a:lvl5pPr marL="1828800" indent="0">
-              <a:buNone/>
-              <a:defRPr sz="1000"/>
+            <a:lvl5pPr marL="609539" indent="0">
+              <a:buNone/>
+              <a:defRPr sz="333"/>
             </a:lvl5pPr>
-            <a:lvl6pPr marL="2286000" indent="0">
-              <a:buNone/>
-              <a:defRPr sz="1000"/>
+            <a:lvl6pPr marL="761924" indent="0">
+              <a:buNone/>
+              <a:defRPr sz="333"/>
             </a:lvl6pPr>
-            <a:lvl7pPr marL="2743200" indent="0">
-              <a:buNone/>
-              <a:defRPr sz="1000"/>
+            <a:lvl7pPr marL="914309" indent="0">
+              <a:buNone/>
+              <a:defRPr sz="333"/>
             </a:lvl7pPr>
-            <a:lvl8pPr marL="3200400" indent="0">
-              <a:buNone/>
-              <a:defRPr sz="1000"/>
+            <a:lvl8pPr marL="1066693" indent="0">
+              <a:buNone/>
+              <a:defRPr sz="333"/>
             </a:lvl8pPr>
-            <a:lvl9pPr marL="3657600" indent="0">
-              <a:buNone/>
-              <a:defRPr sz="1000"/>
+            <a:lvl9pPr marL="1219078" indent="0">
+              <a:buNone/>
+              <a:defRPr sz="333"/>
             </a:lvl9pPr>
           </a:lstStyle>
           <a:p>
@@ -2377,13 +2436,7 @@
       </p:sp>
       <p:sp>
         <p:nvSpPr>
-          <p:cNvPr id="5" name="Date Placeholder 4">
-            <a:extLst>
-              <a:ext uri="{FF2B5EF4-FFF2-40B4-BE49-F238E27FC236}">
-                <a16:creationId xmlns:a16="http://schemas.microsoft.com/office/drawing/2014/main" id="{28FC4978-B297-1A34-CC58-930CC323E67F}"/>
-              </a:ext>
-            </a:extLst>
-          </p:cNvPr>
+          <p:cNvPr id="5" name="Date Placeholder 4"/>
           <p:cNvSpPr>
             <a:spLocks noGrp="1"/>
           </p:cNvSpPr>
@@ -2396,9 +2449,9 @@
           <a:bodyPr/>
           <a:lstStyle/>
           <a:p>
-            <a:fld id="{7B30820A-8422-C04B-BF82-4192FE414B2E}" type="datetimeFigureOut">
+            <a:fld id="{458478C2-303E-6247-B8F4-26DC85D2646A}" type="datetimeFigureOut">
               <a:rPr lang="en-GB" smtClean="0"/>
-              <a:t>26/04/2022</a:t>
+              <a:t>13/08/2022</a:t>
             </a:fld>
             <a:endParaRPr lang="en-GB"/>
           </a:p>
@@ -2406,13 +2459,7 @@
       </p:sp>
       <p:sp>
         <p:nvSpPr>
-          <p:cNvPr id="6" name="Footer Placeholder 5">
-            <a:extLst>
-              <a:ext uri="{FF2B5EF4-FFF2-40B4-BE49-F238E27FC236}">
-                <a16:creationId xmlns:a16="http://schemas.microsoft.com/office/drawing/2014/main" id="{89BB0DBA-B03A-825D-FE09-08D2016EF97F}"/>
-              </a:ext>
-            </a:extLst>
-          </p:cNvPr>
+          <p:cNvPr id="6" name="Footer Placeholder 5"/>
           <p:cNvSpPr>
             <a:spLocks noGrp="1"/>
           </p:cNvSpPr>
@@ -2431,13 +2478,7 @@
       </p:sp>
       <p:sp>
         <p:nvSpPr>
-          <p:cNvPr id="7" name="Slide Number Placeholder 6">
-            <a:extLst>
-              <a:ext uri="{FF2B5EF4-FFF2-40B4-BE49-F238E27FC236}">
-                <a16:creationId xmlns:a16="http://schemas.microsoft.com/office/drawing/2014/main" id="{F4E3B940-87F4-5F72-B12C-16712628F704}"/>
-              </a:ext>
-            </a:extLst>
-          </p:cNvPr>
+          <p:cNvPr id="7" name="Slide Number Placeholder 6"/>
           <p:cNvSpPr>
             <a:spLocks noGrp="1"/>
           </p:cNvSpPr>
@@ -2450,7 +2491,7 @@
           <a:bodyPr/>
           <a:lstStyle/>
           <a:p>
-            <a:fld id="{01F534BD-476C-8E43-92CA-BAEB25A10DCA}" type="slidenum">
+            <a:fld id="{AA1227A9-2AB6-F04F-BB9E-1700E1EF1BD6}" type="slidenum">
               <a:rPr lang="en-GB" smtClean="0"/>
               <a:t>‹#›</a:t>
             </a:fld>
@@ -2461,7 +2502,7 @@
     </p:spTree>
     <p:extLst>
       <p:ext uri="{BB962C8B-B14F-4D97-AF65-F5344CB8AC3E}">
-        <p14:creationId xmlns:p14="http://schemas.microsoft.com/office/powerpoint/2010/main" val="2908066587"/>
+        <p14:creationId xmlns:p14="http://schemas.microsoft.com/office/powerpoint/2010/main" val="2698313097"/>
       </p:ext>
     </p:extLst>
   </p:cSld>
@@ -2490,13 +2531,7 @@
       </p:grpSpPr>
       <p:sp>
         <p:nvSpPr>
-          <p:cNvPr id="2" name="Title 1">
-            <a:extLst>
-              <a:ext uri="{FF2B5EF4-FFF2-40B4-BE49-F238E27FC236}">
-                <a16:creationId xmlns:a16="http://schemas.microsoft.com/office/drawing/2014/main" id="{95E3D6D7-90A7-301F-FD04-0EA2E6D29920}"/>
-              </a:ext>
-            </a:extLst>
-          </p:cNvPr>
+          <p:cNvPr id="2" name="Title 1"/>
           <p:cNvSpPr>
             <a:spLocks noGrp="1"/>
           </p:cNvSpPr>
@@ -2506,15 +2541,15 @@
         </p:nvSpPr>
         <p:spPr>
           <a:xfrm>
-            <a:off x="839788" y="457200"/>
-            <a:ext cx="3932237" cy="1600200"/>
+            <a:off x="976254" y="152400"/>
+            <a:ext cx="4571226" cy="533400"/>
           </a:xfrm>
         </p:spPr>
         <p:txBody>
           <a:bodyPr anchor="b"/>
           <a:lstStyle>
             <a:lvl1pPr>
-              <a:defRPr sz="3200"/>
+              <a:defRPr sz="1067"/>
             </a:lvl1pPr>
           </a:lstStyle>
           <a:p>
@@ -2522,21 +2557,15 @@
               <a:rPr lang="en-US"/>
               <a:t>Click to edit Master title style</a:t>
             </a:r>
-            <a:endParaRPr lang="en-GB"/>
-          </a:p>
-        </p:txBody>
-      </p:sp>
-      <p:sp>
-        <p:nvSpPr>
-          <p:cNvPr id="3" name="Picture Placeholder 2">
-            <a:extLst>
-              <a:ext uri="{FF2B5EF4-FFF2-40B4-BE49-F238E27FC236}">
-                <a16:creationId xmlns:a16="http://schemas.microsoft.com/office/drawing/2014/main" id="{37D47961-B00E-1308-26BE-CC5A42182E39}"/>
-              </a:ext>
-            </a:extLst>
-          </p:cNvPr>
-          <p:cNvSpPr>
-            <a:spLocks noGrp="1"/>
+            <a:endParaRPr lang="en-US" dirty="0"/>
+          </a:p>
+        </p:txBody>
+      </p:sp>
+      <p:sp>
+        <p:nvSpPr>
+          <p:cNvPr id="3" name="Picture Placeholder 2"/>
+          <p:cNvSpPr>
+            <a:spLocks noGrp="1" noChangeAspect="1"/>
           </p:cNvSpPr>
           <p:nvPr>
             <p:ph type="pic" idx="1"/>
@@ -2544,64 +2573,62 @@
         </p:nvSpPr>
         <p:spPr>
           <a:xfrm>
-            <a:off x="5183188" y="987425"/>
-            <a:ext cx="6172200" cy="4873625"/>
+            <a:off x="6025456" y="329142"/>
+            <a:ext cx="7175183" cy="1624542"/>
           </a:xfrm>
         </p:spPr>
         <p:txBody>
-          <a:bodyPr/>
+          <a:bodyPr anchor="t"/>
           <a:lstStyle>
             <a:lvl1pPr marL="0" indent="0">
               <a:buNone/>
-              <a:defRPr sz="3200"/>
+              <a:defRPr sz="1067"/>
             </a:lvl1pPr>
-            <a:lvl2pPr marL="457200" indent="0">
-              <a:buNone/>
-              <a:defRPr sz="2800"/>
+            <a:lvl2pPr marL="152385" indent="0">
+              <a:buNone/>
+              <a:defRPr sz="933"/>
             </a:lvl2pPr>
-            <a:lvl3pPr marL="914400" indent="0">
-              <a:buNone/>
-              <a:defRPr sz="2400"/>
+            <a:lvl3pPr marL="304770" indent="0">
+              <a:buNone/>
+              <a:defRPr sz="800"/>
             </a:lvl3pPr>
-            <a:lvl4pPr marL="1371600" indent="0">
-              <a:buNone/>
-              <a:defRPr sz="2000"/>
+            <a:lvl4pPr marL="457154" indent="0">
+              <a:buNone/>
+              <a:defRPr sz="667"/>
             </a:lvl4pPr>
-            <a:lvl5pPr marL="1828800" indent="0">
-              <a:buNone/>
-              <a:defRPr sz="2000"/>
+            <a:lvl5pPr marL="609539" indent="0">
+              <a:buNone/>
+              <a:defRPr sz="667"/>
             </a:lvl5pPr>
-            <a:lvl6pPr marL="2286000" indent="0">
-              <a:buNone/>
-              <a:defRPr sz="2000"/>
+            <a:lvl6pPr marL="761924" indent="0">
+              <a:buNone/>
+              <a:defRPr sz="667"/>
             </a:lvl6pPr>
-            <a:lvl7pPr marL="2743200" indent="0">
-              <a:buNone/>
-              <a:defRPr sz="2000"/>
+            <a:lvl7pPr marL="914309" indent="0">
+              <a:buNone/>
+              <a:defRPr sz="667"/>
             </a:lvl7pPr>
-            <a:lvl8pPr marL="3200400" indent="0">
-              <a:buNone/>
-              <a:defRPr sz="2000"/>
+            <a:lvl8pPr marL="1066693" indent="0">
+              <a:buNone/>
+              <a:defRPr sz="667"/>
             </a:lvl8pPr>
-            <a:lvl9pPr marL="3657600" indent="0">
-              <a:buNone/>
-              <a:defRPr sz="2000"/>
+            <a:lvl9pPr marL="1219078" indent="0">
+              <a:buNone/>
+              <a:defRPr sz="667"/>
             </a:lvl9pPr>
           </a:lstStyle>
           <a:p>
-            <a:endParaRPr lang="en-GB"/>
-          </a:p>
-        </p:txBody>
-      </p:sp>
-      <p:sp>
-        <p:nvSpPr>
-          <p:cNvPr id="4" name="Text Placeholder 3">
-            <a:extLst>
-              <a:ext uri="{FF2B5EF4-FFF2-40B4-BE49-F238E27FC236}">
-                <a16:creationId xmlns:a16="http://schemas.microsoft.com/office/drawing/2014/main" id="{3CAE6B95-1C07-132D-DFBC-18C36AFD644B}"/>
-              </a:ext>
-            </a:extLst>
-          </p:cNvPr>
+            <a:r>
+              <a:rPr lang="en-US"/>
+              <a:t>Click icon to add picture</a:t>
+            </a:r>
+            <a:endParaRPr lang="en-US" dirty="0"/>
+          </a:p>
+        </p:txBody>
+      </p:sp>
+      <p:sp>
+        <p:nvSpPr>
+          <p:cNvPr id="4" name="Text Placeholder 3"/>
           <p:cNvSpPr>
             <a:spLocks noGrp="1"/>
           </p:cNvSpPr>
@@ -2611,8 +2638,8 @@
         </p:nvSpPr>
         <p:spPr>
           <a:xfrm>
-            <a:off x="839788" y="2057400"/>
-            <a:ext cx="3932237" cy="3811588"/>
+            <a:off x="976254" y="685800"/>
+            <a:ext cx="4571226" cy="1270529"/>
           </a:xfrm>
         </p:spPr>
         <p:txBody>
@@ -2620,39 +2647,39 @@
           <a:lstStyle>
             <a:lvl1pPr marL="0" indent="0">
               <a:buNone/>
-              <a:defRPr sz="1600"/>
+              <a:defRPr sz="533"/>
             </a:lvl1pPr>
-            <a:lvl2pPr marL="457200" indent="0">
-              <a:buNone/>
-              <a:defRPr sz="1400"/>
+            <a:lvl2pPr marL="152385" indent="0">
+              <a:buNone/>
+              <a:defRPr sz="467"/>
             </a:lvl2pPr>
-            <a:lvl3pPr marL="914400" indent="0">
-              <a:buNone/>
-              <a:defRPr sz="1200"/>
+            <a:lvl3pPr marL="304770" indent="0">
+              <a:buNone/>
+              <a:defRPr sz="400"/>
             </a:lvl3pPr>
-            <a:lvl4pPr marL="1371600" indent="0">
-              <a:buNone/>
-              <a:defRPr sz="1000"/>
+            <a:lvl4pPr marL="457154" indent="0">
+              <a:buNone/>
+              <a:defRPr sz="333"/>
             </a:lvl4pPr>
-            <a:lvl5pPr marL="1828800" indent="0">
-              <a:buNone/>
-              <a:defRPr sz="1000"/>
+            <a:lvl5pPr marL="609539" indent="0">
+              <a:buNone/>
+              <a:defRPr sz="333"/>
             </a:lvl5pPr>
-            <a:lvl6pPr marL="2286000" indent="0">
-              <a:buNone/>
-              <a:defRPr sz="1000"/>
+            <a:lvl6pPr marL="761924" indent="0">
+              <a:buNone/>
+              <a:defRPr sz="333"/>
             </a:lvl6pPr>
-            <a:lvl7pPr marL="2743200" indent="0">
-              <a:buNone/>
-              <a:defRPr sz="1000"/>
+            <a:lvl7pPr marL="914309" indent="0">
+              <a:buNone/>
+              <a:defRPr sz="333"/>
             </a:lvl7pPr>
-            <a:lvl8pPr marL="3200400" indent="0">
-              <a:buNone/>
-              <a:defRPr sz="1000"/>
+            <a:lvl8pPr marL="1066693" indent="0">
+              <a:buNone/>
+              <a:defRPr sz="333"/>
             </a:lvl8pPr>
-            <a:lvl9pPr marL="3657600" indent="0">
-              <a:buNone/>
-              <a:defRPr sz="1000"/>
+            <a:lvl9pPr marL="1219078" indent="0">
+              <a:buNone/>
+              <a:defRPr sz="333"/>
             </a:lvl9pPr>
           </a:lstStyle>
           <a:p>
@@ -2666,13 +2693,7 @@
       </p:sp>
       <p:sp>
         <p:nvSpPr>
-          <p:cNvPr id="5" name="Date Placeholder 4">
-            <a:extLst>
-              <a:ext uri="{FF2B5EF4-FFF2-40B4-BE49-F238E27FC236}">
-                <a16:creationId xmlns:a16="http://schemas.microsoft.com/office/drawing/2014/main" id="{BFA32515-4800-FEBB-35CA-653DFF8E8AB9}"/>
-              </a:ext>
-            </a:extLst>
-          </p:cNvPr>
+          <p:cNvPr id="5" name="Date Placeholder 4"/>
           <p:cNvSpPr>
             <a:spLocks noGrp="1"/>
           </p:cNvSpPr>
@@ -2685,9 +2706,9 @@
           <a:bodyPr/>
           <a:lstStyle/>
           <a:p>
-            <a:fld id="{7B30820A-8422-C04B-BF82-4192FE414B2E}" type="datetimeFigureOut">
+            <a:fld id="{458478C2-303E-6247-B8F4-26DC85D2646A}" type="datetimeFigureOut">
               <a:rPr lang="en-GB" smtClean="0"/>
-              <a:t>26/04/2022</a:t>
+              <a:t>13/08/2022</a:t>
             </a:fld>
             <a:endParaRPr lang="en-GB"/>
           </a:p>
@@ -2695,13 +2716,7 @@
       </p:sp>
       <p:sp>
         <p:nvSpPr>
-          <p:cNvPr id="6" name="Footer Placeholder 5">
-            <a:extLst>
-              <a:ext uri="{FF2B5EF4-FFF2-40B4-BE49-F238E27FC236}">
-                <a16:creationId xmlns:a16="http://schemas.microsoft.com/office/drawing/2014/main" id="{6BDDD0E0-ACB7-1AF8-2B59-BFC8A63193F2}"/>
-              </a:ext>
-            </a:extLst>
-          </p:cNvPr>
+          <p:cNvPr id="6" name="Footer Placeholder 5"/>
           <p:cNvSpPr>
             <a:spLocks noGrp="1"/>
           </p:cNvSpPr>
@@ -2720,13 +2735,7 @@
       </p:sp>
       <p:sp>
         <p:nvSpPr>
-          <p:cNvPr id="7" name="Slide Number Placeholder 6">
-            <a:extLst>
-              <a:ext uri="{FF2B5EF4-FFF2-40B4-BE49-F238E27FC236}">
-                <a16:creationId xmlns:a16="http://schemas.microsoft.com/office/drawing/2014/main" id="{2A61464E-9B8F-509E-4C36-130A89351B2E}"/>
-              </a:ext>
-            </a:extLst>
-          </p:cNvPr>
+          <p:cNvPr id="7" name="Slide Number Placeholder 6"/>
           <p:cNvSpPr>
             <a:spLocks noGrp="1"/>
           </p:cNvSpPr>
@@ -2739,7 +2748,7 @@
           <a:bodyPr/>
           <a:lstStyle/>
           <a:p>
-            <a:fld id="{01F534BD-476C-8E43-92CA-BAEB25A10DCA}" type="slidenum">
+            <a:fld id="{AA1227A9-2AB6-F04F-BB9E-1700E1EF1BD6}" type="slidenum">
               <a:rPr lang="en-GB" smtClean="0"/>
               <a:t>‹#›</a:t>
             </a:fld>
@@ -2750,7 +2759,7 @@
     </p:spTree>
     <p:extLst>
       <p:ext uri="{BB962C8B-B14F-4D97-AF65-F5344CB8AC3E}">
-        <p14:creationId xmlns:p14="http://schemas.microsoft.com/office/powerpoint/2010/main" val="1646587607"/>
+        <p14:creationId xmlns:p14="http://schemas.microsoft.com/office/powerpoint/2010/main" val="1176843200"/>
       </p:ext>
     </p:extLst>
   </p:cSld>
@@ -2784,13 +2793,7 @@
       </p:grpSpPr>
       <p:sp>
         <p:nvSpPr>
-          <p:cNvPr id="2" name="Title Placeholder 1">
-            <a:extLst>
-              <a:ext uri="{FF2B5EF4-FFF2-40B4-BE49-F238E27FC236}">
-                <a16:creationId xmlns:a16="http://schemas.microsoft.com/office/drawing/2014/main" id="{47D3FF59-01C7-BEA3-759C-85B3B688312D}"/>
-              </a:ext>
-            </a:extLst>
-          </p:cNvPr>
+          <p:cNvPr id="2" name="Title Placeholder 1"/>
           <p:cNvSpPr>
             <a:spLocks noGrp="1"/>
           </p:cNvSpPr>
@@ -2800,8 +2803,8 @@
         </p:nvSpPr>
         <p:spPr>
           <a:xfrm>
-            <a:off x="838200" y="365125"/>
-            <a:ext cx="10515600" cy="1325563"/>
+            <a:off x="974408" y="121709"/>
+            <a:ext cx="12224385" cy="441854"/>
           </a:xfrm>
           <a:prstGeom prst="rect">
             <a:avLst/>
@@ -2817,19 +2820,13 @@
               <a:rPr lang="en-US"/>
               <a:t>Click to edit Master title style</a:t>
             </a:r>
-            <a:endParaRPr lang="en-GB"/>
-          </a:p>
-        </p:txBody>
-      </p:sp>
-      <p:sp>
-        <p:nvSpPr>
-          <p:cNvPr id="3" name="Text Placeholder 2">
-            <a:extLst>
-              <a:ext uri="{FF2B5EF4-FFF2-40B4-BE49-F238E27FC236}">
-                <a16:creationId xmlns:a16="http://schemas.microsoft.com/office/drawing/2014/main" id="{635225EF-1EE5-0C7C-983B-0A77E315B725}"/>
-              </a:ext>
-            </a:extLst>
-          </p:cNvPr>
+            <a:endParaRPr lang="en-US" dirty="0"/>
+          </a:p>
+        </p:txBody>
+      </p:sp>
+      <p:sp>
+        <p:nvSpPr>
+          <p:cNvPr id="3" name="Text Placeholder 2"/>
           <p:cNvSpPr>
             <a:spLocks noGrp="1"/>
           </p:cNvSpPr>
@@ -2839,8 +2836,8 @@
         </p:nvSpPr>
         <p:spPr>
           <a:xfrm>
-            <a:off x="838200" y="1825625"/>
-            <a:ext cx="10515600" cy="4351338"/>
+            <a:off x="974408" y="608542"/>
+            <a:ext cx="12224385" cy="1450446"/>
           </a:xfrm>
           <a:prstGeom prst="rect">
             <a:avLst/>
@@ -2885,19 +2882,13 @@
               <a:rPr lang="en-US"/>
               <a:t>Fifth level</a:t>
             </a:r>
-            <a:endParaRPr lang="en-GB"/>
-          </a:p>
-        </p:txBody>
-      </p:sp>
-      <p:sp>
-        <p:nvSpPr>
-          <p:cNvPr id="4" name="Date Placeholder 3">
-            <a:extLst>
-              <a:ext uri="{FF2B5EF4-FFF2-40B4-BE49-F238E27FC236}">
-                <a16:creationId xmlns:a16="http://schemas.microsoft.com/office/drawing/2014/main" id="{0EF3C07E-A5A0-EB80-A477-A75972B7BC96}"/>
-              </a:ext>
-            </a:extLst>
-          </p:cNvPr>
+            <a:endParaRPr lang="en-US" dirty="0"/>
+          </a:p>
+        </p:txBody>
+      </p:sp>
+      <p:sp>
+        <p:nvSpPr>
+          <p:cNvPr id="4" name="Date Placeholder 3"/>
           <p:cNvSpPr>
             <a:spLocks noGrp="1"/>
           </p:cNvSpPr>
@@ -2907,8 +2898,8 @@
         </p:nvSpPr>
         <p:spPr>
           <a:xfrm>
-            <a:off x="838200" y="6356350"/>
-            <a:ext cx="2743200" cy="365125"/>
+            <a:off x="974408" y="2118784"/>
+            <a:ext cx="3188970" cy="121708"/>
           </a:xfrm>
           <a:prstGeom prst="rect">
             <a:avLst/>
@@ -2918,7 +2909,7 @@
           <a:bodyPr vert="horz" lIns="91440" tIns="45720" rIns="91440" bIns="45720" rtlCol="0" anchor="ctr"/>
           <a:lstStyle>
             <a:lvl1pPr algn="l">
-              <a:defRPr sz="1200">
+              <a:defRPr sz="400">
                 <a:solidFill>
                   <a:schemeClr val="tx1">
                     <a:tint val="75000"/>
@@ -2928,9 +2919,9 @@
             </a:lvl1pPr>
           </a:lstStyle>
           <a:p>
-            <a:fld id="{7B30820A-8422-C04B-BF82-4192FE414B2E}" type="datetimeFigureOut">
+            <a:fld id="{458478C2-303E-6247-B8F4-26DC85D2646A}" type="datetimeFigureOut">
               <a:rPr lang="en-GB" smtClean="0"/>
-              <a:t>26/04/2022</a:t>
+              <a:t>13/08/2022</a:t>
             </a:fld>
             <a:endParaRPr lang="en-GB"/>
           </a:p>
@@ -2938,13 +2929,7 @@
       </p:sp>
       <p:sp>
         <p:nvSpPr>
-          <p:cNvPr id="5" name="Footer Placeholder 4">
-            <a:extLst>
-              <a:ext uri="{FF2B5EF4-FFF2-40B4-BE49-F238E27FC236}">
-                <a16:creationId xmlns:a16="http://schemas.microsoft.com/office/drawing/2014/main" id="{6C0D17D3-A77A-27A8-1005-11FBF7C67020}"/>
-              </a:ext>
-            </a:extLst>
-          </p:cNvPr>
+          <p:cNvPr id="5" name="Footer Placeholder 4"/>
           <p:cNvSpPr>
             <a:spLocks noGrp="1"/>
           </p:cNvSpPr>
@@ -2954,8 +2939,8 @@
         </p:nvSpPr>
         <p:spPr>
           <a:xfrm>
-            <a:off x="4038600" y="6356350"/>
-            <a:ext cx="4114800" cy="365125"/>
+            <a:off x="4694873" y="2118784"/>
+            <a:ext cx="4783455" cy="121708"/>
           </a:xfrm>
           <a:prstGeom prst="rect">
             <a:avLst/>
@@ -2965,7 +2950,7 @@
           <a:bodyPr vert="horz" lIns="91440" tIns="45720" rIns="91440" bIns="45720" rtlCol="0" anchor="ctr"/>
           <a:lstStyle>
             <a:lvl1pPr algn="ctr">
-              <a:defRPr sz="1200">
+              <a:defRPr sz="400">
                 <a:solidFill>
                   <a:schemeClr val="tx1">
                     <a:tint val="75000"/>
@@ -2981,13 +2966,7 @@
       </p:sp>
       <p:sp>
         <p:nvSpPr>
-          <p:cNvPr id="6" name="Slide Number Placeholder 5">
-            <a:extLst>
-              <a:ext uri="{FF2B5EF4-FFF2-40B4-BE49-F238E27FC236}">
-                <a16:creationId xmlns:a16="http://schemas.microsoft.com/office/drawing/2014/main" id="{F6D7CB6A-42E3-B2FC-D330-C196E729509E}"/>
-              </a:ext>
-            </a:extLst>
-          </p:cNvPr>
+          <p:cNvPr id="6" name="Slide Number Placeholder 5"/>
           <p:cNvSpPr>
             <a:spLocks noGrp="1"/>
           </p:cNvSpPr>
@@ -2997,8 +2976,8 @@
         </p:nvSpPr>
         <p:spPr>
           <a:xfrm>
-            <a:off x="8610600" y="6356350"/>
-            <a:ext cx="2743200" cy="365125"/>
+            <a:off x="10009823" y="2118784"/>
+            <a:ext cx="3188970" cy="121708"/>
           </a:xfrm>
           <a:prstGeom prst="rect">
             <a:avLst/>
@@ -3008,7 +2987,7 @@
           <a:bodyPr vert="horz" lIns="91440" tIns="45720" rIns="91440" bIns="45720" rtlCol="0" anchor="ctr"/>
           <a:lstStyle>
             <a:lvl1pPr algn="r">
-              <a:defRPr sz="1200">
+              <a:defRPr sz="400">
                 <a:solidFill>
                   <a:schemeClr val="tx1">
                     <a:tint val="75000"/>
@@ -3018,7 +2997,7 @@
             </a:lvl1pPr>
           </a:lstStyle>
           <a:p>
-            <a:fld id="{01F534BD-476C-8E43-92CA-BAEB25A10DCA}" type="slidenum">
+            <a:fld id="{AA1227A9-2AB6-F04F-BB9E-1700E1EF1BD6}" type="slidenum">
               <a:rPr lang="en-GB" smtClean="0"/>
               <a:t>‹#›</a:t>
             </a:fld>
@@ -3029,27 +3008,27 @@
     </p:spTree>
     <p:extLst>
       <p:ext uri="{BB962C8B-B14F-4D97-AF65-F5344CB8AC3E}">
-        <p14:creationId xmlns:p14="http://schemas.microsoft.com/office/powerpoint/2010/main" val="468955933"/>
+        <p14:creationId xmlns:p14="http://schemas.microsoft.com/office/powerpoint/2010/main" val="2331712524"/>
       </p:ext>
     </p:extLst>
   </p:cSld>
   <p:clrMap bg1="lt1" tx1="dk1" bg2="lt2" tx2="dk2" accent1="accent1" accent2="accent2" accent3="accent3" accent4="accent4" accent5="accent5" accent6="accent6" hlink="hlink" folHlink="folHlink"/>
   <p:sldLayoutIdLst>
-    <p:sldLayoutId id="2147483649" r:id="rId1"/>
-    <p:sldLayoutId id="2147483650" r:id="rId2"/>
-    <p:sldLayoutId id="2147483651" r:id="rId3"/>
-    <p:sldLayoutId id="2147483652" r:id="rId4"/>
-    <p:sldLayoutId id="2147483653" r:id="rId5"/>
-    <p:sldLayoutId id="2147483654" r:id="rId6"/>
-    <p:sldLayoutId id="2147483655" r:id="rId7"/>
-    <p:sldLayoutId id="2147483656" r:id="rId8"/>
-    <p:sldLayoutId id="2147483657" r:id="rId9"/>
-    <p:sldLayoutId id="2147483658" r:id="rId10"/>
-    <p:sldLayoutId id="2147483659" r:id="rId11"/>
+    <p:sldLayoutId id="2147483925" r:id="rId1"/>
+    <p:sldLayoutId id="2147483926" r:id="rId2"/>
+    <p:sldLayoutId id="2147483927" r:id="rId3"/>
+    <p:sldLayoutId id="2147483928" r:id="rId4"/>
+    <p:sldLayoutId id="2147483929" r:id="rId5"/>
+    <p:sldLayoutId id="2147483930" r:id="rId6"/>
+    <p:sldLayoutId id="2147483931" r:id="rId7"/>
+    <p:sldLayoutId id="2147483932" r:id="rId8"/>
+    <p:sldLayoutId id="2147483933" r:id="rId9"/>
+    <p:sldLayoutId id="2147483934" r:id="rId10"/>
+    <p:sldLayoutId id="2147483935" r:id="rId11"/>
   </p:sldLayoutIdLst>
   <p:txStyles>
     <p:titleStyle>
-      <a:lvl1pPr algn="l" defTabSz="914400" rtl="0" eaLnBrk="1" latinLnBrk="0" hangingPunct="1">
+      <a:lvl1pPr algn="l" defTabSz="304770" rtl="0" eaLnBrk="1" latinLnBrk="0" hangingPunct="1">
         <a:lnSpc>
           <a:spcPct val="90000"/>
         </a:lnSpc>
@@ -3057,7 +3036,7 @@
           <a:spcPct val="0"/>
         </a:spcBef>
         <a:buNone/>
-        <a:defRPr sz="4400" kern="1200">
+        <a:defRPr sz="1467" kern="1200">
           <a:solidFill>
             <a:schemeClr val="tx1"/>
           </a:solidFill>
@@ -3068,16 +3047,16 @@
       </a:lvl1pPr>
     </p:titleStyle>
     <p:bodyStyle>
-      <a:lvl1pPr marL="228600" indent="-228600" algn="l" defTabSz="914400" rtl="0" eaLnBrk="1" latinLnBrk="0" hangingPunct="1">
+      <a:lvl1pPr marL="76192" indent="-76192" algn="l" defTabSz="304770" rtl="0" eaLnBrk="1" latinLnBrk="0" hangingPunct="1">
         <a:lnSpc>
           <a:spcPct val="90000"/>
         </a:lnSpc>
         <a:spcBef>
-          <a:spcPts val="1000"/>
+          <a:spcPts val="333"/>
         </a:spcBef>
         <a:buFont typeface="Arial" panose="020B0604020202020204" pitchFamily="34" charset="0"/>
         <a:buChar char="•"/>
-        <a:defRPr sz="2800" kern="1200">
+        <a:defRPr sz="933" kern="1200">
           <a:solidFill>
             <a:schemeClr val="tx1"/>
           </a:solidFill>
@@ -3086,16 +3065,16 @@
           <a:cs typeface="+mn-cs"/>
         </a:defRPr>
       </a:lvl1pPr>
-      <a:lvl2pPr marL="685800" indent="-228600" algn="l" defTabSz="914400" rtl="0" eaLnBrk="1" latinLnBrk="0" hangingPunct="1">
+      <a:lvl2pPr marL="228577" indent="-76192" algn="l" defTabSz="304770" rtl="0" eaLnBrk="1" latinLnBrk="0" hangingPunct="1">
         <a:lnSpc>
           <a:spcPct val="90000"/>
         </a:lnSpc>
         <a:spcBef>
-          <a:spcPts val="500"/>
+          <a:spcPts val="167"/>
         </a:spcBef>
         <a:buFont typeface="Arial" panose="020B0604020202020204" pitchFamily="34" charset="0"/>
         <a:buChar char="•"/>
-        <a:defRPr sz="2400" kern="1200">
+        <a:defRPr sz="800" kern="1200">
           <a:solidFill>
             <a:schemeClr val="tx1"/>
           </a:solidFill>
@@ -3104,16 +3083,16 @@
           <a:cs typeface="+mn-cs"/>
         </a:defRPr>
       </a:lvl2pPr>
-      <a:lvl3pPr marL="1143000" indent="-228600" algn="l" defTabSz="914400" rtl="0" eaLnBrk="1" latinLnBrk="0" hangingPunct="1">
+      <a:lvl3pPr marL="380962" indent="-76192" algn="l" defTabSz="304770" rtl="0" eaLnBrk="1" latinLnBrk="0" hangingPunct="1">
         <a:lnSpc>
           <a:spcPct val="90000"/>
         </a:lnSpc>
         <a:spcBef>
-          <a:spcPts val="500"/>
+          <a:spcPts val="167"/>
         </a:spcBef>
         <a:buFont typeface="Arial" panose="020B0604020202020204" pitchFamily="34" charset="0"/>
         <a:buChar char="•"/>
-        <a:defRPr sz="2000" kern="1200">
+        <a:defRPr sz="667" kern="1200">
           <a:solidFill>
             <a:schemeClr val="tx1"/>
           </a:solidFill>
@@ -3122,16 +3101,16 @@
           <a:cs typeface="+mn-cs"/>
         </a:defRPr>
       </a:lvl3pPr>
-      <a:lvl4pPr marL="1600200" indent="-228600" algn="l" defTabSz="914400" rtl="0" eaLnBrk="1" latinLnBrk="0" hangingPunct="1">
+      <a:lvl4pPr marL="533347" indent="-76192" algn="l" defTabSz="304770" rtl="0" eaLnBrk="1" latinLnBrk="0" hangingPunct="1">
         <a:lnSpc>
           <a:spcPct val="90000"/>
         </a:lnSpc>
         <a:spcBef>
-          <a:spcPts val="500"/>
+          <a:spcPts val="167"/>
         </a:spcBef>
         <a:buFont typeface="Arial" panose="020B0604020202020204" pitchFamily="34" charset="0"/>
         <a:buChar char="•"/>
-        <a:defRPr sz="1800" kern="1200">
+        <a:defRPr sz="600" kern="1200">
           <a:solidFill>
             <a:schemeClr val="tx1"/>
           </a:solidFill>
@@ -3140,16 +3119,16 @@
           <a:cs typeface="+mn-cs"/>
         </a:defRPr>
       </a:lvl4pPr>
-      <a:lvl5pPr marL="2057400" indent="-228600" algn="l" defTabSz="914400" rtl="0" eaLnBrk="1" latinLnBrk="0" hangingPunct="1">
+      <a:lvl5pPr marL="685731" indent="-76192" algn="l" defTabSz="304770" rtl="0" eaLnBrk="1" latinLnBrk="0" hangingPunct="1">
         <a:lnSpc>
           <a:spcPct val="90000"/>
         </a:lnSpc>
         <a:spcBef>
-          <a:spcPts val="500"/>
+          <a:spcPts val="167"/>
         </a:spcBef>
         <a:buFont typeface="Arial" panose="020B0604020202020204" pitchFamily="34" charset="0"/>
         <a:buChar char="•"/>
-        <a:defRPr sz="1800" kern="1200">
+        <a:defRPr sz="600" kern="1200">
           <a:solidFill>
             <a:schemeClr val="tx1"/>
           </a:solidFill>
@@ -3158,16 +3137,16 @@
           <a:cs typeface="+mn-cs"/>
         </a:defRPr>
       </a:lvl5pPr>
-      <a:lvl6pPr marL="2514600" indent="-228600" algn="l" defTabSz="914400" rtl="0" eaLnBrk="1" latinLnBrk="0" hangingPunct="1">
+      <a:lvl6pPr marL="838116" indent="-76192" algn="l" defTabSz="304770" rtl="0" eaLnBrk="1" latinLnBrk="0" hangingPunct="1">
         <a:lnSpc>
           <a:spcPct val="90000"/>
         </a:lnSpc>
         <a:spcBef>
-          <a:spcPts val="500"/>
+          <a:spcPts val="167"/>
         </a:spcBef>
         <a:buFont typeface="Arial" panose="020B0604020202020204" pitchFamily="34" charset="0"/>
         <a:buChar char="•"/>
-        <a:defRPr sz="1800" kern="1200">
+        <a:defRPr sz="600" kern="1200">
           <a:solidFill>
             <a:schemeClr val="tx1"/>
           </a:solidFill>
@@ -3176,16 +3155,16 @@
           <a:cs typeface="+mn-cs"/>
         </a:defRPr>
       </a:lvl6pPr>
-      <a:lvl7pPr marL="2971800" indent="-228600" algn="l" defTabSz="914400" rtl="0" eaLnBrk="1" latinLnBrk="0" hangingPunct="1">
+      <a:lvl7pPr marL="990501" indent="-76192" algn="l" defTabSz="304770" rtl="0" eaLnBrk="1" latinLnBrk="0" hangingPunct="1">
         <a:lnSpc>
           <a:spcPct val="90000"/>
         </a:lnSpc>
         <a:spcBef>
-          <a:spcPts val="500"/>
+          <a:spcPts val="167"/>
         </a:spcBef>
         <a:buFont typeface="Arial" panose="020B0604020202020204" pitchFamily="34" charset="0"/>
         <a:buChar char="•"/>
-        <a:defRPr sz="1800" kern="1200">
+        <a:defRPr sz="600" kern="1200">
           <a:solidFill>
             <a:schemeClr val="tx1"/>
           </a:solidFill>
@@ -3194,16 +3173,16 @@
           <a:cs typeface="+mn-cs"/>
         </a:defRPr>
       </a:lvl7pPr>
-      <a:lvl8pPr marL="3429000" indent="-228600" algn="l" defTabSz="914400" rtl="0" eaLnBrk="1" latinLnBrk="0" hangingPunct="1">
+      <a:lvl8pPr marL="1142886" indent="-76192" algn="l" defTabSz="304770" rtl="0" eaLnBrk="1" latinLnBrk="0" hangingPunct="1">
         <a:lnSpc>
           <a:spcPct val="90000"/>
         </a:lnSpc>
         <a:spcBef>
-          <a:spcPts val="500"/>
+          <a:spcPts val="167"/>
         </a:spcBef>
         <a:buFont typeface="Arial" panose="020B0604020202020204" pitchFamily="34" charset="0"/>
         <a:buChar char="•"/>
-        <a:defRPr sz="1800" kern="1200">
+        <a:defRPr sz="600" kern="1200">
           <a:solidFill>
             <a:schemeClr val="tx1"/>
           </a:solidFill>
@@ -3212,16 +3191,16 @@
           <a:cs typeface="+mn-cs"/>
         </a:defRPr>
       </a:lvl8pPr>
-      <a:lvl9pPr marL="3886200" indent="-228600" algn="l" defTabSz="914400" rtl="0" eaLnBrk="1" latinLnBrk="0" hangingPunct="1">
+      <a:lvl9pPr marL="1295270" indent="-76192" algn="l" defTabSz="304770" rtl="0" eaLnBrk="1" latinLnBrk="0" hangingPunct="1">
         <a:lnSpc>
           <a:spcPct val="90000"/>
         </a:lnSpc>
         <a:spcBef>
-          <a:spcPts val="500"/>
+          <a:spcPts val="167"/>
         </a:spcBef>
         <a:buFont typeface="Arial" panose="020B0604020202020204" pitchFamily="34" charset="0"/>
         <a:buChar char="•"/>
-        <a:defRPr sz="1800" kern="1200">
+        <a:defRPr sz="600" kern="1200">
           <a:solidFill>
             <a:schemeClr val="tx1"/>
           </a:solidFill>
@@ -3235,8 +3214,8 @@
       <a:defPPr>
         <a:defRPr lang="en-US"/>
       </a:defPPr>
-      <a:lvl1pPr marL="0" algn="l" defTabSz="914400" rtl="0" eaLnBrk="1" latinLnBrk="0" hangingPunct="1">
-        <a:defRPr sz="1800" kern="1200">
+      <a:lvl1pPr marL="0" algn="l" defTabSz="304770" rtl="0" eaLnBrk="1" latinLnBrk="0" hangingPunct="1">
+        <a:defRPr sz="600" kern="1200">
           <a:solidFill>
             <a:schemeClr val="tx1"/>
           </a:solidFill>
@@ -3245,8 +3224,8 @@
           <a:cs typeface="+mn-cs"/>
         </a:defRPr>
       </a:lvl1pPr>
-      <a:lvl2pPr marL="457200" algn="l" defTabSz="914400" rtl="0" eaLnBrk="1" latinLnBrk="0" hangingPunct="1">
-        <a:defRPr sz="1800" kern="1200">
+      <a:lvl2pPr marL="152385" algn="l" defTabSz="304770" rtl="0" eaLnBrk="1" latinLnBrk="0" hangingPunct="1">
+        <a:defRPr sz="600" kern="1200">
           <a:solidFill>
             <a:schemeClr val="tx1"/>
           </a:solidFill>
@@ -3255,8 +3234,8 @@
           <a:cs typeface="+mn-cs"/>
         </a:defRPr>
       </a:lvl2pPr>
-      <a:lvl3pPr marL="914400" algn="l" defTabSz="914400" rtl="0" eaLnBrk="1" latinLnBrk="0" hangingPunct="1">
-        <a:defRPr sz="1800" kern="1200">
+      <a:lvl3pPr marL="304770" algn="l" defTabSz="304770" rtl="0" eaLnBrk="1" latinLnBrk="0" hangingPunct="1">
+        <a:defRPr sz="600" kern="1200">
           <a:solidFill>
             <a:schemeClr val="tx1"/>
           </a:solidFill>
@@ -3265,8 +3244,8 @@
           <a:cs typeface="+mn-cs"/>
         </a:defRPr>
       </a:lvl3pPr>
-      <a:lvl4pPr marL="1371600" algn="l" defTabSz="914400" rtl="0" eaLnBrk="1" latinLnBrk="0" hangingPunct="1">
-        <a:defRPr sz="1800" kern="1200">
+      <a:lvl4pPr marL="457154" algn="l" defTabSz="304770" rtl="0" eaLnBrk="1" latinLnBrk="0" hangingPunct="1">
+        <a:defRPr sz="600" kern="1200">
           <a:solidFill>
             <a:schemeClr val="tx1"/>
           </a:solidFill>
@@ -3275,8 +3254,8 @@
           <a:cs typeface="+mn-cs"/>
         </a:defRPr>
       </a:lvl4pPr>
-      <a:lvl5pPr marL="1828800" algn="l" defTabSz="914400" rtl="0" eaLnBrk="1" latinLnBrk="0" hangingPunct="1">
-        <a:defRPr sz="1800" kern="1200">
+      <a:lvl5pPr marL="609539" algn="l" defTabSz="304770" rtl="0" eaLnBrk="1" latinLnBrk="0" hangingPunct="1">
+        <a:defRPr sz="600" kern="1200">
           <a:solidFill>
             <a:schemeClr val="tx1"/>
           </a:solidFill>
@@ -3285,8 +3264,8 @@
           <a:cs typeface="+mn-cs"/>
         </a:defRPr>
       </a:lvl5pPr>
-      <a:lvl6pPr marL="2286000" algn="l" defTabSz="914400" rtl="0" eaLnBrk="1" latinLnBrk="0" hangingPunct="1">
-        <a:defRPr sz="1800" kern="1200">
+      <a:lvl6pPr marL="761924" algn="l" defTabSz="304770" rtl="0" eaLnBrk="1" latinLnBrk="0" hangingPunct="1">
+        <a:defRPr sz="600" kern="1200">
           <a:solidFill>
             <a:schemeClr val="tx1"/>
           </a:solidFill>
@@ -3295,8 +3274,8 @@
           <a:cs typeface="+mn-cs"/>
         </a:defRPr>
       </a:lvl6pPr>
-      <a:lvl7pPr marL="2743200" algn="l" defTabSz="914400" rtl="0" eaLnBrk="1" latinLnBrk="0" hangingPunct="1">
-        <a:defRPr sz="1800" kern="1200">
+      <a:lvl7pPr marL="914309" algn="l" defTabSz="304770" rtl="0" eaLnBrk="1" latinLnBrk="0" hangingPunct="1">
+        <a:defRPr sz="600" kern="1200">
           <a:solidFill>
             <a:schemeClr val="tx1"/>
           </a:solidFill>
@@ -3305,8 +3284,8 @@
           <a:cs typeface="+mn-cs"/>
         </a:defRPr>
       </a:lvl7pPr>
-      <a:lvl8pPr marL="3200400" algn="l" defTabSz="914400" rtl="0" eaLnBrk="1" latinLnBrk="0" hangingPunct="1">
-        <a:defRPr sz="1800" kern="1200">
+      <a:lvl8pPr marL="1066693" algn="l" defTabSz="304770" rtl="0" eaLnBrk="1" latinLnBrk="0" hangingPunct="1">
+        <a:defRPr sz="600" kern="1200">
           <a:solidFill>
             <a:schemeClr val="tx1"/>
           </a:solidFill>
@@ -3315,8 +3294,8 @@
           <a:cs typeface="+mn-cs"/>
         </a:defRPr>
       </a:lvl8pPr>
-      <a:lvl9pPr marL="3657600" algn="l" defTabSz="914400" rtl="0" eaLnBrk="1" latinLnBrk="0" hangingPunct="1">
-        <a:defRPr sz="1800" kern="1200">
+      <a:lvl9pPr marL="1219078" algn="l" defTabSz="304770" rtl="0" eaLnBrk="1" latinLnBrk="0" hangingPunct="1">
+        <a:defRPr sz="600" kern="1200">
           <a:solidFill>
             <a:schemeClr val="tx1"/>
           </a:solidFill>
@@ -3347,265 +3326,553 @@
           <a:chExt cx="0" cy="0"/>
         </a:xfrm>
       </p:grpSpPr>
-      <p:sp>
-        <p:nvSpPr>
-          <p:cNvPr id="5" name="TextBox 4">
+      <p:grpSp>
+        <p:nvGrpSpPr>
+          <p:cNvPr id="43" name="Group 42">
             <a:extLst>
               <a:ext uri="{FF2B5EF4-FFF2-40B4-BE49-F238E27FC236}">
-                <a16:creationId xmlns:a16="http://schemas.microsoft.com/office/drawing/2014/main" id="{669B4812-0FD3-0052-C802-02DF5E97FBE7}"/>
+                <a16:creationId xmlns:a16="http://schemas.microsoft.com/office/drawing/2014/main" id="{570AB814-DF1C-4D7C-D764-1ED27102B5AC}"/>
               </a:ext>
             </a:extLst>
           </p:cNvPr>
-          <p:cNvSpPr txBox="1"/>
+          <p:cNvGrpSpPr/>
           <p:nvPr/>
-        </p:nvSpPr>
-        <p:spPr>
+        </p:nvGrpSpPr>
+        <p:grpSpPr>
           <a:xfrm>
-            <a:off x="426852" y="3437760"/>
-            <a:ext cx="1589314" cy="369332"/>
+            <a:off x="190687" y="150053"/>
+            <a:ext cx="13791826" cy="1985897"/>
+            <a:chOff x="64879" y="17457"/>
+            <a:chExt cx="13791826" cy="1985897"/>
           </a:xfrm>
-          <a:prstGeom prst="rect">
-            <a:avLst/>
-          </a:prstGeom>
-          <a:noFill/>
-          <a:ln>
-            <a:solidFill>
+        </p:grpSpPr>
+        <p:sp>
+          <p:nvSpPr>
+            <p:cNvPr id="30" name="TextBox 29">
+              <a:extLst>
+                <a:ext uri="{FF2B5EF4-FFF2-40B4-BE49-F238E27FC236}">
+                  <a16:creationId xmlns:a16="http://schemas.microsoft.com/office/drawing/2014/main" id="{DA33E62D-A4F9-7C53-8DD1-7E075B3539F6}"/>
+                </a:ext>
+              </a:extLst>
+            </p:cNvPr>
+            <p:cNvSpPr txBox="1"/>
+            <p:nvPr/>
+          </p:nvSpPr>
+          <p:spPr>
+            <a:xfrm>
+              <a:off x="64879" y="1162907"/>
+              <a:ext cx="1312941" cy="830997"/>
+            </a:xfrm>
+            <a:prstGeom prst="rect">
+              <a:avLst/>
+            </a:prstGeom>
+            <a:noFill/>
+            <a:ln>
+              <a:solidFill>
+                <a:schemeClr val="tx1"/>
+              </a:solidFill>
+            </a:ln>
+          </p:spPr>
+          <p:txBody>
+            <a:bodyPr wrap="square" rtlCol="0">
+              <a:spAutoFit/>
+            </a:bodyPr>
+            <a:lstStyle/>
+            <a:p>
+              <a:pPr algn="ctr"/>
+              <a:r>
+                <a:rPr lang="en-GB" sz="2400" dirty="0">
+                  <a:latin typeface="Times New Roman" panose="02020603050405020304" pitchFamily="18" charset="0"/>
+                  <a:cs typeface="Times New Roman" panose="02020603050405020304" pitchFamily="18" charset="0"/>
+                </a:rPr>
+                <a:t>Meaning</a:t>
+              </a:r>
+            </a:p>
+            <a:p>
+              <a:pPr algn="ctr"/>
+              <a:r>
+                <a:rPr lang="en-GB" sz="2400" dirty="0">
+                  <a:latin typeface="Times New Roman" panose="02020603050405020304" pitchFamily="18" charset="0"/>
+                  <a:cs typeface="Times New Roman" panose="02020603050405020304" pitchFamily="18" charset="0"/>
+                </a:rPr>
+                <a:t>(</a:t>
+              </a:r>
+              <a:r>
+                <a:rPr lang="en-GB" sz="2400" i="1" dirty="0">
+                  <a:latin typeface="Times New Roman" panose="02020603050405020304" pitchFamily="18" charset="0"/>
+                  <a:cs typeface="Times New Roman" panose="02020603050405020304" pitchFamily="18" charset="0"/>
+                </a:rPr>
+                <a:t>m</a:t>
+              </a:r>
+              <a:r>
+                <a:rPr lang="en-GB" sz="2400" i="1" baseline="-25000" dirty="0">
+                  <a:latin typeface="Times New Roman" panose="02020603050405020304" pitchFamily="18" charset="0"/>
+                  <a:cs typeface="Times New Roman" panose="02020603050405020304" pitchFamily="18" charset="0"/>
+                </a:rPr>
+                <a:t>i</a:t>
+              </a:r>
+              <a:r>
+                <a:rPr lang="en-GB" sz="2400" dirty="0">
+                  <a:latin typeface="Times New Roman" panose="02020603050405020304" pitchFamily="18" charset="0"/>
+                  <a:cs typeface="Times New Roman" panose="02020603050405020304" pitchFamily="18" charset="0"/>
+                </a:rPr>
+                <a:t>)</a:t>
+              </a:r>
+            </a:p>
+          </p:txBody>
+        </p:sp>
+        <p:sp>
+          <p:nvSpPr>
+            <p:cNvPr id="31" name="TextBox 30">
+              <a:extLst>
+                <a:ext uri="{FF2B5EF4-FFF2-40B4-BE49-F238E27FC236}">
+                  <a16:creationId xmlns:a16="http://schemas.microsoft.com/office/drawing/2014/main" id="{DEEAF500-0C83-14C2-2385-05CF32DF4AAC}"/>
+                </a:ext>
+              </a:extLst>
+            </p:cNvPr>
+            <p:cNvSpPr txBox="1"/>
+            <p:nvPr/>
+          </p:nvSpPr>
+          <p:spPr>
+            <a:xfrm>
+              <a:off x="2397362" y="1162909"/>
+              <a:ext cx="2492831" cy="830997"/>
+            </a:xfrm>
+            <a:prstGeom prst="rect">
+              <a:avLst/>
+            </a:prstGeom>
+            <a:noFill/>
+            <a:ln>
+              <a:solidFill>
+                <a:schemeClr val="tx1"/>
+              </a:solidFill>
+            </a:ln>
+          </p:spPr>
+          <p:txBody>
+            <a:bodyPr wrap="square" rtlCol="0">
+              <a:spAutoFit/>
+            </a:bodyPr>
+            <a:lstStyle/>
+            <a:p>
+              <a:pPr algn="ctr"/>
+              <a:r>
+                <a:rPr lang="en-GB" sz="2400" dirty="0">
+                  <a:latin typeface="Times New Roman" panose="02020603050405020304" pitchFamily="18" charset="0"/>
+                  <a:cs typeface="Times New Roman" panose="02020603050405020304" pitchFamily="18" charset="0"/>
+                </a:rPr>
+                <a:t>Signal/Utterance (</a:t>
+              </a:r>
+              <a:r>
+                <a:rPr lang="en-GB" sz="2400" i="1" dirty="0" err="1">
+                  <a:latin typeface="Times New Roman" panose="02020603050405020304" pitchFamily="18" charset="0"/>
+                  <a:cs typeface="Times New Roman" panose="02020603050405020304" pitchFamily="18" charset="0"/>
+                </a:rPr>
+                <a:t>u</a:t>
+              </a:r>
+              <a:r>
+                <a:rPr lang="en-GB" sz="2400" i="1" baseline="-25000" dirty="0" err="1">
+                  <a:latin typeface="Times New Roman" panose="02020603050405020304" pitchFamily="18" charset="0"/>
+                  <a:cs typeface="Times New Roman" panose="02020603050405020304" pitchFamily="18" charset="0"/>
+                </a:rPr>
+                <a:t>i</a:t>
+              </a:r>
+              <a:r>
+                <a:rPr lang="en-GB" sz="2400" dirty="0">
+                  <a:latin typeface="Times New Roman" panose="02020603050405020304" pitchFamily="18" charset="0"/>
+                  <a:cs typeface="Times New Roman" panose="02020603050405020304" pitchFamily="18" charset="0"/>
+                </a:rPr>
+                <a:t>)</a:t>
+              </a:r>
+            </a:p>
+          </p:txBody>
+        </p:sp>
+        <p:sp>
+          <p:nvSpPr>
+            <p:cNvPr id="32" name="TextBox 31">
+              <a:extLst>
+                <a:ext uri="{FF2B5EF4-FFF2-40B4-BE49-F238E27FC236}">
+                  <a16:creationId xmlns:a16="http://schemas.microsoft.com/office/drawing/2014/main" id="{49302DC4-2E9E-690C-B8CD-8EBA1A75A582}"/>
+                </a:ext>
+              </a:extLst>
+            </p:cNvPr>
+            <p:cNvSpPr txBox="1"/>
+            <p:nvPr/>
+          </p:nvSpPr>
+          <p:spPr>
+            <a:xfrm>
+              <a:off x="9035927" y="1162908"/>
+              <a:ext cx="2492831" cy="830997"/>
+            </a:xfrm>
+            <a:prstGeom prst="rect">
+              <a:avLst/>
+            </a:prstGeom>
+            <a:noFill/>
+            <a:ln>
+              <a:solidFill>
+                <a:schemeClr val="tx1"/>
+              </a:solidFill>
+            </a:ln>
+          </p:spPr>
+          <p:txBody>
+            <a:bodyPr wrap="square" rtlCol="0">
+              <a:spAutoFit/>
+            </a:bodyPr>
+            <a:lstStyle/>
+            <a:p>
+              <a:pPr algn="ctr"/>
+              <a:r>
+                <a:rPr lang="en-GB" sz="2400" dirty="0">
+                  <a:latin typeface="Times New Roman" panose="02020603050405020304" pitchFamily="18" charset="0"/>
+                  <a:cs typeface="Times New Roman" panose="02020603050405020304" pitchFamily="18" charset="0"/>
+                </a:rPr>
+                <a:t>Signal/Utterance (</a:t>
+              </a:r>
+              <a:r>
+                <a:rPr lang="en-GB" sz="2400" i="1" dirty="0">
+                  <a:latin typeface="Times New Roman" panose="02020603050405020304" pitchFamily="18" charset="0"/>
+                  <a:cs typeface="Times New Roman" panose="02020603050405020304" pitchFamily="18" charset="0"/>
+                </a:rPr>
+                <a:t>u</a:t>
+              </a:r>
+              <a:r>
+                <a:rPr lang="en-GB" sz="2400" i="1" baseline="-25000" dirty="0">
+                  <a:latin typeface="Times New Roman" panose="02020603050405020304" pitchFamily="18" charset="0"/>
+                  <a:cs typeface="Times New Roman" panose="02020603050405020304" pitchFamily="18" charset="0"/>
+                </a:rPr>
+                <a:t>p</a:t>
+              </a:r>
+              <a:r>
+                <a:rPr lang="en-GB" sz="2400" dirty="0">
+                  <a:latin typeface="Times New Roman" panose="02020603050405020304" pitchFamily="18" charset="0"/>
+                  <a:cs typeface="Times New Roman" panose="02020603050405020304" pitchFamily="18" charset="0"/>
+                </a:rPr>
+                <a:t>)</a:t>
+              </a:r>
+            </a:p>
+          </p:txBody>
+        </p:sp>
+        <p:sp>
+          <p:nvSpPr>
+            <p:cNvPr id="33" name="TextBox 32">
+              <a:extLst>
+                <a:ext uri="{FF2B5EF4-FFF2-40B4-BE49-F238E27FC236}">
+                  <a16:creationId xmlns:a16="http://schemas.microsoft.com/office/drawing/2014/main" id="{56A8F106-20CB-15EE-BC2A-04DC56E0E456}"/>
+                </a:ext>
+              </a:extLst>
+            </p:cNvPr>
+            <p:cNvSpPr txBox="1"/>
+            <p:nvPr/>
+          </p:nvSpPr>
+          <p:spPr>
+            <a:xfrm>
+              <a:off x="12543764" y="1172357"/>
+              <a:ext cx="1312941" cy="830997"/>
+            </a:xfrm>
+            <a:prstGeom prst="rect">
+              <a:avLst/>
+            </a:prstGeom>
+            <a:noFill/>
+            <a:ln>
+              <a:solidFill>
+                <a:schemeClr val="tx1"/>
+              </a:solidFill>
+            </a:ln>
+          </p:spPr>
+          <p:txBody>
+            <a:bodyPr wrap="square" rtlCol="0">
+              <a:spAutoFit/>
+            </a:bodyPr>
+            <a:lstStyle/>
+            <a:p>
+              <a:pPr algn="ctr"/>
+              <a:r>
+                <a:rPr lang="en-GB" sz="2400" dirty="0">
+                  <a:latin typeface="Times New Roman" panose="02020603050405020304" pitchFamily="18" charset="0"/>
+                  <a:cs typeface="Times New Roman" panose="02020603050405020304" pitchFamily="18" charset="0"/>
+                </a:rPr>
+                <a:t>Meaning (</a:t>
+              </a:r>
+              <a:r>
+                <a:rPr lang="en-GB" sz="2400" i="1" dirty="0" err="1">
+                  <a:latin typeface="Times New Roman" panose="02020603050405020304" pitchFamily="18" charset="0"/>
+                  <a:cs typeface="Times New Roman" panose="02020603050405020304" pitchFamily="18" charset="0"/>
+                </a:rPr>
+                <a:t>m</a:t>
+              </a:r>
+              <a:r>
+                <a:rPr lang="en-GB" sz="2400" i="1" baseline="-25000" dirty="0" err="1">
+                  <a:latin typeface="Times New Roman" panose="02020603050405020304" pitchFamily="18" charset="0"/>
+                  <a:cs typeface="Times New Roman" panose="02020603050405020304" pitchFamily="18" charset="0"/>
+                </a:rPr>
+                <a:t>p</a:t>
+              </a:r>
+              <a:r>
+                <a:rPr lang="en-GB" sz="2400" dirty="0">
+                  <a:latin typeface="Times New Roman" panose="02020603050405020304" pitchFamily="18" charset="0"/>
+                  <a:cs typeface="Times New Roman" panose="02020603050405020304" pitchFamily="18" charset="0"/>
+                </a:rPr>
+                <a:t>)</a:t>
+              </a:r>
+            </a:p>
+          </p:txBody>
+        </p:sp>
+        <p:sp>
+          <p:nvSpPr>
+            <p:cNvPr id="34" name="TextBox 33">
+              <a:extLst>
+                <a:ext uri="{FF2B5EF4-FFF2-40B4-BE49-F238E27FC236}">
+                  <a16:creationId xmlns:a16="http://schemas.microsoft.com/office/drawing/2014/main" id="{A5791474-B410-3117-D855-B48BC0AC75C8}"/>
+                </a:ext>
+              </a:extLst>
+            </p:cNvPr>
+            <p:cNvSpPr txBox="1"/>
+            <p:nvPr/>
+          </p:nvSpPr>
+          <p:spPr>
+            <a:xfrm>
+              <a:off x="5953861" y="1172357"/>
+              <a:ext cx="2013862" cy="830997"/>
+            </a:xfrm>
+            <a:prstGeom prst="rect">
+              <a:avLst/>
+            </a:prstGeom>
+            <a:noFill/>
+            <a:ln>
+              <a:solidFill>
+                <a:schemeClr val="tx1"/>
+              </a:solidFill>
+            </a:ln>
+          </p:spPr>
+          <p:txBody>
+            <a:bodyPr wrap="square" rtlCol="0">
+              <a:spAutoFit/>
+            </a:bodyPr>
+            <a:lstStyle/>
+            <a:p>
+              <a:pPr algn="ctr"/>
+              <a:r>
+                <a:rPr lang="en-GB" sz="2400" dirty="0">
+                  <a:latin typeface="Times New Roman" panose="02020603050405020304" pitchFamily="18" charset="0"/>
+                  <a:cs typeface="Times New Roman" panose="02020603050405020304" pitchFamily="18" charset="0"/>
+                </a:rPr>
+                <a:t>Noisy channel</a:t>
+              </a:r>
+            </a:p>
+            <a:p>
+              <a:pPr algn="ctr"/>
+              <a:r>
+                <a:rPr lang="en-GB" sz="2400" dirty="0">
+                  <a:latin typeface="Times New Roman" panose="02020603050405020304" pitchFamily="18" charset="0"/>
+                  <a:cs typeface="Times New Roman" panose="02020603050405020304" pitchFamily="18" charset="0"/>
+                </a:rPr>
+                <a:t>(</a:t>
+              </a:r>
+              <a:r>
+                <a:rPr lang="en-GB" sz="2400" i="1" dirty="0">
+                  <a:latin typeface="Times New Roman" panose="02020603050405020304" pitchFamily="18" charset="0"/>
+                  <a:cs typeface="Times New Roman" panose="02020603050405020304" pitchFamily="18" charset="0"/>
+                </a:rPr>
+                <a:t>N</a:t>
+              </a:r>
+              <a:r>
+                <a:rPr lang="en-GB" sz="2400" dirty="0">
+                  <a:latin typeface="Times New Roman" panose="02020603050405020304" pitchFamily="18" charset="0"/>
+                  <a:cs typeface="Times New Roman" panose="02020603050405020304" pitchFamily="18" charset="0"/>
+                </a:rPr>
+                <a:t>)</a:t>
+              </a:r>
+            </a:p>
+          </p:txBody>
+        </p:sp>
+        <p:sp>
+          <p:nvSpPr>
+            <p:cNvPr id="35" name="Left Brace 34">
+              <a:extLst>
+                <a:ext uri="{FF2B5EF4-FFF2-40B4-BE49-F238E27FC236}">
+                  <a16:creationId xmlns:a16="http://schemas.microsoft.com/office/drawing/2014/main" id="{556CCC81-994F-A26C-24BF-D677F687CE1E}"/>
+                </a:ext>
+              </a:extLst>
+            </p:cNvPr>
+            <p:cNvSpPr/>
+            <p:nvPr/>
+          </p:nvSpPr>
+          <p:spPr>
+            <a:xfrm rot="5400000">
+              <a:off x="1945661" y="-650609"/>
+              <a:ext cx="478973" cy="2918015"/>
+            </a:xfrm>
+            <a:prstGeom prst="leftBrace">
+              <a:avLst/>
+            </a:prstGeom>
+          </p:spPr>
+          <p:style>
+            <a:lnRef idx="3">
+              <a:schemeClr val="dk1"/>
+            </a:lnRef>
+            <a:fillRef idx="0">
+              <a:schemeClr val="dk1"/>
+            </a:fillRef>
+            <a:effectRef idx="2">
+              <a:schemeClr val="dk1"/>
+            </a:effectRef>
+            <a:fontRef idx="minor">
               <a:schemeClr val="tx1"/>
-            </a:solidFill>
-          </a:ln>
-        </p:spPr>
-        <p:txBody>
-          <a:bodyPr wrap="square" rtlCol="0">
-            <a:spAutoFit/>
-          </a:bodyPr>
-          <a:lstStyle/>
-          <a:p>
-            <a:pPr algn="ctr"/>
-            <a:r>
-              <a:rPr lang="en-GB" dirty="0"/>
-              <a:t>Meaning (</a:t>
-            </a:r>
-            <a:r>
-              <a:rPr lang="en-GB" i="1" dirty="0"/>
-              <a:t>m</a:t>
-            </a:r>
-            <a:r>
-              <a:rPr lang="en-GB" i="1" baseline="-25000" dirty="0"/>
-              <a:t>i</a:t>
-            </a:r>
-            <a:r>
-              <a:rPr lang="en-GB" dirty="0"/>
-              <a:t>)</a:t>
-            </a:r>
-          </a:p>
-        </p:txBody>
-      </p:sp>
-      <p:sp>
-        <p:nvSpPr>
-          <p:cNvPr id="6" name="TextBox 5">
+            </a:fontRef>
+          </p:style>
+          <p:txBody>
+            <a:bodyPr rtlCol="0" anchor="ctr"/>
+            <a:lstStyle/>
+            <a:p>
+              <a:pPr algn="ctr"/>
+              <a:endParaRPr lang="en-GB" sz="2400">
+                <a:latin typeface="Times New Roman" panose="02020603050405020304" pitchFamily="18" charset="0"/>
+                <a:cs typeface="Times New Roman" panose="02020603050405020304" pitchFamily="18" charset="0"/>
+              </a:endParaRPr>
+            </a:p>
+          </p:txBody>
+        </p:sp>
+        <p:sp>
+          <p:nvSpPr>
+            <p:cNvPr id="36" name="Left Brace 35">
+              <a:extLst>
+                <a:ext uri="{FF2B5EF4-FFF2-40B4-BE49-F238E27FC236}">
+                  <a16:creationId xmlns:a16="http://schemas.microsoft.com/office/drawing/2014/main" id="{A36E467C-7D7B-A556-DB48-E2FE90097755}"/>
+                </a:ext>
+              </a:extLst>
+            </p:cNvPr>
+            <p:cNvSpPr/>
+            <p:nvPr/>
+          </p:nvSpPr>
+          <p:spPr>
+            <a:xfrm rot="5400000">
+              <a:off x="11518242" y="-638882"/>
+              <a:ext cx="455524" cy="2918016"/>
+            </a:xfrm>
+            <a:prstGeom prst="leftBrace">
+              <a:avLst/>
+            </a:prstGeom>
+          </p:spPr>
+          <p:style>
+            <a:lnRef idx="3">
+              <a:schemeClr val="dk1"/>
+            </a:lnRef>
+            <a:fillRef idx="0">
+              <a:schemeClr val="dk1"/>
+            </a:fillRef>
+            <a:effectRef idx="2">
+              <a:schemeClr val="dk1"/>
+            </a:effectRef>
+            <a:fontRef idx="minor">
+              <a:schemeClr val="tx1"/>
+            </a:fontRef>
+          </p:style>
+          <p:txBody>
+            <a:bodyPr rtlCol="0" anchor="ctr"/>
+            <a:lstStyle/>
+            <a:p>
+              <a:pPr algn="ctr"/>
+              <a:endParaRPr lang="en-GB" sz="2400">
+                <a:latin typeface="Times New Roman" panose="02020603050405020304" pitchFamily="18" charset="0"/>
+                <a:cs typeface="Times New Roman" panose="02020603050405020304" pitchFamily="18" charset="0"/>
+              </a:endParaRPr>
+            </a:p>
+          </p:txBody>
+        </p:sp>
+        <p:sp>
+          <p:nvSpPr>
+            <p:cNvPr id="41" name="TextBox 40">
+              <a:extLst>
+                <a:ext uri="{FF2B5EF4-FFF2-40B4-BE49-F238E27FC236}">
+                  <a16:creationId xmlns:a16="http://schemas.microsoft.com/office/drawing/2014/main" id="{386F6264-68E2-FB80-34A6-BB56FBDD6FF7}"/>
+                </a:ext>
+              </a:extLst>
+            </p:cNvPr>
+            <p:cNvSpPr txBox="1"/>
+            <p:nvPr/>
+          </p:nvSpPr>
+          <p:spPr>
+            <a:xfrm>
+              <a:off x="1460162" y="17457"/>
+              <a:ext cx="1449969" cy="461665"/>
+            </a:xfrm>
+            <a:prstGeom prst="rect">
+              <a:avLst/>
+            </a:prstGeom>
+            <a:noFill/>
+            <a:ln>
+              <a:solidFill>
+                <a:schemeClr val="tx1"/>
+              </a:solidFill>
+            </a:ln>
+          </p:spPr>
+          <p:txBody>
+            <a:bodyPr wrap="square" rtlCol="0">
+              <a:spAutoFit/>
+            </a:bodyPr>
+            <a:lstStyle/>
+            <a:p>
+              <a:pPr algn="ctr"/>
+              <a:r>
+                <a:rPr lang="en-GB" sz="2400" dirty="0">
+                  <a:latin typeface="Times New Roman" panose="02020603050405020304" pitchFamily="18" charset="0"/>
+                  <a:cs typeface="Times New Roman" panose="02020603050405020304" pitchFamily="18" charset="0"/>
+                </a:rPr>
+                <a:t>Intended</a:t>
+              </a:r>
+            </a:p>
+          </p:txBody>
+        </p:sp>
+        <p:sp>
+          <p:nvSpPr>
+            <p:cNvPr id="42" name="TextBox 41">
+              <a:extLst>
+                <a:ext uri="{FF2B5EF4-FFF2-40B4-BE49-F238E27FC236}">
+                  <a16:creationId xmlns:a16="http://schemas.microsoft.com/office/drawing/2014/main" id="{D698E6FB-B335-C7C1-D2EC-8DD35E113C11}"/>
+                </a:ext>
+              </a:extLst>
+            </p:cNvPr>
+            <p:cNvSpPr txBox="1"/>
+            <p:nvPr/>
+          </p:nvSpPr>
+          <p:spPr>
+            <a:xfrm>
+              <a:off x="11021019" y="18704"/>
+              <a:ext cx="1449969" cy="461665"/>
+            </a:xfrm>
+            <a:prstGeom prst="rect">
+              <a:avLst/>
+            </a:prstGeom>
+            <a:noFill/>
+            <a:ln>
+              <a:solidFill>
+                <a:schemeClr val="tx1"/>
+              </a:solidFill>
+            </a:ln>
+          </p:spPr>
+          <p:txBody>
+            <a:bodyPr wrap="square" rtlCol="0">
+              <a:spAutoFit/>
+            </a:bodyPr>
+            <a:lstStyle/>
+            <a:p>
+              <a:pPr algn="ctr"/>
+              <a:r>
+                <a:rPr lang="en-GB" sz="2400" dirty="0">
+                  <a:latin typeface="Times New Roman" panose="02020603050405020304" pitchFamily="18" charset="0"/>
+                  <a:cs typeface="Times New Roman" panose="02020603050405020304" pitchFamily="18" charset="0"/>
+                </a:rPr>
+                <a:t>Perceived</a:t>
+              </a:r>
+            </a:p>
+          </p:txBody>
+        </p:sp>
+      </p:grpSp>
+      <p:sp>
+        <p:nvSpPr>
+          <p:cNvPr id="45" name="Right Arrow 44">
             <a:extLst>
               <a:ext uri="{FF2B5EF4-FFF2-40B4-BE49-F238E27FC236}">
-                <a16:creationId xmlns:a16="http://schemas.microsoft.com/office/drawing/2014/main" id="{A417AE7B-9FA9-7FC8-F199-222DB6B2948D}"/>
-              </a:ext>
-            </a:extLst>
-          </p:cNvPr>
-          <p:cNvSpPr txBox="1"/>
-          <p:nvPr/>
-        </p:nvSpPr>
-        <p:spPr>
-          <a:xfrm>
-            <a:off x="2576780" y="3447864"/>
-            <a:ext cx="2177143" cy="369332"/>
-          </a:xfrm>
-          <a:prstGeom prst="rect">
-            <a:avLst/>
-          </a:prstGeom>
-          <a:noFill/>
-          <a:ln>
-            <a:solidFill>
-              <a:schemeClr val="tx1"/>
-            </a:solidFill>
-          </a:ln>
-        </p:spPr>
-        <p:txBody>
-          <a:bodyPr wrap="square" rtlCol="0">
-            <a:spAutoFit/>
-          </a:bodyPr>
-          <a:lstStyle/>
-          <a:p>
-            <a:pPr algn="ctr"/>
-            <a:r>
-              <a:rPr lang="en-GB" dirty="0"/>
-              <a:t>Signal/Utterance (</a:t>
-            </a:r>
-            <a:r>
-              <a:rPr lang="en-GB" i="1" dirty="0" err="1"/>
-              <a:t>u</a:t>
-            </a:r>
-            <a:r>
-              <a:rPr lang="en-GB" i="1" baseline="-25000" dirty="0" err="1"/>
-              <a:t>i</a:t>
-            </a:r>
-            <a:r>
-              <a:rPr lang="en-GB" dirty="0"/>
-              <a:t>)</a:t>
-            </a:r>
-          </a:p>
-        </p:txBody>
-      </p:sp>
-      <p:sp>
-        <p:nvSpPr>
-          <p:cNvPr id="7" name="TextBox 6">
-            <a:extLst>
-              <a:ext uri="{FF2B5EF4-FFF2-40B4-BE49-F238E27FC236}">
-                <a16:creationId xmlns:a16="http://schemas.microsoft.com/office/drawing/2014/main" id="{4F065650-3CE1-D743-2014-43517B1EBD45}"/>
-              </a:ext>
-            </a:extLst>
-          </p:cNvPr>
-          <p:cNvSpPr txBox="1"/>
-          <p:nvPr/>
-        </p:nvSpPr>
-        <p:spPr>
-          <a:xfrm>
-            <a:off x="7464466" y="3437760"/>
-            <a:ext cx="2177143" cy="369332"/>
-          </a:xfrm>
-          <a:prstGeom prst="rect">
-            <a:avLst/>
-          </a:prstGeom>
-          <a:noFill/>
-          <a:ln>
-            <a:solidFill>
-              <a:schemeClr val="tx1"/>
-            </a:solidFill>
-          </a:ln>
-        </p:spPr>
-        <p:txBody>
-          <a:bodyPr wrap="square" rtlCol="0">
-            <a:spAutoFit/>
-          </a:bodyPr>
-          <a:lstStyle/>
-          <a:p>
-            <a:pPr algn="ctr"/>
-            <a:r>
-              <a:rPr lang="en-GB" dirty="0"/>
-              <a:t>Signal/Utterance (</a:t>
-            </a:r>
-            <a:r>
-              <a:rPr lang="en-GB" i="1" dirty="0"/>
-              <a:t>u</a:t>
-            </a:r>
-            <a:r>
-              <a:rPr lang="en-GB" i="1" baseline="-25000" dirty="0"/>
-              <a:t>p</a:t>
-            </a:r>
-            <a:r>
-              <a:rPr lang="en-GB" dirty="0"/>
-              <a:t>)</a:t>
-            </a:r>
-          </a:p>
-        </p:txBody>
-      </p:sp>
-      <p:sp>
-        <p:nvSpPr>
-          <p:cNvPr id="8" name="TextBox 7">
-            <a:extLst>
-              <a:ext uri="{FF2B5EF4-FFF2-40B4-BE49-F238E27FC236}">
-                <a16:creationId xmlns:a16="http://schemas.microsoft.com/office/drawing/2014/main" id="{BB35AE12-384C-742C-042B-DB442C30AB77}"/>
-              </a:ext>
-            </a:extLst>
-          </p:cNvPr>
-          <p:cNvSpPr txBox="1"/>
-          <p:nvPr/>
-        </p:nvSpPr>
-        <p:spPr>
-          <a:xfrm>
-            <a:off x="10202224" y="3437760"/>
-            <a:ext cx="1589314" cy="369332"/>
-          </a:xfrm>
-          <a:prstGeom prst="rect">
-            <a:avLst/>
-          </a:prstGeom>
-          <a:noFill/>
-          <a:ln>
-            <a:solidFill>
-              <a:schemeClr val="tx1"/>
-            </a:solidFill>
-          </a:ln>
-        </p:spPr>
-        <p:txBody>
-          <a:bodyPr wrap="square" rtlCol="0">
-            <a:spAutoFit/>
-          </a:bodyPr>
-          <a:lstStyle/>
-          <a:p>
-            <a:pPr algn="ctr"/>
-            <a:r>
-              <a:rPr lang="en-GB" dirty="0"/>
-              <a:t>Meaning (</a:t>
-            </a:r>
-            <a:r>
-              <a:rPr lang="en-GB" i="1" dirty="0" err="1"/>
-              <a:t>m</a:t>
-            </a:r>
-            <a:r>
-              <a:rPr lang="en-GB" i="1" baseline="-25000" dirty="0" err="1"/>
-              <a:t>p</a:t>
-            </a:r>
-            <a:r>
-              <a:rPr lang="en-GB" dirty="0"/>
-              <a:t>)</a:t>
-            </a:r>
-          </a:p>
-        </p:txBody>
-      </p:sp>
-      <p:sp>
-        <p:nvSpPr>
-          <p:cNvPr id="12" name="TextBox 11">
-            <a:extLst>
-              <a:ext uri="{FF2B5EF4-FFF2-40B4-BE49-F238E27FC236}">
-                <a16:creationId xmlns:a16="http://schemas.microsoft.com/office/drawing/2014/main" id="{286280AD-2F41-77FF-552F-7DBB65628647}"/>
-              </a:ext>
-            </a:extLst>
-          </p:cNvPr>
-          <p:cNvSpPr txBox="1"/>
-          <p:nvPr/>
-        </p:nvSpPr>
-        <p:spPr>
-          <a:xfrm>
-            <a:off x="5314538" y="3437760"/>
-            <a:ext cx="1589314" cy="369332"/>
-          </a:xfrm>
-          <a:prstGeom prst="rect">
-            <a:avLst/>
-          </a:prstGeom>
-          <a:noFill/>
-          <a:ln>
-            <a:solidFill>
-              <a:schemeClr val="tx1"/>
-            </a:solidFill>
-          </a:ln>
-        </p:spPr>
-        <p:txBody>
-          <a:bodyPr wrap="square" rtlCol="0">
-            <a:spAutoFit/>
-          </a:bodyPr>
-          <a:lstStyle/>
-          <a:p>
-            <a:pPr algn="ctr"/>
-            <a:r>
-              <a:rPr lang="en-GB" dirty="0"/>
-              <a:t>Noisy channel</a:t>
-            </a:r>
-          </a:p>
-        </p:txBody>
-      </p:sp>
-      <p:sp>
-        <p:nvSpPr>
-          <p:cNvPr id="14" name="Left Brace 13">
-            <a:extLst>
-              <a:ext uri="{FF2B5EF4-FFF2-40B4-BE49-F238E27FC236}">
-                <a16:creationId xmlns:a16="http://schemas.microsoft.com/office/drawing/2014/main" id="{9E9ACF76-9639-A9B7-EFCF-FA058AD9E370}"/>
+                <a16:creationId xmlns:a16="http://schemas.microsoft.com/office/drawing/2014/main" id="{9E5E85FF-07EC-90A8-3C86-733A9CD99AC6}"/>
               </a:ext>
             </a:extLst>
           </p:cNvPr>
@@ -3613,97 +3880,9 @@
           <p:nvPr/>
         </p:nvSpPr>
         <p:spPr>
-          <a:xfrm rot="5400000">
-            <a:off x="2179451" y="1766802"/>
-            <a:ext cx="478971" cy="2492830"/>
-          </a:xfrm>
-          <a:prstGeom prst="leftBrace">
-            <a:avLst/>
-          </a:prstGeom>
-        </p:spPr>
-        <p:style>
-          <a:lnRef idx="3">
-            <a:schemeClr val="dk1"/>
-          </a:lnRef>
-          <a:fillRef idx="0">
-            <a:schemeClr val="dk1"/>
-          </a:fillRef>
-          <a:effectRef idx="2">
-            <a:schemeClr val="dk1"/>
-          </a:effectRef>
-          <a:fontRef idx="minor">
-            <a:schemeClr val="tx1"/>
-          </a:fontRef>
-        </p:style>
-        <p:txBody>
-          <a:bodyPr rtlCol="0" anchor="ctr"/>
-          <a:lstStyle/>
-          <a:p>
-            <a:pPr algn="ctr"/>
-            <a:endParaRPr lang="en-GB"/>
-          </a:p>
-        </p:txBody>
-      </p:sp>
-      <p:sp>
-        <p:nvSpPr>
-          <p:cNvPr id="15" name="Left Brace 14">
-            <a:extLst>
-              <a:ext uri="{FF2B5EF4-FFF2-40B4-BE49-F238E27FC236}">
-                <a16:creationId xmlns:a16="http://schemas.microsoft.com/office/drawing/2014/main" id="{16C05A47-82A4-22E9-D532-C9E7209D6F9C}"/>
-              </a:ext>
-            </a:extLst>
-          </p:cNvPr>
-          <p:cNvSpPr/>
-          <p:nvPr/>
-        </p:nvSpPr>
-        <p:spPr>
-          <a:xfrm rot="5400000">
-            <a:off x="9402124" y="1766802"/>
-            <a:ext cx="478971" cy="2492830"/>
-          </a:xfrm>
-          <a:prstGeom prst="leftBrace">
-            <a:avLst/>
-          </a:prstGeom>
-        </p:spPr>
-        <p:style>
-          <a:lnRef idx="3">
-            <a:schemeClr val="dk1"/>
-          </a:lnRef>
-          <a:fillRef idx="0">
-            <a:schemeClr val="dk1"/>
-          </a:fillRef>
-          <a:effectRef idx="2">
-            <a:schemeClr val="dk1"/>
-          </a:effectRef>
-          <a:fontRef idx="minor">
-            <a:schemeClr val="tx1"/>
-          </a:fontRef>
-        </p:style>
-        <p:txBody>
-          <a:bodyPr rtlCol="0" anchor="ctr"/>
-          <a:lstStyle/>
-          <a:p>
-            <a:pPr algn="ctr"/>
-            <a:endParaRPr lang="en-GB"/>
-          </a:p>
-        </p:txBody>
-      </p:sp>
-      <p:sp>
-        <p:nvSpPr>
-          <p:cNvPr id="16" name="Right Arrow 15">
-            <a:extLst>
-              <a:ext uri="{FF2B5EF4-FFF2-40B4-BE49-F238E27FC236}">
-                <a16:creationId xmlns:a16="http://schemas.microsoft.com/office/drawing/2014/main" id="{1C649E9A-5E6C-8C56-AE99-DC1FDE709CA3}"/>
-              </a:ext>
-            </a:extLst>
-          </p:cNvPr>
-          <p:cNvSpPr/>
-          <p:nvPr/>
-        </p:nvSpPr>
-        <p:spPr>
           <a:xfrm>
-            <a:off x="2125023" y="3491406"/>
-            <a:ext cx="342900" cy="315686"/>
+            <a:off x="1648639" y="1586666"/>
+            <a:ext cx="724984" cy="248669"/>
           </a:xfrm>
           <a:prstGeom prst="rightArrow">
             <a:avLst/>
@@ -3730,16 +3909,19 @@
           <a:lstStyle/>
           <a:p>
             <a:pPr algn="ctr"/>
-            <a:endParaRPr lang="en-GB"/>
-          </a:p>
-        </p:txBody>
-      </p:sp>
-      <p:sp>
-        <p:nvSpPr>
-          <p:cNvPr id="17" name="Right Arrow 16">
+            <a:endParaRPr lang="en-GB" sz="1801">
+              <a:latin typeface="Times New Roman" panose="02020603050405020304" pitchFamily="18" charset="0"/>
+              <a:cs typeface="Times New Roman" panose="02020603050405020304" pitchFamily="18" charset="0"/>
+            </a:endParaRPr>
+          </a:p>
+        </p:txBody>
+      </p:sp>
+      <p:sp>
+        <p:nvSpPr>
+          <p:cNvPr id="46" name="Right Arrow 45">
             <a:extLst>
               <a:ext uri="{FF2B5EF4-FFF2-40B4-BE49-F238E27FC236}">
-                <a16:creationId xmlns:a16="http://schemas.microsoft.com/office/drawing/2014/main" id="{B88727BB-1CB0-2647-8143-FDE305F003B5}"/>
+                <a16:creationId xmlns:a16="http://schemas.microsoft.com/office/drawing/2014/main" id="{3884AEDD-D3BB-33CA-BAD3-C069C84BF583}"/>
               </a:ext>
             </a:extLst>
           </p:cNvPr>
@@ -3748,8 +3930,8 @@
         </p:nvSpPr>
         <p:spPr>
           <a:xfrm>
-            <a:off x="4862780" y="3501510"/>
-            <a:ext cx="342900" cy="315686"/>
+            <a:off x="5183075" y="1596116"/>
+            <a:ext cx="724984" cy="248669"/>
           </a:xfrm>
           <a:prstGeom prst="rightArrow">
             <a:avLst/>
@@ -3776,16 +3958,19 @@
           <a:lstStyle/>
           <a:p>
             <a:pPr algn="ctr"/>
-            <a:endParaRPr lang="en-GB"/>
-          </a:p>
-        </p:txBody>
-      </p:sp>
-      <p:sp>
-        <p:nvSpPr>
-          <p:cNvPr id="18" name="Right Arrow 17">
+            <a:endParaRPr lang="en-GB" sz="1801">
+              <a:latin typeface="Times New Roman" panose="02020603050405020304" pitchFamily="18" charset="0"/>
+              <a:cs typeface="Times New Roman" panose="02020603050405020304" pitchFamily="18" charset="0"/>
+            </a:endParaRPr>
+          </a:p>
+        </p:txBody>
+      </p:sp>
+      <p:sp>
+        <p:nvSpPr>
+          <p:cNvPr id="47" name="Right Arrow 46">
             <a:extLst>
               <a:ext uri="{FF2B5EF4-FFF2-40B4-BE49-F238E27FC236}">
-                <a16:creationId xmlns:a16="http://schemas.microsoft.com/office/drawing/2014/main" id="{26F1F33A-34F2-EB07-96D5-267EBCE0A993}"/>
+                <a16:creationId xmlns:a16="http://schemas.microsoft.com/office/drawing/2014/main" id="{7B7981CD-4A86-174C-2466-E6A1BED57AA2}"/>
               </a:ext>
             </a:extLst>
           </p:cNvPr>
@@ -3794,8 +3979,8 @@
         </p:nvSpPr>
         <p:spPr>
           <a:xfrm>
-            <a:off x="7012709" y="3491406"/>
-            <a:ext cx="342900" cy="315686"/>
+            <a:off x="8265141" y="1586666"/>
+            <a:ext cx="724984" cy="248669"/>
           </a:xfrm>
           <a:prstGeom prst="rightArrow">
             <a:avLst/>
@@ -3822,16 +4007,19 @@
           <a:lstStyle/>
           <a:p>
             <a:pPr algn="ctr"/>
-            <a:endParaRPr lang="en-GB"/>
-          </a:p>
-        </p:txBody>
-      </p:sp>
-      <p:sp>
-        <p:nvSpPr>
-          <p:cNvPr id="19" name="Right Arrow 18">
+            <a:endParaRPr lang="en-GB" sz="1801">
+              <a:latin typeface="Times New Roman" panose="02020603050405020304" pitchFamily="18" charset="0"/>
+              <a:cs typeface="Times New Roman" panose="02020603050405020304" pitchFamily="18" charset="0"/>
+            </a:endParaRPr>
+          </a:p>
+        </p:txBody>
+      </p:sp>
+      <p:sp>
+        <p:nvSpPr>
+          <p:cNvPr id="48" name="Right Arrow 47">
             <a:extLst>
               <a:ext uri="{FF2B5EF4-FFF2-40B4-BE49-F238E27FC236}">
-                <a16:creationId xmlns:a16="http://schemas.microsoft.com/office/drawing/2014/main" id="{D0359248-C10D-42D7-2E95-D83DECF38F3A}"/>
+                <a16:creationId xmlns:a16="http://schemas.microsoft.com/office/drawing/2014/main" id="{F5CE8D61-32E0-A8AC-489E-AECECF86DDE1}"/>
               </a:ext>
             </a:extLst>
           </p:cNvPr>
@@ -3840,8 +4028,8 @@
         </p:nvSpPr>
         <p:spPr>
           <a:xfrm>
-            <a:off x="9750466" y="3501510"/>
-            <a:ext cx="342900" cy="315686"/>
+            <a:off x="11794198" y="1596116"/>
+            <a:ext cx="724984" cy="248669"/>
           </a:xfrm>
           <a:prstGeom prst="rightArrow">
             <a:avLst/>
@@ -3868,96 +4056,17 @@
           <a:lstStyle/>
           <a:p>
             <a:pPr algn="ctr"/>
-            <a:endParaRPr lang="en-GB"/>
-          </a:p>
-        </p:txBody>
-      </p:sp>
-      <p:sp>
-        <p:nvSpPr>
-          <p:cNvPr id="20" name="TextBox 19">
-            <a:extLst>
-              <a:ext uri="{FF2B5EF4-FFF2-40B4-BE49-F238E27FC236}">
-                <a16:creationId xmlns:a16="http://schemas.microsoft.com/office/drawing/2014/main" id="{FEF3510C-E3E4-4D4E-0300-37F508A5374E}"/>
-              </a:ext>
-            </a:extLst>
-          </p:cNvPr>
-          <p:cNvSpPr txBox="1"/>
-          <p:nvPr/>
-        </p:nvSpPr>
-        <p:spPr>
-          <a:xfrm>
-            <a:off x="1923637" y="2164524"/>
-            <a:ext cx="1061358" cy="369332"/>
-          </a:xfrm>
-          <a:prstGeom prst="rect">
-            <a:avLst/>
-          </a:prstGeom>
-          <a:noFill/>
-          <a:ln>
-            <a:solidFill>
-              <a:schemeClr val="tx1"/>
-            </a:solidFill>
-          </a:ln>
-        </p:spPr>
-        <p:txBody>
-          <a:bodyPr wrap="square" rtlCol="0">
-            <a:spAutoFit/>
-          </a:bodyPr>
-          <a:lstStyle/>
-          <a:p>
-            <a:pPr algn="ctr"/>
-            <a:r>
-              <a:rPr lang="en-GB" dirty="0"/>
-              <a:t>Intended</a:t>
-            </a:r>
-          </a:p>
-        </p:txBody>
-      </p:sp>
-      <p:sp>
-        <p:nvSpPr>
-          <p:cNvPr id="21" name="TextBox 20">
-            <a:extLst>
-              <a:ext uri="{FF2B5EF4-FFF2-40B4-BE49-F238E27FC236}">
-                <a16:creationId xmlns:a16="http://schemas.microsoft.com/office/drawing/2014/main" id="{9A86131B-A799-4CE1-9F01-DA6D345B446C}"/>
-              </a:ext>
-            </a:extLst>
-          </p:cNvPr>
-          <p:cNvSpPr txBox="1"/>
-          <p:nvPr/>
-        </p:nvSpPr>
-        <p:spPr>
-          <a:xfrm>
-            <a:off x="9070109" y="2164524"/>
-            <a:ext cx="1142999" cy="369332"/>
-          </a:xfrm>
-          <a:prstGeom prst="rect">
-            <a:avLst/>
-          </a:prstGeom>
-          <a:noFill/>
-          <a:ln>
-            <a:solidFill>
-              <a:schemeClr val="tx1"/>
-            </a:solidFill>
-          </a:ln>
-        </p:spPr>
-        <p:txBody>
-          <a:bodyPr wrap="square" rtlCol="0">
-            <a:spAutoFit/>
-          </a:bodyPr>
-          <a:lstStyle/>
-          <a:p>
-            <a:pPr algn="ctr"/>
-            <a:r>
-              <a:rPr lang="en-GB" dirty="0"/>
-              <a:t>Perceived</a:t>
-            </a:r>
+            <a:endParaRPr lang="en-GB" sz="1801">
+              <a:latin typeface="Times New Roman" panose="02020603050405020304" pitchFamily="18" charset="0"/>
+              <a:cs typeface="Times New Roman" panose="02020603050405020304" pitchFamily="18" charset="0"/>
+            </a:endParaRPr>
           </a:p>
         </p:txBody>
       </p:sp>
     </p:spTree>
     <p:extLst>
       <p:ext uri="{BB962C8B-B14F-4D97-AF65-F5344CB8AC3E}">
-        <p14:creationId xmlns:p14="http://schemas.microsoft.com/office/powerpoint/2010/main" val="537489974"/>
+        <p14:creationId xmlns:p14="http://schemas.microsoft.com/office/powerpoint/2010/main" val="4040410689"/>
       </p:ext>
     </p:extLst>
   </p:cSld>
@@ -3968,6 +4077,267 @@
 </file>
 
 <file path=ppt/theme/theme1.xml><?xml version="1.0" encoding="utf-8"?>
+<a:theme xmlns:a="http://schemas.openxmlformats.org/drawingml/2006/main" name="Office Theme">
+  <a:themeElements>
+    <a:clrScheme name="Office Theme">
+      <a:dk1>
+        <a:sysClr val="windowText" lastClr="000000"/>
+      </a:dk1>
+      <a:lt1>
+        <a:sysClr val="window" lastClr="FFFFFF"/>
+      </a:lt1>
+      <a:dk2>
+        <a:srgbClr val="44546A"/>
+      </a:dk2>
+      <a:lt2>
+        <a:srgbClr val="E7E6E6"/>
+      </a:lt2>
+      <a:accent1>
+        <a:srgbClr val="4472C4"/>
+      </a:accent1>
+      <a:accent2>
+        <a:srgbClr val="ED7D31"/>
+      </a:accent2>
+      <a:accent3>
+        <a:srgbClr val="A5A5A5"/>
+      </a:accent3>
+      <a:accent4>
+        <a:srgbClr val="FFC000"/>
+      </a:accent4>
+      <a:accent5>
+        <a:srgbClr val="5B9BD5"/>
+      </a:accent5>
+      <a:accent6>
+        <a:srgbClr val="70AD47"/>
+      </a:accent6>
+      <a:hlink>
+        <a:srgbClr val="0563C1"/>
+      </a:hlink>
+      <a:folHlink>
+        <a:srgbClr val="954F72"/>
+      </a:folHlink>
+    </a:clrScheme>
+    <a:fontScheme name="Office Theme">
+      <a:majorFont>
+        <a:latin typeface="Calibri Light" panose="020F0302020204030204"/>
+        <a:ea typeface=""/>
+        <a:cs typeface=""/>
+        <a:font script="Jpan" typeface="游ゴシック Light"/>
+        <a:font script="Hang" typeface="맑은 고딕"/>
+        <a:font script="Hans" typeface="等线 Light"/>
+        <a:font script="Hant" typeface="新細明體"/>
+        <a:font script="Arab" typeface="Times New Roman"/>
+        <a:font script="Hebr" typeface="Times New Roman"/>
+        <a:font script="Thai" typeface="Angsana New"/>
+        <a:font script="Ethi" typeface="Nyala"/>
+        <a:font script="Beng" typeface="Vrinda"/>
+        <a:font script="Gujr" typeface="Shruti"/>
+        <a:font script="Khmr" typeface="MoolBoran"/>
+        <a:font script="Knda" typeface="Tunga"/>
+        <a:font script="Guru" typeface="Raavi"/>
+        <a:font script="Cans" typeface="Euphemia"/>
+        <a:font script="Cher" typeface="Plantagenet Cherokee"/>
+        <a:font script="Yiii" typeface="Microsoft Yi Baiti"/>
+        <a:font script="Tibt" typeface="Microsoft Himalaya"/>
+        <a:font script="Thaa" typeface="MV Boli"/>
+        <a:font script="Deva" typeface="Mangal"/>
+        <a:font script="Telu" typeface="Gautami"/>
+        <a:font script="Taml" typeface="Latha"/>
+        <a:font script="Syrc" typeface="Estrangelo Edessa"/>
+        <a:font script="Orya" typeface="Kalinga"/>
+        <a:font script="Mlym" typeface="Kartika"/>
+        <a:font script="Laoo" typeface="DokChampa"/>
+        <a:font script="Sinh" typeface="Iskoola Pota"/>
+        <a:font script="Mong" typeface="Mongolian Baiti"/>
+        <a:font script="Viet" typeface="Times New Roman"/>
+        <a:font script="Uigh" typeface="Microsoft Uighur"/>
+        <a:font script="Geor" typeface="Sylfaen"/>
+      </a:majorFont>
+      <a:minorFont>
+        <a:latin typeface="Calibri" panose="020F0502020204030204"/>
+        <a:ea typeface=""/>
+        <a:cs typeface=""/>
+        <a:font script="Jpan" typeface="游ゴシック"/>
+        <a:font script="Hang" typeface="맑은 고딕"/>
+        <a:font script="Hans" typeface="等线"/>
+        <a:font script="Hant" typeface="新細明體"/>
+        <a:font script="Arab" typeface="Arial"/>
+        <a:font script="Hebr" typeface="Arial"/>
+        <a:font script="Thai" typeface="Cordia New"/>
+        <a:font script="Ethi" typeface="Nyala"/>
+        <a:font script="Beng" typeface="Vrinda"/>
+        <a:font script="Gujr" typeface="Shruti"/>
+        <a:font script="Khmr" typeface="DaunPenh"/>
+        <a:font script="Knda" typeface="Tunga"/>
+        <a:font script="Guru" typeface="Raavi"/>
+        <a:font script="Cans" typeface="Euphemia"/>
+        <a:font script="Cher" typeface="Plantagenet Cherokee"/>
+        <a:font script="Yiii" typeface="Microsoft Yi Baiti"/>
+        <a:font script="Tibt" typeface="Microsoft Himalaya"/>
+        <a:font script="Thaa" typeface="MV Boli"/>
+        <a:font script="Deva" typeface="Mangal"/>
+        <a:font script="Telu" typeface="Gautami"/>
+        <a:font script="Taml" typeface="Latha"/>
+        <a:font script="Syrc" typeface="Estrangelo Edessa"/>
+        <a:font script="Orya" typeface="Kalinga"/>
+        <a:font script="Mlym" typeface="Kartika"/>
+        <a:font script="Laoo" typeface="DokChampa"/>
+        <a:font script="Sinh" typeface="Iskoola Pota"/>
+        <a:font script="Mong" typeface="Mongolian Baiti"/>
+        <a:font script="Viet" typeface="Arial"/>
+        <a:font script="Uigh" typeface="Microsoft Uighur"/>
+        <a:font script="Geor" typeface="Sylfaen"/>
+      </a:minorFont>
+    </a:fontScheme>
+    <a:fmtScheme name="Office Theme">
+      <a:fillStyleLst>
+        <a:solidFill>
+          <a:schemeClr val="phClr"/>
+        </a:solidFill>
+        <a:gradFill rotWithShape="1">
+          <a:gsLst>
+            <a:gs pos="0">
+              <a:schemeClr val="phClr">
+                <a:lumMod val="110000"/>
+                <a:satMod val="105000"/>
+                <a:tint val="67000"/>
+              </a:schemeClr>
+            </a:gs>
+            <a:gs pos="50000">
+              <a:schemeClr val="phClr">
+                <a:lumMod val="105000"/>
+                <a:satMod val="103000"/>
+                <a:tint val="73000"/>
+              </a:schemeClr>
+            </a:gs>
+            <a:gs pos="100000">
+              <a:schemeClr val="phClr">
+                <a:lumMod val="105000"/>
+                <a:satMod val="109000"/>
+                <a:tint val="81000"/>
+              </a:schemeClr>
+            </a:gs>
+          </a:gsLst>
+          <a:lin ang="5400000" scaled="0"/>
+        </a:gradFill>
+        <a:gradFill rotWithShape="1">
+          <a:gsLst>
+            <a:gs pos="0">
+              <a:schemeClr val="phClr">
+                <a:satMod val="103000"/>
+                <a:lumMod val="102000"/>
+                <a:tint val="94000"/>
+              </a:schemeClr>
+            </a:gs>
+            <a:gs pos="50000">
+              <a:schemeClr val="phClr">
+                <a:satMod val="110000"/>
+                <a:lumMod val="100000"/>
+                <a:shade val="100000"/>
+              </a:schemeClr>
+            </a:gs>
+            <a:gs pos="100000">
+              <a:schemeClr val="phClr">
+                <a:lumMod val="99000"/>
+                <a:satMod val="120000"/>
+                <a:shade val="78000"/>
+              </a:schemeClr>
+            </a:gs>
+          </a:gsLst>
+          <a:lin ang="5400000" scaled="0"/>
+        </a:gradFill>
+      </a:fillStyleLst>
+      <a:lnStyleLst>
+        <a:ln w="6350" cap="flat" cmpd="sng" algn="ctr">
+          <a:solidFill>
+            <a:schemeClr val="phClr"/>
+          </a:solidFill>
+          <a:prstDash val="solid"/>
+          <a:miter lim="800000"/>
+        </a:ln>
+        <a:ln w="12700" cap="flat" cmpd="sng" algn="ctr">
+          <a:solidFill>
+            <a:schemeClr val="phClr"/>
+          </a:solidFill>
+          <a:prstDash val="solid"/>
+          <a:miter lim="800000"/>
+        </a:ln>
+        <a:ln w="19050" cap="flat" cmpd="sng" algn="ctr">
+          <a:solidFill>
+            <a:schemeClr val="phClr"/>
+          </a:solidFill>
+          <a:prstDash val="solid"/>
+          <a:miter lim="800000"/>
+        </a:ln>
+      </a:lnStyleLst>
+      <a:effectStyleLst>
+        <a:effectStyle>
+          <a:effectLst/>
+        </a:effectStyle>
+        <a:effectStyle>
+          <a:effectLst/>
+        </a:effectStyle>
+        <a:effectStyle>
+          <a:effectLst>
+            <a:outerShdw blurRad="57150" dist="19050" dir="5400000" algn="ctr" rotWithShape="0">
+              <a:srgbClr val="000000">
+                <a:alpha val="63000"/>
+              </a:srgbClr>
+            </a:outerShdw>
+          </a:effectLst>
+        </a:effectStyle>
+      </a:effectStyleLst>
+      <a:bgFillStyleLst>
+        <a:solidFill>
+          <a:schemeClr val="phClr"/>
+        </a:solidFill>
+        <a:solidFill>
+          <a:schemeClr val="phClr">
+            <a:tint val="95000"/>
+            <a:satMod val="170000"/>
+          </a:schemeClr>
+        </a:solidFill>
+        <a:gradFill rotWithShape="1">
+          <a:gsLst>
+            <a:gs pos="0">
+              <a:schemeClr val="phClr">
+                <a:tint val="93000"/>
+                <a:satMod val="150000"/>
+                <a:shade val="98000"/>
+                <a:lumMod val="102000"/>
+              </a:schemeClr>
+            </a:gs>
+            <a:gs pos="50000">
+              <a:schemeClr val="phClr">
+                <a:tint val="98000"/>
+                <a:satMod val="130000"/>
+                <a:shade val="90000"/>
+                <a:lumMod val="103000"/>
+              </a:schemeClr>
+            </a:gs>
+            <a:gs pos="100000">
+              <a:schemeClr val="phClr">
+                <a:shade val="63000"/>
+                <a:satMod val="120000"/>
+              </a:schemeClr>
+            </a:gs>
+          </a:gsLst>
+          <a:lin ang="5400000" scaled="0"/>
+        </a:gradFill>
+      </a:bgFillStyleLst>
+    </a:fmtScheme>
+  </a:themeElements>
+  <a:objectDefaults/>
+  <a:extraClrSchemeLst/>
+  <a:extLst>
+    <a:ext uri="{05A4C25C-085E-4340-85A3-A5531E510DB2}">
+      <thm15:themeFamily xmlns:thm15="http://schemas.microsoft.com/office/thememl/2012/main" name="Office Theme" id="{62F939B6-93AF-4DB8-9C6B-D6C7DFDC589F}" vid="{4A3C46E8-61CC-4603-A589-7422A47A8E4A}"/>
+    </a:ext>
+  </a:extLst>
+</a:theme>
+</file>
+
+<file path=ppt/theme/theme2.xml><?xml version="1.0" encoding="utf-8"?>
 <a:theme xmlns:a="http://schemas.openxmlformats.org/drawingml/2006/main" name="Office Theme">
   <a:themeElements>
     <a:clrScheme name="Office">

</xml_diff>